<commit_message>
work novel fig 3
</commit_message>
<xml_diff>
--- a/figure-assembly/figure-3.pptx
+++ b/figure-assembly/figure-3.pptx
@@ -6,6 +6,8 @@
   </p:sldMasterIdLst>
   <p:sldIdLst>
     <p:sldId id="256" r:id="rId2"/>
+    <p:sldId id="257" r:id="rId3"/>
+    <p:sldId id="258" r:id="rId4"/>
   </p:sldIdLst>
   <p:sldSz cx="9906000" cy="6858000" type="A4"/>
   <p:notesSz cx="6858000" cy="9144000"/>
@@ -243,7 +245,7 @@
           <a:p>
             <a:fld id="{25EC0CD3-564D-9742-98B5-86271438CCE6}" type="datetimeFigureOut">
               <a:rPr lang="en-US" smtClean="0"/>
-              <a:t>11/11/18</a:t>
+              <a:t>1/25/19</a:t>
             </a:fld>
             <a:endParaRPr lang="en-US"/>
           </a:p>
@@ -413,7 +415,7 @@
           <a:p>
             <a:fld id="{25EC0CD3-564D-9742-98B5-86271438CCE6}" type="datetimeFigureOut">
               <a:rPr lang="en-US" smtClean="0"/>
-              <a:t>11/11/18</a:t>
+              <a:t>1/25/19</a:t>
             </a:fld>
             <a:endParaRPr lang="en-US"/>
           </a:p>
@@ -593,7 +595,7 @@
           <a:p>
             <a:fld id="{25EC0CD3-564D-9742-98B5-86271438CCE6}" type="datetimeFigureOut">
               <a:rPr lang="en-US" smtClean="0"/>
-              <a:t>11/11/18</a:t>
+              <a:t>1/25/19</a:t>
             </a:fld>
             <a:endParaRPr lang="en-US"/>
           </a:p>
@@ -763,7 +765,7 @@
           <a:p>
             <a:fld id="{25EC0CD3-564D-9742-98B5-86271438CCE6}" type="datetimeFigureOut">
               <a:rPr lang="en-US" smtClean="0"/>
-              <a:t>11/11/18</a:t>
+              <a:t>1/25/19</a:t>
             </a:fld>
             <a:endParaRPr lang="en-US"/>
           </a:p>
@@ -1007,7 +1009,7 @@
           <a:p>
             <a:fld id="{25EC0CD3-564D-9742-98B5-86271438CCE6}" type="datetimeFigureOut">
               <a:rPr lang="en-US" smtClean="0"/>
-              <a:t>11/11/18</a:t>
+              <a:t>1/25/19</a:t>
             </a:fld>
             <a:endParaRPr lang="en-US"/>
           </a:p>
@@ -1239,7 +1241,7 @@
           <a:p>
             <a:fld id="{25EC0CD3-564D-9742-98B5-86271438CCE6}" type="datetimeFigureOut">
               <a:rPr lang="en-US" smtClean="0"/>
-              <a:t>11/11/18</a:t>
+              <a:t>1/25/19</a:t>
             </a:fld>
             <a:endParaRPr lang="en-US"/>
           </a:p>
@@ -1606,7 +1608,7 @@
           <a:p>
             <a:fld id="{25EC0CD3-564D-9742-98B5-86271438CCE6}" type="datetimeFigureOut">
               <a:rPr lang="en-US" smtClean="0"/>
-              <a:t>11/11/18</a:t>
+              <a:t>1/25/19</a:t>
             </a:fld>
             <a:endParaRPr lang="en-US"/>
           </a:p>
@@ -1724,7 +1726,7 @@
           <a:p>
             <a:fld id="{25EC0CD3-564D-9742-98B5-86271438CCE6}" type="datetimeFigureOut">
               <a:rPr lang="en-US" smtClean="0"/>
-              <a:t>11/11/18</a:t>
+              <a:t>1/25/19</a:t>
             </a:fld>
             <a:endParaRPr lang="en-US"/>
           </a:p>
@@ -1819,7 +1821,7 @@
           <a:p>
             <a:fld id="{25EC0CD3-564D-9742-98B5-86271438CCE6}" type="datetimeFigureOut">
               <a:rPr lang="en-US" smtClean="0"/>
-              <a:t>11/11/18</a:t>
+              <a:t>1/25/19</a:t>
             </a:fld>
             <a:endParaRPr lang="en-US"/>
           </a:p>
@@ -2096,7 +2098,7 @@
           <a:p>
             <a:fld id="{25EC0CD3-564D-9742-98B5-86271438CCE6}" type="datetimeFigureOut">
               <a:rPr lang="en-US" smtClean="0"/>
-              <a:t>11/11/18</a:t>
+              <a:t>1/25/19</a:t>
             </a:fld>
             <a:endParaRPr lang="en-US"/>
           </a:p>
@@ -2353,7 +2355,7 @@
           <a:p>
             <a:fld id="{25EC0CD3-564D-9742-98B5-86271438CCE6}" type="datetimeFigureOut">
               <a:rPr lang="en-US" smtClean="0"/>
-              <a:t>11/11/18</a:t>
+              <a:t>1/25/19</a:t>
             </a:fld>
             <a:endParaRPr lang="en-US"/>
           </a:p>
@@ -2566,7 +2568,7 @@
           <a:p>
             <a:fld id="{25EC0CD3-564D-9742-98B5-86271438CCE6}" type="datetimeFigureOut">
               <a:rPr lang="en-US" smtClean="0"/>
-              <a:t>11/11/18</a:t>
+              <a:t>1/25/19</a:t>
             </a:fld>
             <a:endParaRPr lang="en-US"/>
           </a:p>
@@ -4411,6 +4413,2620 @@
 </p:sld>
 </file>
 
+<file path=ppt/slides/slide2.xml><?xml version="1.0" encoding="utf-8"?>
+<p:sld xmlns:a="http://schemas.openxmlformats.org/drawingml/2006/main" xmlns:r="http://schemas.openxmlformats.org/officeDocument/2006/relationships" xmlns:p="http://schemas.openxmlformats.org/presentationml/2006/main">
+  <p:cSld>
+    <p:spTree>
+      <p:nvGrpSpPr>
+        <p:cNvPr id="1" name=""/>
+        <p:cNvGrpSpPr/>
+        <p:nvPr/>
+      </p:nvGrpSpPr>
+      <p:grpSpPr>
+        <a:xfrm>
+          <a:off x="0" y="0"/>
+          <a:ext cx="0" cy="0"/>
+          <a:chOff x="0" y="0"/>
+          <a:chExt cx="0" cy="0"/>
+        </a:xfrm>
+      </p:grpSpPr>
+      <p:sp>
+        <p:nvSpPr>
+          <p:cNvPr id="2" name="TextBox 1">
+            <a:extLst>
+              <a:ext uri="{FF2B5EF4-FFF2-40B4-BE49-F238E27FC236}">
+                <a16:creationId xmlns:a16="http://schemas.microsoft.com/office/drawing/2014/main" id="{0B7C7307-DE28-5B43-9C37-B804F1844236}"/>
+              </a:ext>
+            </a:extLst>
+          </p:cNvPr>
+          <p:cNvSpPr txBox="1"/>
+          <p:nvPr/>
+        </p:nvSpPr>
+        <p:spPr>
+          <a:xfrm>
+            <a:off x="542724" y="403776"/>
+            <a:ext cx="3018980" cy="369332"/>
+          </a:xfrm>
+          <a:prstGeom prst="rect">
+            <a:avLst/>
+          </a:prstGeom>
+          <a:noFill/>
+        </p:spPr>
+        <p:txBody>
+          <a:bodyPr wrap="square" rtlCol="0">
+            <a:spAutoFit/>
+          </a:bodyPr>
+          <a:lstStyle/>
+          <a:p>
+            <a:pPr algn="ctr"/>
+            <a:r>
+              <a:rPr lang="en-US" sz="900" dirty="0"/>
+              <a:t>Regulation of </a:t>
+            </a:r>
+            <a:r>
+              <a:rPr lang="en-US" sz="900" i="1" dirty="0"/>
+              <a:t>X </a:t>
+            </a:r>
+            <a:r>
+              <a:rPr lang="en-US" sz="900" dirty="0"/>
+              <a:t>expression </a:t>
+            </a:r>
+          </a:p>
+          <a:p>
+            <a:pPr algn="ctr"/>
+            <a:r>
+              <a:rPr lang="en-US" sz="900" dirty="0"/>
+              <a:t>by  coarse-grained proteome sectors ? </a:t>
+            </a:r>
+            <a:endParaRPr lang="en-US" sz="900" i="1" dirty="0"/>
+          </a:p>
+        </p:txBody>
+      </p:sp>
+      <p:grpSp>
+        <p:nvGrpSpPr>
+          <p:cNvPr id="3" name="Group 2">
+            <a:extLst>
+              <a:ext uri="{FF2B5EF4-FFF2-40B4-BE49-F238E27FC236}">
+                <a16:creationId xmlns:a16="http://schemas.microsoft.com/office/drawing/2014/main" id="{2B125E49-DFF6-D145-BB57-74F0E088AC66}"/>
+              </a:ext>
+            </a:extLst>
+          </p:cNvPr>
+          <p:cNvGrpSpPr/>
+          <p:nvPr/>
+        </p:nvGrpSpPr>
+        <p:grpSpPr>
+          <a:xfrm>
+            <a:off x="744286" y="874714"/>
+            <a:ext cx="2582550" cy="1497280"/>
+            <a:chOff x="3819713" y="765944"/>
+            <a:chExt cx="1787919" cy="1036579"/>
+          </a:xfrm>
+        </p:grpSpPr>
+        <p:grpSp>
+          <p:nvGrpSpPr>
+            <p:cNvPr id="4" name="Group 3">
+              <a:extLst>
+                <a:ext uri="{FF2B5EF4-FFF2-40B4-BE49-F238E27FC236}">
+                  <a16:creationId xmlns:a16="http://schemas.microsoft.com/office/drawing/2014/main" id="{FA9E0486-59F0-D745-AA41-3A1D171609F7}"/>
+                </a:ext>
+              </a:extLst>
+            </p:cNvPr>
+            <p:cNvGrpSpPr/>
+            <p:nvPr/>
+          </p:nvGrpSpPr>
+          <p:grpSpPr>
+            <a:xfrm>
+              <a:off x="4037627" y="765944"/>
+              <a:ext cx="1123801" cy="286455"/>
+              <a:chOff x="2233978" y="1508637"/>
+              <a:chExt cx="1997868" cy="509254"/>
+            </a:xfrm>
+          </p:grpSpPr>
+          <mc:AlternateContent xmlns:mc="http://schemas.openxmlformats.org/markup-compatibility/2006" xmlns:a14="http://schemas.microsoft.com/office/drawing/2010/main">
+            <mc:Choice Requires="a14">
+              <p:sp>
+                <p:nvSpPr>
+                  <p:cNvPr id="12" name="Rectangle 11">
+                    <a:extLst>
+                      <a:ext uri="{FF2B5EF4-FFF2-40B4-BE49-F238E27FC236}">
+                        <a16:creationId xmlns:a16="http://schemas.microsoft.com/office/drawing/2014/main" id="{D6968C6D-2F86-A945-A7D1-900F9C99A29E}"/>
+                      </a:ext>
+                    </a:extLst>
+                  </p:cNvPr>
+                  <p:cNvSpPr/>
+                  <p:nvPr/>
+                </p:nvSpPr>
+                <p:spPr>
+                  <a:xfrm>
+                    <a:off x="2233978" y="1508637"/>
+                    <a:ext cx="1997868" cy="509254"/>
+                  </a:xfrm>
+                  <a:prstGeom prst="rect">
+                    <a:avLst/>
+                  </a:prstGeom>
+                </p:spPr>
+                <p:txBody>
+                  <a:bodyPr wrap="square">
+                    <a:spAutoFit/>
+                  </a:bodyPr>
+                  <a:lstStyle/>
+                  <a:p>
+                    <a:pPr/>
+                    <a14:m>
+                      <m:oMathPara xmlns:m="http://schemas.openxmlformats.org/officeDocument/2006/math">
+                        <m:oMathParaPr>
+                          <m:jc m:val="centerGroup"/>
+                        </m:oMathParaPr>
+                        <m:oMath xmlns:m="http://schemas.openxmlformats.org/officeDocument/2006/math">
+                          <m:sSub>
+                            <m:sSubPr>
+                              <m:ctrlPr>
+                                <a:rPr lang="ar-AE" sz="975" i="1" smtClean="0">
+                                  <a:latin typeface="Cambria Math" panose="02040503050406030204" pitchFamily="18" charset="0"/>
+                                </a:rPr>
+                              </m:ctrlPr>
+                            </m:sSubPr>
+                            <m:e>
+                              <m:r>
+                                <a:rPr lang="ar-AE" sz="975">
+                                  <a:latin typeface="Cambria Math" panose="02040503050406030204" pitchFamily="18" charset="0"/>
+                                </a:rPr>
+                                <m:t>𝑉</m:t>
+                              </m:r>
+                            </m:e>
+                            <m:sub>
+                              <m:r>
+                                <a:rPr lang="ar-AE" sz="975">
+                                  <a:latin typeface="Cambria Math" panose="02040503050406030204" pitchFamily="18" charset="0"/>
+                                </a:rPr>
+                                <m:t>𝑑𝑖𝑣</m:t>
+                              </m:r>
+                            </m:sub>
+                          </m:sSub>
+                          <m:r>
+                            <a:rPr lang="en-GB" sz="975" b="0" i="1" smtClean="0">
+                              <a:latin typeface="Cambria Math" panose="02040503050406030204" pitchFamily="18" charset="0"/>
+                              <a:ea typeface="Cambria Math" panose="02040503050406030204" pitchFamily="18" charset="0"/>
+                            </a:rPr>
+                            <m:t>=</m:t>
+                          </m:r>
+                          <m:f>
+                            <m:fPr>
+                              <m:ctrlPr>
+                                <a:rPr lang="ar-AE" sz="975" i="1">
+                                  <a:latin typeface="Cambria Math" panose="02040503050406030204" pitchFamily="18" charset="0"/>
+                                  <a:ea typeface="Cambria Math" panose="02040503050406030204" pitchFamily="18" charset="0"/>
+                                </a:rPr>
+                              </m:ctrlPr>
+                            </m:fPr>
+                            <m:num>
+                              <m:sSub>
+                                <m:sSubPr>
+                                  <m:ctrlPr>
+                                    <a:rPr lang="ar-AE" sz="975" i="1" smtClean="0">
+                                      <a:latin typeface="Cambria Math" panose="02040503050406030204" pitchFamily="18" charset="0"/>
+                                      <a:ea typeface="Cambria Math" panose="02040503050406030204" pitchFamily="18" charset="0"/>
+                                    </a:rPr>
+                                  </m:ctrlPr>
+                                </m:sSubPr>
+                                <m:e>
+                                  <m:r>
+                                    <a:rPr lang="en-GB" sz="975" b="0" i="1" smtClean="0">
+                                      <a:latin typeface="Cambria Math" panose="02040503050406030204" pitchFamily="18" charset="0"/>
+                                      <a:ea typeface="Cambria Math" panose="02040503050406030204" pitchFamily="18" charset="0"/>
+                                    </a:rPr>
+                                    <m:t>𝑋</m:t>
+                                  </m:r>
+                                </m:e>
+                                <m:sub>
+                                  <m:r>
+                                    <a:rPr lang="en-GB" sz="975" b="0" i="1" smtClean="0">
+                                      <a:latin typeface="Cambria Math" panose="02040503050406030204" pitchFamily="18" charset="0"/>
+                                      <a:ea typeface="Cambria Math" panose="02040503050406030204" pitchFamily="18" charset="0"/>
+                                    </a:rPr>
+                                    <m:t>𝑑𝑖𝑣</m:t>
+                                  </m:r>
+                                </m:sub>
+                              </m:sSub>
+                            </m:num>
+                            <m:den>
+                              <m:r>
+                                <a:rPr lang="en-GB" sz="975" i="1">
+                                  <a:latin typeface="Cambria Math" panose="02040503050406030204" pitchFamily="18" charset="0"/>
+                                  <a:ea typeface="Cambria Math" panose="02040503050406030204" pitchFamily="18" charset="0"/>
+                                </a:rPr>
+                                <m:t>𝑥</m:t>
+                              </m:r>
+                            </m:den>
+                          </m:f>
+                          <m:r>
+                            <a:rPr lang="en-GB" sz="975" i="1">
+                              <a:latin typeface="Cambria Math" panose="02040503050406030204" pitchFamily="18" charset="0"/>
+                              <a:ea typeface="Cambria Math" panose="02040503050406030204" pitchFamily="18" charset="0"/>
+                            </a:rPr>
+                            <m:t>=</m:t>
+                          </m:r>
+                          <m:f>
+                            <m:fPr>
+                              <m:ctrlPr>
+                                <a:rPr lang="ar-AE" sz="975" i="1">
+                                  <a:latin typeface="Cambria Math" panose="02040503050406030204" pitchFamily="18" charset="0"/>
+                                </a:rPr>
+                              </m:ctrlPr>
+                            </m:fPr>
+                            <m:num>
+                              <m:sSub>
+                                <m:sSubPr>
+                                  <m:ctrlPr>
+                                    <a:rPr lang="ar-AE" sz="975" i="1" smtClean="0">
+                                      <a:latin typeface="Cambria Math" panose="02040503050406030204" pitchFamily="18" charset="0"/>
+                                    </a:rPr>
+                                  </m:ctrlPr>
+                                </m:sSubPr>
+                                <m:e>
+                                  <m:r>
+                                    <a:rPr lang="en-GB" sz="975" b="0" i="1" smtClean="0">
+                                      <a:latin typeface="Cambria Math" panose="02040503050406030204" pitchFamily="18" charset="0"/>
+                                    </a:rPr>
+                                    <m:t>𝑋</m:t>
+                                  </m:r>
+                                </m:e>
+                                <m:sub>
+                                  <m:r>
+                                    <a:rPr lang="en-GB" sz="975" b="0" i="1" smtClean="0">
+                                      <a:latin typeface="Cambria Math" panose="02040503050406030204" pitchFamily="18" charset="0"/>
+                                    </a:rPr>
+                                    <m:t>𝑑𝑖𝑣</m:t>
+                                  </m:r>
+                                </m:sub>
+                              </m:sSub>
+                            </m:num>
+                            <m:den>
+                              <m:sSub>
+                                <m:sSubPr>
+                                  <m:ctrlPr>
+                                    <a:rPr lang="ar-AE" sz="975" i="1">
+                                      <a:latin typeface="Cambria Math" panose="02040503050406030204" pitchFamily="18" charset="0"/>
+                                    </a:rPr>
+                                  </m:ctrlPr>
+                                </m:sSubPr>
+                                <m:e>
+                                  <m:r>
+                                    <a:rPr lang="ar-AE" sz="975">
+                                      <a:latin typeface="Cambria Math" panose="02040503050406030204" pitchFamily="18" charset="0"/>
+                                    </a:rPr>
+                                    <m:t>𝑓</m:t>
+                                  </m:r>
+                                </m:e>
+                                <m:sub>
+                                  <m:r>
+                                    <a:rPr lang="ar-AE" sz="975">
+                                      <a:latin typeface="Cambria Math" panose="02040503050406030204" pitchFamily="18" charset="0"/>
+                                    </a:rPr>
+                                    <m:t>𝑋</m:t>
+                                  </m:r>
+                                </m:sub>
+                              </m:sSub>
+                              <m:r>
+                                <a:rPr lang="ar-AE" sz="975">
+                                  <a:latin typeface="Cambria Math" panose="02040503050406030204" pitchFamily="18" charset="0"/>
+                                </a:rPr>
+                                <m:t>(1−</m:t>
+                              </m:r>
+                              <m:r>
+                                <a:rPr lang="ar-AE" sz="975">
+                                  <a:latin typeface="Cambria Math" panose="02040503050406030204" pitchFamily="18" charset="0"/>
+                                </a:rPr>
+                                <m:t>𝑎</m:t>
+                              </m:r>
+                              <m:r>
+                                <a:rPr lang="ar-AE" sz="975">
+                                  <a:latin typeface="Cambria Math" panose="02040503050406030204" pitchFamily="18" charset="0"/>
+                                </a:rPr>
+                                <m:t>)</m:t>
+                              </m:r>
+                            </m:den>
+                          </m:f>
+                        </m:oMath>
+                      </m:oMathPara>
+                    </a14:m>
+                    <a:endParaRPr lang="en-US" sz="975" dirty="0"/>
+                  </a:p>
+                </p:txBody>
+              </p:sp>
+            </mc:Choice>
+            <mc:Fallback xmlns="">
+              <p:sp>
+                <p:nvSpPr>
+                  <p:cNvPr id="5" name="Rectangle 4">
+                    <a:extLst>
+                      <a:ext uri="{FF2B5EF4-FFF2-40B4-BE49-F238E27FC236}">
+                        <a16:creationId xmlns:a16="http://schemas.microsoft.com/office/drawing/2014/main" id="{FAF41DE5-820C-514A-964A-465E1F99AF43}"/>
+                      </a:ext>
+                    </a:extLst>
+                  </p:cNvPr>
+                  <p:cNvSpPr>
+                    <a:spLocks noRot="1" noChangeAspect="1" noMove="1" noResize="1" noEditPoints="1" noAdjustHandles="1" noChangeArrowheads="1" noChangeShapeType="1" noTextEdit="1"/>
+                  </p:cNvSpPr>
+                  <p:nvPr/>
+                </p:nvSpPr>
+                <p:spPr>
+                  <a:xfrm>
+                    <a:off x="2233978" y="1508637"/>
+                    <a:ext cx="1997868" cy="509254"/>
+                  </a:xfrm>
+                  <a:prstGeom prst="rect">
+                    <a:avLst/>
+                  </a:prstGeom>
+                  <a:blipFill>
+                    <a:blip r:embed="rId4"/>
+                    <a:stretch>
+                      <a:fillRect/>
+                    </a:stretch>
+                  </a:blipFill>
+                </p:spPr>
+                <p:txBody>
+                  <a:bodyPr/>
+                  <a:lstStyle/>
+                  <a:p>
+                    <a:r>
+                      <a:rPr lang="en-US">
+                        <a:noFill/>
+                      </a:rPr>
+                      <a:t> </a:t>
+                    </a:r>
+                  </a:p>
+                </p:txBody>
+              </p:sp>
+            </mc:Fallback>
+          </mc:AlternateContent>
+          <p:sp>
+            <p:nvSpPr>
+              <p:cNvPr id="13" name="Rounded Rectangle 12">
+                <a:extLst>
+                  <a:ext uri="{FF2B5EF4-FFF2-40B4-BE49-F238E27FC236}">
+                    <a16:creationId xmlns:a16="http://schemas.microsoft.com/office/drawing/2014/main" id="{9A48231A-EE8A-3441-A88C-43A0B143E614}"/>
+                  </a:ext>
+                </a:extLst>
+              </p:cNvPr>
+              <p:cNvSpPr/>
+              <p:nvPr/>
+            </p:nvSpPr>
+            <p:spPr>
+              <a:xfrm>
+                <a:off x="3369621" y="1776341"/>
+                <a:ext cx="166977" cy="198229"/>
+              </a:xfrm>
+              <a:prstGeom prst="roundRect">
+                <a:avLst/>
+              </a:prstGeom>
+              <a:noFill/>
+              <a:ln>
+                <a:solidFill>
+                  <a:srgbClr val="FF0000"/>
+                </a:solidFill>
+              </a:ln>
+            </p:spPr>
+            <p:style>
+              <a:lnRef idx="2">
+                <a:schemeClr val="accent1">
+                  <a:shade val="50000"/>
+                </a:schemeClr>
+              </a:lnRef>
+              <a:fillRef idx="1">
+                <a:schemeClr val="accent1"/>
+              </a:fillRef>
+              <a:effectRef idx="0">
+                <a:schemeClr val="accent1"/>
+              </a:effectRef>
+              <a:fontRef idx="minor">
+                <a:schemeClr val="lt1"/>
+              </a:fontRef>
+            </p:style>
+            <p:txBody>
+              <a:bodyPr rtlCol="0" anchor="ctr"/>
+              <a:lstStyle/>
+              <a:p>
+                <a:pPr algn="ctr"/>
+                <a:endParaRPr lang="en-US" sz="1463"/>
+              </a:p>
+            </p:txBody>
+          </p:sp>
+        </p:grpSp>
+        <p:cxnSp>
+          <p:nvCxnSpPr>
+            <p:cNvPr id="5" name="Straight Connector 4">
+              <a:extLst>
+                <a:ext uri="{FF2B5EF4-FFF2-40B4-BE49-F238E27FC236}">
+                  <a16:creationId xmlns:a16="http://schemas.microsoft.com/office/drawing/2014/main" id="{4D7B527C-2E77-3745-9959-E979D6F57D43}"/>
+                </a:ext>
+              </a:extLst>
+            </p:cNvPr>
+            <p:cNvCxnSpPr>
+              <a:cxnSpLocks/>
+            </p:cNvCxnSpPr>
+            <p:nvPr/>
+          </p:nvCxnSpPr>
+          <p:spPr>
+            <a:xfrm>
+              <a:off x="4723389" y="1026558"/>
+              <a:ext cx="0" cy="163506"/>
+            </a:xfrm>
+            <a:prstGeom prst="line">
+              <a:avLst/>
+            </a:prstGeom>
+            <a:ln w="12700">
+              <a:solidFill>
+                <a:schemeClr val="tx1">
+                  <a:lumMod val="50000"/>
+                  <a:lumOff val="50000"/>
+                </a:schemeClr>
+              </a:solidFill>
+            </a:ln>
+          </p:spPr>
+          <p:style>
+            <a:lnRef idx="1">
+              <a:schemeClr val="accent1"/>
+            </a:lnRef>
+            <a:fillRef idx="0">
+              <a:schemeClr val="accent1"/>
+            </a:fillRef>
+            <a:effectRef idx="0">
+              <a:schemeClr val="accent1"/>
+            </a:effectRef>
+            <a:fontRef idx="minor">
+              <a:schemeClr val="tx1"/>
+            </a:fontRef>
+          </p:style>
+        </p:cxnSp>
+        <mc:AlternateContent xmlns:mc="http://schemas.openxmlformats.org/markup-compatibility/2006" xmlns:a14="http://schemas.microsoft.com/office/drawing/2010/main">
+          <mc:Choice Requires="a14">
+            <p:sp>
+              <p:nvSpPr>
+                <p:cNvPr id="6" name="Rectangle 5">
+                  <a:extLst>
+                    <a:ext uri="{FF2B5EF4-FFF2-40B4-BE49-F238E27FC236}">
+                      <a16:creationId xmlns:a16="http://schemas.microsoft.com/office/drawing/2014/main" id="{078E68AA-B5E7-164A-98AE-06FEF9DC2005}"/>
+                    </a:ext>
+                  </a:extLst>
+                </p:cNvPr>
+                <p:cNvSpPr/>
+                <p:nvPr/>
+              </p:nvSpPr>
+              <p:spPr>
+                <a:xfrm>
+                  <a:off x="3819713" y="1426976"/>
+                  <a:ext cx="1123801" cy="375547"/>
+                </a:xfrm>
+                <a:prstGeom prst="rect">
+                  <a:avLst/>
+                </a:prstGeom>
+              </p:spPr>
+              <p:txBody>
+                <a:bodyPr wrap="square">
+                  <a:spAutoFit/>
+                </a:bodyPr>
+                <a:lstStyle/>
+                <a:p>
+                  <a:pPr/>
+                  <a14:m>
+                    <m:oMathPara xmlns:m="http://schemas.openxmlformats.org/officeDocument/2006/math">
+                      <m:oMathParaPr>
+                        <m:jc m:val="centerGroup"/>
+                      </m:oMathParaPr>
+                      <m:oMath xmlns:m="http://schemas.openxmlformats.org/officeDocument/2006/math">
+                        <m:sSub>
+                          <m:sSubPr>
+                            <m:ctrlPr>
+                              <a:rPr lang="ar-AE" sz="975" i="1">
+                                <a:latin typeface="Cambria Math" panose="02040503050406030204" pitchFamily="18" charset="0"/>
+                              </a:rPr>
+                            </m:ctrlPr>
+                          </m:sSubPr>
+                          <m:e>
+                            <m:r>
+                              <a:rPr lang="ar-AE" sz="975">
+                                <a:latin typeface="Cambria Math" panose="02040503050406030204" pitchFamily="18" charset="0"/>
+                              </a:rPr>
+                              <m:t>𝑓</m:t>
+                            </m:r>
+                          </m:e>
+                          <m:sub>
+                            <m:r>
+                              <a:rPr lang="ar-AE" sz="975">
+                                <a:latin typeface="Cambria Math" panose="02040503050406030204" pitchFamily="18" charset="0"/>
+                              </a:rPr>
+                              <m:t>𝑋</m:t>
+                            </m:r>
+                          </m:sub>
+                        </m:sSub>
+                        <m:r>
+                          <a:rPr lang="en-GB" sz="975" i="1">
+                            <a:latin typeface="Cambria Math" panose="02040503050406030204" pitchFamily="18" charset="0"/>
+                          </a:rPr>
+                          <m:t>=</m:t>
+                        </m:r>
+                        <m:r>
+                          <a:rPr lang="en-GB" sz="975" i="1">
+                            <a:latin typeface="Cambria Math" panose="02040503050406030204" pitchFamily="18" charset="0"/>
+                          </a:rPr>
+                          <m:t>𝑓</m:t>
+                        </m:r>
+                        <m:d>
+                          <m:dPr>
+                            <m:ctrlPr>
+                              <a:rPr lang="en-GB" sz="975" i="1">
+                                <a:latin typeface="Cambria Math" panose="02040503050406030204" pitchFamily="18" charset="0"/>
+                              </a:rPr>
+                            </m:ctrlPr>
+                          </m:dPr>
+                          <m:e>
+                            <m:r>
+                              <a:rPr lang="en-GB" sz="975" i="1">
+                                <a:latin typeface="Cambria Math" panose="02040503050406030204" pitchFamily="18" charset="0"/>
+                              </a:rPr>
+                              <m:t>𝑒</m:t>
+                            </m:r>
+                          </m:e>
+                        </m:d>
+                        <m:r>
+                          <a:rPr lang="en-GB" sz="975" i="1">
+                            <a:latin typeface="Cambria Math" panose="02040503050406030204" pitchFamily="18" charset="0"/>
+                          </a:rPr>
+                          <m:t> ?</m:t>
+                        </m:r>
+                      </m:oMath>
+                    </m:oMathPara>
+                  </a14:m>
+                  <a:endParaRPr lang="en-GB" sz="975" i="1" dirty="0">
+                    <a:latin typeface="Cambria Math" panose="02040503050406030204" pitchFamily="18" charset="0"/>
+                  </a:endParaRPr>
+                </a:p>
+                <a:p>
+                  <a:pPr/>
+                  <a14:m>
+                    <m:oMathPara xmlns:m="http://schemas.openxmlformats.org/officeDocument/2006/math">
+                      <m:oMathParaPr>
+                        <m:jc m:val="centerGroup"/>
+                      </m:oMathParaPr>
+                      <m:oMath xmlns:m="http://schemas.openxmlformats.org/officeDocument/2006/math">
+                        <m:sSub>
+                          <m:sSubPr>
+                            <m:ctrlPr>
+                              <a:rPr lang="ar-AE" sz="975" i="1">
+                                <a:latin typeface="Cambria Math" panose="02040503050406030204" pitchFamily="18" charset="0"/>
+                              </a:rPr>
+                            </m:ctrlPr>
+                          </m:sSubPr>
+                          <m:e>
+                            <m:r>
+                              <a:rPr lang="ar-AE" sz="975">
+                                <a:latin typeface="Cambria Math" panose="02040503050406030204" pitchFamily="18" charset="0"/>
+                              </a:rPr>
+                              <m:t>𝑓</m:t>
+                            </m:r>
+                          </m:e>
+                          <m:sub>
+                            <m:r>
+                              <a:rPr lang="ar-AE" sz="975">
+                                <a:latin typeface="Cambria Math" panose="02040503050406030204" pitchFamily="18" charset="0"/>
+                              </a:rPr>
+                              <m:t>𝑋</m:t>
+                            </m:r>
+                          </m:sub>
+                        </m:sSub>
+                        <m:r>
+                          <a:rPr lang="en-GB" sz="975" i="1">
+                            <a:latin typeface="Cambria Math" panose="02040503050406030204" pitchFamily="18" charset="0"/>
+                          </a:rPr>
+                          <m:t>=</m:t>
+                        </m:r>
+                        <m:r>
+                          <a:rPr lang="en-GB" sz="975" i="1">
+                            <a:latin typeface="Cambria Math" panose="02040503050406030204" pitchFamily="18" charset="0"/>
+                          </a:rPr>
+                          <m:t>𝑓</m:t>
+                        </m:r>
+                        <m:d>
+                          <m:dPr>
+                            <m:ctrlPr>
+                              <a:rPr lang="en-GB" sz="975" i="1">
+                                <a:latin typeface="Cambria Math" panose="02040503050406030204" pitchFamily="18" charset="0"/>
+                              </a:rPr>
+                            </m:ctrlPr>
+                          </m:dPr>
+                          <m:e>
+                            <m:r>
+                              <a:rPr lang="en-GB" sz="975" i="1">
+                                <a:latin typeface="Cambria Math" panose="02040503050406030204" pitchFamily="18" charset="0"/>
+                              </a:rPr>
+                              <m:t>𝑟</m:t>
+                            </m:r>
+                          </m:e>
+                        </m:d>
+                        <m:r>
+                          <a:rPr lang="en-GB" sz="975" i="1">
+                            <a:latin typeface="Cambria Math" panose="02040503050406030204" pitchFamily="18" charset="0"/>
+                          </a:rPr>
+                          <m:t> ?</m:t>
+                        </m:r>
+                      </m:oMath>
+                    </m:oMathPara>
+                  </a14:m>
+                  <a:endParaRPr lang="en-GB" sz="975" i="1" dirty="0">
+                    <a:latin typeface="Cambria Math" panose="02040503050406030204" pitchFamily="18" charset="0"/>
+                  </a:endParaRPr>
+                </a:p>
+                <a:p>
+                  <a:pPr algn="ctr"/>
+                  <a:r>
+                    <a:rPr lang="en-GB" sz="975" i="1" dirty="0">
+                      <a:latin typeface="Cambria Math" panose="02040503050406030204" pitchFamily="18" charset="0"/>
+                    </a:rPr>
+                    <a:t>…</a:t>
+                  </a:r>
+                </a:p>
+              </p:txBody>
+            </p:sp>
+          </mc:Choice>
+          <mc:Fallback xmlns="">
+            <p:sp>
+              <p:nvSpPr>
+                <p:cNvPr id="9" name="Rectangle 8">
+                  <a:extLst>
+                    <a:ext uri="{FF2B5EF4-FFF2-40B4-BE49-F238E27FC236}">
+                      <a16:creationId xmlns:a16="http://schemas.microsoft.com/office/drawing/2014/main" id="{BBFEA59C-8967-CB48-B2B5-5A7EA7E6A951}"/>
+                    </a:ext>
+                  </a:extLst>
+                </p:cNvPr>
+                <p:cNvSpPr>
+                  <a:spLocks noRot="1" noChangeAspect="1" noMove="1" noResize="1" noEditPoints="1" noAdjustHandles="1" noChangeArrowheads="1" noChangeShapeType="1" noTextEdit="1"/>
+                </p:cNvSpPr>
+                <p:nvPr/>
+              </p:nvSpPr>
+              <p:spPr>
+                <a:xfrm>
+                  <a:off x="3819713" y="1426976"/>
+                  <a:ext cx="1123801" cy="375547"/>
+                </a:xfrm>
+                <a:prstGeom prst="rect">
+                  <a:avLst/>
+                </a:prstGeom>
+                <a:blipFill>
+                  <a:blip r:embed="rId5"/>
+                  <a:stretch>
+                    <a:fillRect b="-6977"/>
+                  </a:stretch>
+                </a:blipFill>
+              </p:spPr>
+              <p:txBody>
+                <a:bodyPr/>
+                <a:lstStyle/>
+                <a:p>
+                  <a:r>
+                    <a:rPr lang="en-US">
+                      <a:noFill/>
+                    </a:rPr>
+                    <a:t> </a:t>
+                  </a:r>
+                </a:p>
+              </p:txBody>
+            </p:sp>
+          </mc:Fallback>
+        </mc:AlternateContent>
+        <p:cxnSp>
+          <p:nvCxnSpPr>
+            <p:cNvPr id="7" name="Straight Connector 6">
+              <a:extLst>
+                <a:ext uri="{FF2B5EF4-FFF2-40B4-BE49-F238E27FC236}">
+                  <a16:creationId xmlns:a16="http://schemas.microsoft.com/office/drawing/2014/main" id="{CEBCC7F6-052F-3A4D-999D-979C96F01D44}"/>
+                </a:ext>
+              </a:extLst>
+            </p:cNvPr>
+            <p:cNvCxnSpPr>
+              <a:cxnSpLocks/>
+            </p:cNvCxnSpPr>
+            <p:nvPr/>
+          </p:nvCxnSpPr>
+          <p:spPr>
+            <a:xfrm>
+              <a:off x="4723389" y="1183340"/>
+              <a:ext cx="152400" cy="152400"/>
+            </a:xfrm>
+            <a:prstGeom prst="line">
+              <a:avLst/>
+            </a:prstGeom>
+            <a:ln w="12700">
+              <a:solidFill>
+                <a:schemeClr val="tx1">
+                  <a:lumMod val="50000"/>
+                  <a:lumOff val="50000"/>
+                </a:schemeClr>
+              </a:solidFill>
+            </a:ln>
+          </p:spPr>
+          <p:style>
+            <a:lnRef idx="1">
+              <a:schemeClr val="accent1"/>
+            </a:lnRef>
+            <a:fillRef idx="0">
+              <a:schemeClr val="accent1"/>
+            </a:fillRef>
+            <a:effectRef idx="0">
+              <a:schemeClr val="accent1"/>
+            </a:effectRef>
+            <a:fontRef idx="minor">
+              <a:schemeClr val="tx1"/>
+            </a:fontRef>
+          </p:style>
+        </p:cxnSp>
+        <p:cxnSp>
+          <p:nvCxnSpPr>
+            <p:cNvPr id="8" name="Straight Connector 7">
+              <a:extLst>
+                <a:ext uri="{FF2B5EF4-FFF2-40B4-BE49-F238E27FC236}">
+                  <a16:creationId xmlns:a16="http://schemas.microsoft.com/office/drawing/2014/main" id="{2E125432-D0F8-DA4E-8EF1-0FB78226183A}"/>
+                </a:ext>
+              </a:extLst>
+            </p:cNvPr>
+            <p:cNvCxnSpPr>
+              <a:cxnSpLocks/>
+            </p:cNvCxnSpPr>
+            <p:nvPr/>
+          </p:nvCxnSpPr>
+          <p:spPr>
+            <a:xfrm flipV="1">
+              <a:off x="4570990" y="1190064"/>
+              <a:ext cx="152398" cy="137026"/>
+            </a:xfrm>
+            <a:prstGeom prst="line">
+              <a:avLst/>
+            </a:prstGeom>
+            <a:ln w="12700">
+              <a:solidFill>
+                <a:schemeClr val="tx1">
+                  <a:lumMod val="50000"/>
+                  <a:lumOff val="50000"/>
+                </a:schemeClr>
+              </a:solidFill>
+            </a:ln>
+          </p:spPr>
+          <p:style>
+            <a:lnRef idx="1">
+              <a:schemeClr val="accent1"/>
+            </a:lnRef>
+            <a:fillRef idx="0">
+              <a:schemeClr val="accent1"/>
+            </a:fillRef>
+            <a:effectRef idx="0">
+              <a:schemeClr val="accent1"/>
+            </a:effectRef>
+            <a:fontRef idx="minor">
+              <a:schemeClr val="tx1"/>
+            </a:fontRef>
+          </p:style>
+        </p:cxnSp>
+        <mc:AlternateContent xmlns:mc="http://schemas.openxmlformats.org/markup-compatibility/2006" xmlns:a14="http://schemas.microsoft.com/office/drawing/2010/main">
+          <mc:Choice Requires="a14">
+            <p:sp>
+              <p:nvSpPr>
+                <p:cNvPr id="9" name="Rectangle 8">
+                  <a:extLst>
+                    <a:ext uri="{FF2B5EF4-FFF2-40B4-BE49-F238E27FC236}">
+                      <a16:creationId xmlns:a16="http://schemas.microsoft.com/office/drawing/2014/main" id="{E010211B-572D-D943-89CF-BA10E7F4ED7E}"/>
+                    </a:ext>
+                  </a:extLst>
+                </p:cNvPr>
+                <p:cNvSpPr/>
+                <p:nvPr/>
+              </p:nvSpPr>
+              <p:spPr>
+                <a:xfrm>
+                  <a:off x="4677659" y="1419894"/>
+                  <a:ext cx="929973" cy="377811"/>
+                </a:xfrm>
+                <a:prstGeom prst="rect">
+                  <a:avLst/>
+                </a:prstGeom>
+              </p:spPr>
+              <p:txBody>
+                <a:bodyPr wrap="square">
+                  <a:spAutoFit/>
+                </a:bodyPr>
+                <a:lstStyle/>
+                <a:p>
+                  <a:pPr/>
+                  <a14:m>
+                    <m:oMathPara xmlns:m="http://schemas.openxmlformats.org/officeDocument/2006/math">
+                      <m:oMathParaPr>
+                        <m:jc m:val="centerGroup"/>
+                      </m:oMathParaPr>
+                      <m:oMath xmlns:m="http://schemas.openxmlformats.org/officeDocument/2006/math">
+                        <m:sSub>
+                          <m:sSubPr>
+                            <m:ctrlPr>
+                              <a:rPr lang="ar-AE" sz="982" i="1">
+                                <a:latin typeface="Cambria Math" panose="02040503050406030204" pitchFamily="18" charset="0"/>
+                              </a:rPr>
+                            </m:ctrlPr>
+                          </m:sSubPr>
+                          <m:e>
+                            <m:r>
+                              <a:rPr lang="ar-AE" sz="982">
+                                <a:latin typeface="Cambria Math" panose="02040503050406030204" pitchFamily="18" charset="0"/>
+                              </a:rPr>
+                              <m:t>𝑓</m:t>
+                            </m:r>
+                          </m:e>
+                          <m:sub>
+                            <m:r>
+                              <a:rPr lang="ar-AE" sz="982">
+                                <a:latin typeface="Cambria Math" panose="02040503050406030204" pitchFamily="18" charset="0"/>
+                              </a:rPr>
+                              <m:t>𝑋</m:t>
+                            </m:r>
+                          </m:sub>
+                        </m:sSub>
+                        <m:r>
+                          <a:rPr lang="en-GB" sz="982" i="1">
+                            <a:latin typeface="Cambria Math" panose="02040503050406030204" pitchFamily="18" charset="0"/>
+                          </a:rPr>
+                          <m:t>=</m:t>
+                        </m:r>
+                        <m:r>
+                          <a:rPr lang="en-GB" sz="982" i="1">
+                            <a:latin typeface="Cambria Math" panose="02040503050406030204" pitchFamily="18" charset="0"/>
+                          </a:rPr>
+                          <m:t>𝑓</m:t>
+                        </m:r>
+                        <m:d>
+                          <m:dPr>
+                            <m:ctrlPr>
+                              <a:rPr lang="en-GB" sz="982" i="1">
+                                <a:latin typeface="Cambria Math" panose="02040503050406030204" pitchFamily="18" charset="0"/>
+                              </a:rPr>
+                            </m:ctrlPr>
+                          </m:dPr>
+                          <m:e>
+                            <m:r>
+                              <a:rPr lang="en-GB" sz="982" i="1">
+                                <a:latin typeface="Cambria Math" panose="02040503050406030204" pitchFamily="18" charset="0"/>
+                              </a:rPr>
+                              <m:t>𝑒</m:t>
+                            </m:r>
+                            <m:r>
+                              <a:rPr lang="en-GB" sz="982" i="1">
+                                <a:latin typeface="Cambria Math" panose="02040503050406030204" pitchFamily="18" charset="0"/>
+                              </a:rPr>
+                              <m:t>,</m:t>
+                            </m:r>
+                            <m:r>
+                              <a:rPr lang="en-GB" sz="982" i="1">
+                                <a:latin typeface="Cambria Math" panose="02040503050406030204" pitchFamily="18" charset="0"/>
+                              </a:rPr>
+                              <m:t>𝑟</m:t>
+                            </m:r>
+                          </m:e>
+                        </m:d>
+                        <m:r>
+                          <a:rPr lang="en-GB" sz="982" i="1">
+                            <a:latin typeface="Cambria Math" panose="02040503050406030204" pitchFamily="18" charset="0"/>
+                          </a:rPr>
+                          <m:t> ?</m:t>
+                        </m:r>
+                      </m:oMath>
+                    </m:oMathPara>
+                  </a14:m>
+                  <a:endParaRPr lang="en-GB" sz="982" i="1" dirty="0">
+                    <a:latin typeface="Cambria Math" panose="02040503050406030204" pitchFamily="18" charset="0"/>
+                  </a:endParaRPr>
+                </a:p>
+                <a:p>
+                  <a:pPr/>
+                  <a14:m>
+                    <m:oMathPara xmlns:m="http://schemas.openxmlformats.org/officeDocument/2006/math">
+                      <m:oMathParaPr>
+                        <m:jc m:val="centerGroup"/>
+                      </m:oMathParaPr>
+                      <m:oMath xmlns:m="http://schemas.openxmlformats.org/officeDocument/2006/math">
+                        <m:sSub>
+                          <m:sSubPr>
+                            <m:ctrlPr>
+                              <a:rPr lang="ar-AE" sz="982" i="1">
+                                <a:latin typeface="Cambria Math" panose="02040503050406030204" pitchFamily="18" charset="0"/>
+                              </a:rPr>
+                            </m:ctrlPr>
+                          </m:sSubPr>
+                          <m:e>
+                            <m:r>
+                              <a:rPr lang="ar-AE" sz="982">
+                                <a:latin typeface="Cambria Math" panose="02040503050406030204" pitchFamily="18" charset="0"/>
+                              </a:rPr>
+                              <m:t>𝑓</m:t>
+                            </m:r>
+                          </m:e>
+                          <m:sub>
+                            <m:r>
+                              <a:rPr lang="ar-AE" sz="982">
+                                <a:latin typeface="Cambria Math" panose="02040503050406030204" pitchFamily="18" charset="0"/>
+                              </a:rPr>
+                              <m:t>𝑋</m:t>
+                            </m:r>
+                          </m:sub>
+                        </m:sSub>
+                        <m:r>
+                          <a:rPr lang="en-GB" sz="982" i="1">
+                            <a:latin typeface="Cambria Math" panose="02040503050406030204" pitchFamily="18" charset="0"/>
+                          </a:rPr>
+                          <m:t>=</m:t>
+                        </m:r>
+                        <m:r>
+                          <a:rPr lang="en-GB" sz="982" i="1">
+                            <a:latin typeface="Cambria Math" panose="02040503050406030204" pitchFamily="18" charset="0"/>
+                          </a:rPr>
+                          <m:t>𝑓</m:t>
+                        </m:r>
+                        <m:d>
+                          <m:dPr>
+                            <m:ctrlPr>
+                              <a:rPr lang="en-GB" sz="982" i="1">
+                                <a:latin typeface="Cambria Math" panose="02040503050406030204" pitchFamily="18" charset="0"/>
+                              </a:rPr>
+                            </m:ctrlPr>
+                          </m:dPr>
+                          <m:e>
+                            <m:r>
+                              <a:rPr lang="en-GB" sz="982" i="1">
+                                <a:latin typeface="Cambria Math" panose="02040503050406030204" pitchFamily="18" charset="0"/>
+                              </a:rPr>
+                              <m:t>𝑒</m:t>
+                            </m:r>
+                            <m:r>
+                              <a:rPr lang="en-GB" sz="982" i="1">
+                                <a:latin typeface="Cambria Math" panose="02040503050406030204" pitchFamily="18" charset="0"/>
+                              </a:rPr>
+                              <m:t>,</m:t>
+                            </m:r>
+                            <m:sSub>
+                              <m:sSubPr>
+                                <m:ctrlPr>
+                                  <a:rPr lang="en-GB" sz="982" i="1">
+                                    <a:latin typeface="Cambria Math" panose="02040503050406030204" pitchFamily="18" charset="0"/>
+                                  </a:rPr>
+                                </m:ctrlPr>
+                              </m:sSubPr>
+                              <m:e>
+                                <m:r>
+                                  <a:rPr lang="en-GB" sz="982" i="1">
+                                    <a:latin typeface="Cambria Math" panose="02040503050406030204" pitchFamily="18" charset="0"/>
+                                  </a:rPr>
+                                  <m:t>𝑟</m:t>
+                                </m:r>
+                              </m:e>
+                              <m:sub>
+                                <m:r>
+                                  <a:rPr lang="en-GB" sz="982" i="1">
+                                    <a:latin typeface="Cambria Math" panose="02040503050406030204" pitchFamily="18" charset="0"/>
+                                  </a:rPr>
+                                  <m:t>𝑎</m:t>
+                                </m:r>
+                              </m:sub>
+                            </m:sSub>
+                          </m:e>
+                        </m:d>
+                        <m:r>
+                          <a:rPr lang="en-GB" sz="982" i="1">
+                            <a:latin typeface="Cambria Math" panose="02040503050406030204" pitchFamily="18" charset="0"/>
+                          </a:rPr>
+                          <m:t> ?</m:t>
+                        </m:r>
+                      </m:oMath>
+                    </m:oMathPara>
+                  </a14:m>
+                  <a:endParaRPr lang="en-GB" sz="982" i="1" dirty="0">
+                    <a:latin typeface="Cambria Math" panose="02040503050406030204" pitchFamily="18" charset="0"/>
+                  </a:endParaRPr>
+                </a:p>
+                <a:p>
+                  <a:pPr algn="ctr"/>
+                  <a:r>
+                    <a:rPr lang="en-GB" sz="982" i="1" dirty="0">
+                      <a:latin typeface="Cambria Math" panose="02040503050406030204" pitchFamily="18" charset="0"/>
+                    </a:rPr>
+                    <a:t>…</a:t>
+                  </a:r>
+                </a:p>
+              </p:txBody>
+            </p:sp>
+          </mc:Choice>
+          <mc:Fallback xmlns="">
+            <p:sp>
+              <p:nvSpPr>
+                <p:cNvPr id="26" name="Rectangle 25">
+                  <a:extLst>
+                    <a:ext uri="{FF2B5EF4-FFF2-40B4-BE49-F238E27FC236}">
+                      <a16:creationId xmlns:a16="http://schemas.microsoft.com/office/drawing/2014/main" id="{FBFC93C4-424F-AD45-8FE1-389A9D093FD9}"/>
+                    </a:ext>
+                  </a:extLst>
+                </p:cNvPr>
+                <p:cNvSpPr>
+                  <a:spLocks noRot="1" noChangeAspect="1" noMove="1" noResize="1" noEditPoints="1" noAdjustHandles="1" noChangeArrowheads="1" noChangeShapeType="1" noTextEdit="1"/>
+                </p:cNvSpPr>
+                <p:nvPr/>
+              </p:nvSpPr>
+              <p:spPr>
+                <a:xfrm>
+                  <a:off x="4677659" y="1419894"/>
+                  <a:ext cx="929973" cy="377811"/>
+                </a:xfrm>
+                <a:prstGeom prst="rect">
+                  <a:avLst/>
+                </a:prstGeom>
+                <a:blipFill>
+                  <a:blip r:embed="rId6"/>
+                  <a:stretch>
+                    <a:fillRect b="-6818"/>
+                  </a:stretch>
+                </a:blipFill>
+              </p:spPr>
+              <p:txBody>
+                <a:bodyPr/>
+                <a:lstStyle/>
+                <a:p>
+                  <a:r>
+                    <a:rPr lang="en-US">
+                      <a:noFill/>
+                    </a:rPr>
+                    <a:t> </a:t>
+                  </a:r>
+                </a:p>
+              </p:txBody>
+            </p:sp>
+          </mc:Fallback>
+        </mc:AlternateContent>
+        <p:sp>
+          <p:nvSpPr>
+            <p:cNvPr id="10" name="TextBox 9">
+              <a:extLst>
+                <a:ext uri="{FF2B5EF4-FFF2-40B4-BE49-F238E27FC236}">
+                  <a16:creationId xmlns:a16="http://schemas.microsoft.com/office/drawing/2014/main" id="{13346BFA-9804-DA46-B640-D5C0927253EB}"/>
+                </a:ext>
+              </a:extLst>
+            </p:cNvPr>
+            <p:cNvSpPr txBox="1"/>
+            <p:nvPr/>
+          </p:nvSpPr>
+          <p:spPr>
+            <a:xfrm>
+              <a:off x="4089603" y="1261262"/>
+              <a:ext cx="553206" cy="171615"/>
+            </a:xfrm>
+            <a:prstGeom prst="rect">
+              <a:avLst/>
+            </a:prstGeom>
+            <a:noFill/>
+          </p:spPr>
+          <p:txBody>
+            <a:bodyPr wrap="square" rtlCol="0">
+              <a:spAutoFit/>
+            </a:bodyPr>
+            <a:lstStyle/>
+            <a:p>
+              <a:pPr algn="ctr"/>
+              <a:r>
+                <a:rPr lang="en-US" sz="1011" dirty="0"/>
+                <a:t>1 sector</a:t>
+              </a:r>
+            </a:p>
+          </p:txBody>
+        </p:sp>
+        <p:sp>
+          <p:nvSpPr>
+            <p:cNvPr id="11" name="TextBox 10">
+              <a:extLst>
+                <a:ext uri="{FF2B5EF4-FFF2-40B4-BE49-F238E27FC236}">
+                  <a16:creationId xmlns:a16="http://schemas.microsoft.com/office/drawing/2014/main" id="{81296C18-3549-4D41-985E-714F3381AB09}"/>
+                </a:ext>
+              </a:extLst>
+            </p:cNvPr>
+            <p:cNvSpPr txBox="1"/>
+            <p:nvPr/>
+          </p:nvSpPr>
+          <p:spPr>
+            <a:xfrm>
+              <a:off x="4829059" y="1262167"/>
+              <a:ext cx="550477" cy="171615"/>
+            </a:xfrm>
+            <a:prstGeom prst="rect">
+              <a:avLst/>
+            </a:prstGeom>
+            <a:noFill/>
+          </p:spPr>
+          <p:txBody>
+            <a:bodyPr wrap="square" rtlCol="0">
+              <a:spAutoFit/>
+            </a:bodyPr>
+            <a:lstStyle/>
+            <a:p>
+              <a:pPr algn="ctr"/>
+              <a:r>
+                <a:rPr lang="en-US" sz="1011" dirty="0"/>
+                <a:t>2 sectors</a:t>
+              </a:r>
+            </a:p>
+          </p:txBody>
+        </p:sp>
+      </p:grpSp>
+      <p:pic>
+        <p:nvPicPr>
+          <p:cNvPr id="18" name="Picture 17">
+            <a:extLst>
+              <a:ext uri="{FF2B5EF4-FFF2-40B4-BE49-F238E27FC236}">
+                <a16:creationId xmlns:a16="http://schemas.microsoft.com/office/drawing/2014/main" id="{A915B258-2555-3F4C-880C-405FFCB626CA}"/>
+              </a:ext>
+            </a:extLst>
+          </p:cNvPr>
+          <p:cNvPicPr>
+            <a:picLocks noChangeAspect="1"/>
+          </p:cNvPicPr>
+          <p:nvPr/>
+        </p:nvPicPr>
+        <p:blipFill>
+          <a:blip r:embed="rId7"/>
+          <a:stretch>
+            <a:fillRect/>
+          </a:stretch>
+        </p:blipFill>
+        <p:spPr>
+          <a:xfrm>
+            <a:off x="5708575" y="476779"/>
+            <a:ext cx="2210874" cy="1989384"/>
+          </a:xfrm>
+          <a:prstGeom prst="rect">
+            <a:avLst/>
+          </a:prstGeom>
+        </p:spPr>
+      </p:pic>
+      <p:pic>
+        <p:nvPicPr>
+          <p:cNvPr id="20" name="Picture 19">
+            <a:extLst>
+              <a:ext uri="{FF2B5EF4-FFF2-40B4-BE49-F238E27FC236}">
+                <a16:creationId xmlns:a16="http://schemas.microsoft.com/office/drawing/2014/main" id="{36A56CB9-F8C2-5E47-A031-9B6BEA89C96F}"/>
+              </a:ext>
+            </a:extLst>
+          </p:cNvPr>
+          <p:cNvPicPr>
+            <a:picLocks noChangeAspect="1"/>
+          </p:cNvPicPr>
+          <p:nvPr/>
+        </p:nvPicPr>
+        <p:blipFill>
+          <a:blip r:embed="rId8"/>
+          <a:stretch>
+            <a:fillRect/>
+          </a:stretch>
+        </p:blipFill>
+        <p:spPr>
+          <a:xfrm>
+            <a:off x="3318470" y="462652"/>
+            <a:ext cx="2216449" cy="1994400"/>
+          </a:xfrm>
+          <a:prstGeom prst="rect">
+            <a:avLst/>
+          </a:prstGeom>
+        </p:spPr>
+      </p:pic>
+      <p:pic>
+        <p:nvPicPr>
+          <p:cNvPr id="26" name="Picture 25">
+            <a:extLst>
+              <a:ext uri="{FF2B5EF4-FFF2-40B4-BE49-F238E27FC236}">
+                <a16:creationId xmlns:a16="http://schemas.microsoft.com/office/drawing/2014/main" id="{1214D10C-D3B7-074D-ACAE-40702D9A9CDA}"/>
+              </a:ext>
+            </a:extLst>
+          </p:cNvPr>
+          <p:cNvPicPr>
+            <a:picLocks noChangeAspect="1"/>
+          </p:cNvPicPr>
+          <p:nvPr/>
+        </p:nvPicPr>
+        <p:blipFill>
+          <a:blip r:embed="rId9"/>
+          <a:stretch>
+            <a:fillRect/>
+          </a:stretch>
+        </p:blipFill>
+        <p:spPr>
+          <a:xfrm>
+            <a:off x="5857210" y="2951534"/>
+            <a:ext cx="2000405" cy="1989384"/>
+          </a:xfrm>
+          <a:prstGeom prst="rect">
+            <a:avLst/>
+          </a:prstGeom>
+        </p:spPr>
+      </p:pic>
+      <p:pic>
+        <p:nvPicPr>
+          <p:cNvPr id="28" name="Picture 27">
+            <a:extLst>
+              <a:ext uri="{FF2B5EF4-FFF2-40B4-BE49-F238E27FC236}">
+                <a16:creationId xmlns:a16="http://schemas.microsoft.com/office/drawing/2014/main" id="{064DDE42-E2CF-2F42-A2DA-694DE7C340A6}"/>
+              </a:ext>
+            </a:extLst>
+          </p:cNvPr>
+          <p:cNvPicPr>
+            <a:picLocks noChangeAspect="1"/>
+          </p:cNvPicPr>
+          <p:nvPr/>
+        </p:nvPicPr>
+        <p:blipFill>
+          <a:blip r:embed="rId10"/>
+          <a:stretch>
+            <a:fillRect/>
+          </a:stretch>
+        </p:blipFill>
+        <p:spPr>
+          <a:xfrm>
+            <a:off x="1020666" y="2805230"/>
+            <a:ext cx="2004923" cy="2160000"/>
+          </a:xfrm>
+          <a:prstGeom prst="rect">
+            <a:avLst/>
+          </a:prstGeom>
+        </p:spPr>
+      </p:pic>
+      <p:pic>
+        <p:nvPicPr>
+          <p:cNvPr id="30" name="Picture 29">
+            <a:extLst>
+              <a:ext uri="{FF2B5EF4-FFF2-40B4-BE49-F238E27FC236}">
+                <a16:creationId xmlns:a16="http://schemas.microsoft.com/office/drawing/2014/main" id="{BB035F7B-BD00-CA4F-8964-C62DBB1EC5E5}"/>
+              </a:ext>
+            </a:extLst>
+          </p:cNvPr>
+          <p:cNvPicPr>
+            <a:picLocks noChangeAspect="1"/>
+          </p:cNvPicPr>
+          <p:nvPr/>
+        </p:nvPicPr>
+        <p:blipFill>
+          <a:blip r:embed="rId11"/>
+          <a:stretch>
+            <a:fillRect/>
+          </a:stretch>
+        </p:blipFill>
+        <p:spPr>
+          <a:xfrm>
+            <a:off x="3436473" y="2805230"/>
+            <a:ext cx="2004923" cy="2160000"/>
+          </a:xfrm>
+          <a:prstGeom prst="rect">
+            <a:avLst/>
+          </a:prstGeom>
+        </p:spPr>
+      </p:pic>
+    </p:spTree>
+    <p:extLst>
+      <p:ext uri="{BB962C8B-B14F-4D97-AF65-F5344CB8AC3E}">
+        <p14:creationId xmlns:p14="http://schemas.microsoft.com/office/powerpoint/2010/main" val="1706232303"/>
+      </p:ext>
+    </p:extLst>
+  </p:cSld>
+  <p:clrMapOvr>
+    <a:masterClrMapping/>
+  </p:clrMapOvr>
+</p:sld>
+</file>
+
+<file path=ppt/slides/slide3.xml><?xml version="1.0" encoding="utf-8"?>
+<p:sld xmlns:a="http://schemas.openxmlformats.org/drawingml/2006/main" xmlns:r="http://schemas.openxmlformats.org/officeDocument/2006/relationships" xmlns:p="http://schemas.openxmlformats.org/presentationml/2006/main">
+  <p:cSld>
+    <p:spTree>
+      <p:nvGrpSpPr>
+        <p:cNvPr id="1" name=""/>
+        <p:cNvGrpSpPr/>
+        <p:nvPr/>
+      </p:nvGrpSpPr>
+      <p:grpSpPr>
+        <a:xfrm>
+          <a:off x="0" y="0"/>
+          <a:ext cx="0" cy="0"/>
+          <a:chOff x="0" y="0"/>
+          <a:chExt cx="0" cy="0"/>
+        </a:xfrm>
+      </p:grpSpPr>
+      <p:sp>
+        <p:nvSpPr>
+          <p:cNvPr id="2" name="TextBox 1">
+            <a:extLst>
+              <a:ext uri="{FF2B5EF4-FFF2-40B4-BE49-F238E27FC236}">
+                <a16:creationId xmlns:a16="http://schemas.microsoft.com/office/drawing/2014/main" id="{0B7C7307-DE28-5B43-9C37-B804F1844236}"/>
+              </a:ext>
+            </a:extLst>
+          </p:cNvPr>
+          <p:cNvSpPr txBox="1"/>
+          <p:nvPr/>
+        </p:nvSpPr>
+        <p:spPr>
+          <a:xfrm>
+            <a:off x="542724" y="403776"/>
+            <a:ext cx="3018980" cy="369332"/>
+          </a:xfrm>
+          <a:prstGeom prst="rect">
+            <a:avLst/>
+          </a:prstGeom>
+          <a:noFill/>
+        </p:spPr>
+        <p:txBody>
+          <a:bodyPr wrap="square" rtlCol="0">
+            <a:spAutoFit/>
+          </a:bodyPr>
+          <a:lstStyle/>
+          <a:p>
+            <a:pPr algn="ctr"/>
+            <a:r>
+              <a:rPr lang="en-US" sz="900" dirty="0"/>
+              <a:t>Regulation of </a:t>
+            </a:r>
+            <a:r>
+              <a:rPr lang="en-US" sz="900" i="1" dirty="0"/>
+              <a:t>X </a:t>
+            </a:r>
+            <a:r>
+              <a:rPr lang="en-US" sz="900" dirty="0"/>
+              <a:t>expression </a:t>
+            </a:r>
+          </a:p>
+          <a:p>
+            <a:pPr algn="ctr"/>
+            <a:r>
+              <a:rPr lang="en-US" sz="900" dirty="0"/>
+              <a:t>by  coarse-grained proteome sectors ? </a:t>
+            </a:r>
+            <a:endParaRPr lang="en-US" sz="900" i="1" dirty="0"/>
+          </a:p>
+        </p:txBody>
+      </p:sp>
+      <p:grpSp>
+        <p:nvGrpSpPr>
+          <p:cNvPr id="3" name="Group 2">
+            <a:extLst>
+              <a:ext uri="{FF2B5EF4-FFF2-40B4-BE49-F238E27FC236}">
+                <a16:creationId xmlns:a16="http://schemas.microsoft.com/office/drawing/2014/main" id="{2B125E49-DFF6-D145-BB57-74F0E088AC66}"/>
+              </a:ext>
+            </a:extLst>
+          </p:cNvPr>
+          <p:cNvGrpSpPr/>
+          <p:nvPr/>
+        </p:nvGrpSpPr>
+        <p:grpSpPr>
+          <a:xfrm>
+            <a:off x="744286" y="874714"/>
+            <a:ext cx="2582550" cy="1497280"/>
+            <a:chOff x="3819713" y="765944"/>
+            <a:chExt cx="1787919" cy="1036579"/>
+          </a:xfrm>
+        </p:grpSpPr>
+        <p:grpSp>
+          <p:nvGrpSpPr>
+            <p:cNvPr id="4" name="Group 3">
+              <a:extLst>
+                <a:ext uri="{FF2B5EF4-FFF2-40B4-BE49-F238E27FC236}">
+                  <a16:creationId xmlns:a16="http://schemas.microsoft.com/office/drawing/2014/main" id="{FA9E0486-59F0-D745-AA41-3A1D171609F7}"/>
+                </a:ext>
+              </a:extLst>
+            </p:cNvPr>
+            <p:cNvGrpSpPr/>
+            <p:nvPr/>
+          </p:nvGrpSpPr>
+          <p:grpSpPr>
+            <a:xfrm>
+              <a:off x="4037627" y="765944"/>
+              <a:ext cx="1123801" cy="286455"/>
+              <a:chOff x="2233978" y="1508637"/>
+              <a:chExt cx="1997868" cy="509254"/>
+            </a:xfrm>
+          </p:grpSpPr>
+          <mc:AlternateContent xmlns:mc="http://schemas.openxmlformats.org/markup-compatibility/2006" xmlns:a14="http://schemas.microsoft.com/office/drawing/2010/main">
+            <mc:Choice Requires="a14">
+              <p:sp>
+                <p:nvSpPr>
+                  <p:cNvPr id="12" name="Rectangle 11">
+                    <a:extLst>
+                      <a:ext uri="{FF2B5EF4-FFF2-40B4-BE49-F238E27FC236}">
+                        <a16:creationId xmlns:a16="http://schemas.microsoft.com/office/drawing/2014/main" id="{D6968C6D-2F86-A945-A7D1-900F9C99A29E}"/>
+                      </a:ext>
+                    </a:extLst>
+                  </p:cNvPr>
+                  <p:cNvSpPr/>
+                  <p:nvPr/>
+                </p:nvSpPr>
+                <p:spPr>
+                  <a:xfrm>
+                    <a:off x="2233978" y="1508637"/>
+                    <a:ext cx="1997868" cy="509254"/>
+                  </a:xfrm>
+                  <a:prstGeom prst="rect">
+                    <a:avLst/>
+                  </a:prstGeom>
+                </p:spPr>
+                <p:txBody>
+                  <a:bodyPr wrap="square">
+                    <a:spAutoFit/>
+                  </a:bodyPr>
+                  <a:lstStyle/>
+                  <a:p>
+                    <a:pPr/>
+                    <a14:m>
+                      <m:oMathPara xmlns:m="http://schemas.openxmlformats.org/officeDocument/2006/math">
+                        <m:oMathParaPr>
+                          <m:jc m:val="centerGroup"/>
+                        </m:oMathParaPr>
+                        <m:oMath xmlns:m="http://schemas.openxmlformats.org/officeDocument/2006/math">
+                          <m:sSub>
+                            <m:sSubPr>
+                              <m:ctrlPr>
+                                <a:rPr lang="ar-AE" sz="975" i="1" smtClean="0">
+                                  <a:latin typeface="Cambria Math" panose="02040503050406030204" pitchFamily="18" charset="0"/>
+                                </a:rPr>
+                              </m:ctrlPr>
+                            </m:sSubPr>
+                            <m:e>
+                              <m:r>
+                                <a:rPr lang="ar-AE" sz="975">
+                                  <a:latin typeface="Cambria Math" panose="02040503050406030204" pitchFamily="18" charset="0"/>
+                                </a:rPr>
+                                <m:t>𝑉</m:t>
+                              </m:r>
+                            </m:e>
+                            <m:sub>
+                              <m:r>
+                                <a:rPr lang="ar-AE" sz="975">
+                                  <a:latin typeface="Cambria Math" panose="02040503050406030204" pitchFamily="18" charset="0"/>
+                                </a:rPr>
+                                <m:t>𝑑𝑖𝑣</m:t>
+                              </m:r>
+                            </m:sub>
+                          </m:sSub>
+                          <m:r>
+                            <a:rPr lang="en-GB" sz="975" b="0" i="1" smtClean="0">
+                              <a:latin typeface="Cambria Math" panose="02040503050406030204" pitchFamily="18" charset="0"/>
+                              <a:ea typeface="Cambria Math" panose="02040503050406030204" pitchFamily="18" charset="0"/>
+                            </a:rPr>
+                            <m:t>=</m:t>
+                          </m:r>
+                          <m:f>
+                            <m:fPr>
+                              <m:ctrlPr>
+                                <a:rPr lang="ar-AE" sz="975" i="1">
+                                  <a:latin typeface="Cambria Math" panose="02040503050406030204" pitchFamily="18" charset="0"/>
+                                  <a:ea typeface="Cambria Math" panose="02040503050406030204" pitchFamily="18" charset="0"/>
+                                </a:rPr>
+                              </m:ctrlPr>
+                            </m:fPr>
+                            <m:num>
+                              <m:sSub>
+                                <m:sSubPr>
+                                  <m:ctrlPr>
+                                    <a:rPr lang="ar-AE" sz="975" i="1" smtClean="0">
+                                      <a:latin typeface="Cambria Math" panose="02040503050406030204" pitchFamily="18" charset="0"/>
+                                      <a:ea typeface="Cambria Math" panose="02040503050406030204" pitchFamily="18" charset="0"/>
+                                    </a:rPr>
+                                  </m:ctrlPr>
+                                </m:sSubPr>
+                                <m:e>
+                                  <m:r>
+                                    <a:rPr lang="en-GB" sz="975" b="0" i="1" smtClean="0">
+                                      <a:latin typeface="Cambria Math" panose="02040503050406030204" pitchFamily="18" charset="0"/>
+                                      <a:ea typeface="Cambria Math" panose="02040503050406030204" pitchFamily="18" charset="0"/>
+                                    </a:rPr>
+                                    <m:t>𝑋</m:t>
+                                  </m:r>
+                                </m:e>
+                                <m:sub>
+                                  <m:r>
+                                    <a:rPr lang="en-GB" sz="975" b="0" i="1" smtClean="0">
+                                      <a:latin typeface="Cambria Math" panose="02040503050406030204" pitchFamily="18" charset="0"/>
+                                      <a:ea typeface="Cambria Math" panose="02040503050406030204" pitchFamily="18" charset="0"/>
+                                    </a:rPr>
+                                    <m:t>𝑑𝑖𝑣</m:t>
+                                  </m:r>
+                                </m:sub>
+                              </m:sSub>
+                            </m:num>
+                            <m:den>
+                              <m:r>
+                                <a:rPr lang="en-GB" sz="975" i="1">
+                                  <a:latin typeface="Cambria Math" panose="02040503050406030204" pitchFamily="18" charset="0"/>
+                                  <a:ea typeface="Cambria Math" panose="02040503050406030204" pitchFamily="18" charset="0"/>
+                                </a:rPr>
+                                <m:t>𝑥</m:t>
+                              </m:r>
+                            </m:den>
+                          </m:f>
+                          <m:r>
+                            <a:rPr lang="en-GB" sz="975" i="1">
+                              <a:latin typeface="Cambria Math" panose="02040503050406030204" pitchFamily="18" charset="0"/>
+                              <a:ea typeface="Cambria Math" panose="02040503050406030204" pitchFamily="18" charset="0"/>
+                            </a:rPr>
+                            <m:t>=</m:t>
+                          </m:r>
+                          <m:f>
+                            <m:fPr>
+                              <m:ctrlPr>
+                                <a:rPr lang="ar-AE" sz="975" i="1">
+                                  <a:latin typeface="Cambria Math" panose="02040503050406030204" pitchFamily="18" charset="0"/>
+                                </a:rPr>
+                              </m:ctrlPr>
+                            </m:fPr>
+                            <m:num>
+                              <m:sSub>
+                                <m:sSubPr>
+                                  <m:ctrlPr>
+                                    <a:rPr lang="ar-AE" sz="975" i="1" smtClean="0">
+                                      <a:latin typeface="Cambria Math" panose="02040503050406030204" pitchFamily="18" charset="0"/>
+                                    </a:rPr>
+                                  </m:ctrlPr>
+                                </m:sSubPr>
+                                <m:e>
+                                  <m:r>
+                                    <a:rPr lang="en-GB" sz="975" b="0" i="1" smtClean="0">
+                                      <a:latin typeface="Cambria Math" panose="02040503050406030204" pitchFamily="18" charset="0"/>
+                                    </a:rPr>
+                                    <m:t>𝑋</m:t>
+                                  </m:r>
+                                </m:e>
+                                <m:sub>
+                                  <m:r>
+                                    <a:rPr lang="en-GB" sz="975" b="0" i="1" smtClean="0">
+                                      <a:latin typeface="Cambria Math" panose="02040503050406030204" pitchFamily="18" charset="0"/>
+                                    </a:rPr>
+                                    <m:t>𝑑𝑖𝑣</m:t>
+                                  </m:r>
+                                </m:sub>
+                              </m:sSub>
+                            </m:num>
+                            <m:den>
+                              <m:sSub>
+                                <m:sSubPr>
+                                  <m:ctrlPr>
+                                    <a:rPr lang="ar-AE" sz="975" i="1">
+                                      <a:latin typeface="Cambria Math" panose="02040503050406030204" pitchFamily="18" charset="0"/>
+                                    </a:rPr>
+                                  </m:ctrlPr>
+                                </m:sSubPr>
+                                <m:e>
+                                  <m:r>
+                                    <a:rPr lang="ar-AE" sz="975">
+                                      <a:latin typeface="Cambria Math" panose="02040503050406030204" pitchFamily="18" charset="0"/>
+                                    </a:rPr>
+                                    <m:t>𝑓</m:t>
+                                  </m:r>
+                                </m:e>
+                                <m:sub>
+                                  <m:r>
+                                    <a:rPr lang="ar-AE" sz="975">
+                                      <a:latin typeface="Cambria Math" panose="02040503050406030204" pitchFamily="18" charset="0"/>
+                                    </a:rPr>
+                                    <m:t>𝑋</m:t>
+                                  </m:r>
+                                </m:sub>
+                              </m:sSub>
+                              <m:r>
+                                <a:rPr lang="ar-AE" sz="975">
+                                  <a:latin typeface="Cambria Math" panose="02040503050406030204" pitchFamily="18" charset="0"/>
+                                </a:rPr>
+                                <m:t>(1−</m:t>
+                              </m:r>
+                              <m:r>
+                                <a:rPr lang="ar-AE" sz="975">
+                                  <a:latin typeface="Cambria Math" panose="02040503050406030204" pitchFamily="18" charset="0"/>
+                                </a:rPr>
+                                <m:t>𝑎</m:t>
+                              </m:r>
+                              <m:r>
+                                <a:rPr lang="ar-AE" sz="975">
+                                  <a:latin typeface="Cambria Math" panose="02040503050406030204" pitchFamily="18" charset="0"/>
+                                </a:rPr>
+                                <m:t>)</m:t>
+                              </m:r>
+                            </m:den>
+                          </m:f>
+                        </m:oMath>
+                      </m:oMathPara>
+                    </a14:m>
+                    <a:endParaRPr lang="en-US" sz="975" dirty="0"/>
+                  </a:p>
+                </p:txBody>
+              </p:sp>
+            </mc:Choice>
+            <mc:Fallback xmlns="">
+              <p:sp>
+                <p:nvSpPr>
+                  <p:cNvPr id="5" name="Rectangle 4">
+                    <a:extLst>
+                      <a:ext uri="{FF2B5EF4-FFF2-40B4-BE49-F238E27FC236}">
+                        <a16:creationId xmlns:a16="http://schemas.microsoft.com/office/drawing/2014/main" id="{FAF41DE5-820C-514A-964A-465E1F99AF43}"/>
+                      </a:ext>
+                    </a:extLst>
+                  </p:cNvPr>
+                  <p:cNvSpPr>
+                    <a:spLocks noRot="1" noChangeAspect="1" noMove="1" noResize="1" noEditPoints="1" noAdjustHandles="1" noChangeArrowheads="1" noChangeShapeType="1" noTextEdit="1"/>
+                  </p:cNvSpPr>
+                  <p:nvPr/>
+                </p:nvSpPr>
+                <p:spPr>
+                  <a:xfrm>
+                    <a:off x="2233978" y="1508637"/>
+                    <a:ext cx="1997868" cy="509254"/>
+                  </a:xfrm>
+                  <a:prstGeom prst="rect">
+                    <a:avLst/>
+                  </a:prstGeom>
+                  <a:blipFill>
+                    <a:blip r:embed="rId4"/>
+                    <a:stretch>
+                      <a:fillRect/>
+                    </a:stretch>
+                  </a:blipFill>
+                </p:spPr>
+                <p:txBody>
+                  <a:bodyPr/>
+                  <a:lstStyle/>
+                  <a:p>
+                    <a:r>
+                      <a:rPr lang="en-US">
+                        <a:noFill/>
+                      </a:rPr>
+                      <a:t> </a:t>
+                    </a:r>
+                  </a:p>
+                </p:txBody>
+              </p:sp>
+            </mc:Fallback>
+          </mc:AlternateContent>
+          <p:sp>
+            <p:nvSpPr>
+              <p:cNvPr id="13" name="Rounded Rectangle 12">
+                <a:extLst>
+                  <a:ext uri="{FF2B5EF4-FFF2-40B4-BE49-F238E27FC236}">
+                    <a16:creationId xmlns:a16="http://schemas.microsoft.com/office/drawing/2014/main" id="{9A48231A-EE8A-3441-A88C-43A0B143E614}"/>
+                  </a:ext>
+                </a:extLst>
+              </p:cNvPr>
+              <p:cNvSpPr/>
+              <p:nvPr/>
+            </p:nvSpPr>
+            <p:spPr>
+              <a:xfrm>
+                <a:off x="3369621" y="1776341"/>
+                <a:ext cx="166977" cy="198229"/>
+              </a:xfrm>
+              <a:prstGeom prst="roundRect">
+                <a:avLst/>
+              </a:prstGeom>
+              <a:noFill/>
+              <a:ln>
+                <a:solidFill>
+                  <a:srgbClr val="FF0000"/>
+                </a:solidFill>
+              </a:ln>
+            </p:spPr>
+            <p:style>
+              <a:lnRef idx="2">
+                <a:schemeClr val="accent1">
+                  <a:shade val="50000"/>
+                </a:schemeClr>
+              </a:lnRef>
+              <a:fillRef idx="1">
+                <a:schemeClr val="accent1"/>
+              </a:fillRef>
+              <a:effectRef idx="0">
+                <a:schemeClr val="accent1"/>
+              </a:effectRef>
+              <a:fontRef idx="minor">
+                <a:schemeClr val="lt1"/>
+              </a:fontRef>
+            </p:style>
+            <p:txBody>
+              <a:bodyPr rtlCol="0" anchor="ctr"/>
+              <a:lstStyle/>
+              <a:p>
+                <a:pPr algn="ctr"/>
+                <a:endParaRPr lang="en-US" sz="1463"/>
+              </a:p>
+            </p:txBody>
+          </p:sp>
+        </p:grpSp>
+        <p:cxnSp>
+          <p:nvCxnSpPr>
+            <p:cNvPr id="5" name="Straight Connector 4">
+              <a:extLst>
+                <a:ext uri="{FF2B5EF4-FFF2-40B4-BE49-F238E27FC236}">
+                  <a16:creationId xmlns:a16="http://schemas.microsoft.com/office/drawing/2014/main" id="{4D7B527C-2E77-3745-9959-E979D6F57D43}"/>
+                </a:ext>
+              </a:extLst>
+            </p:cNvPr>
+            <p:cNvCxnSpPr>
+              <a:cxnSpLocks/>
+            </p:cNvCxnSpPr>
+            <p:nvPr/>
+          </p:nvCxnSpPr>
+          <p:spPr>
+            <a:xfrm>
+              <a:off x="4723389" y="1026558"/>
+              <a:ext cx="0" cy="163506"/>
+            </a:xfrm>
+            <a:prstGeom prst="line">
+              <a:avLst/>
+            </a:prstGeom>
+            <a:ln w="12700">
+              <a:solidFill>
+                <a:schemeClr val="tx1">
+                  <a:lumMod val="50000"/>
+                  <a:lumOff val="50000"/>
+                </a:schemeClr>
+              </a:solidFill>
+            </a:ln>
+          </p:spPr>
+          <p:style>
+            <a:lnRef idx="1">
+              <a:schemeClr val="accent1"/>
+            </a:lnRef>
+            <a:fillRef idx="0">
+              <a:schemeClr val="accent1"/>
+            </a:fillRef>
+            <a:effectRef idx="0">
+              <a:schemeClr val="accent1"/>
+            </a:effectRef>
+            <a:fontRef idx="minor">
+              <a:schemeClr val="tx1"/>
+            </a:fontRef>
+          </p:style>
+        </p:cxnSp>
+        <mc:AlternateContent xmlns:mc="http://schemas.openxmlformats.org/markup-compatibility/2006" xmlns:a14="http://schemas.microsoft.com/office/drawing/2010/main">
+          <mc:Choice Requires="a14">
+            <p:sp>
+              <p:nvSpPr>
+                <p:cNvPr id="6" name="Rectangle 5">
+                  <a:extLst>
+                    <a:ext uri="{FF2B5EF4-FFF2-40B4-BE49-F238E27FC236}">
+                      <a16:creationId xmlns:a16="http://schemas.microsoft.com/office/drawing/2014/main" id="{078E68AA-B5E7-164A-98AE-06FEF9DC2005}"/>
+                    </a:ext>
+                  </a:extLst>
+                </p:cNvPr>
+                <p:cNvSpPr/>
+                <p:nvPr/>
+              </p:nvSpPr>
+              <p:spPr>
+                <a:xfrm>
+                  <a:off x="3819713" y="1426976"/>
+                  <a:ext cx="1123801" cy="375547"/>
+                </a:xfrm>
+                <a:prstGeom prst="rect">
+                  <a:avLst/>
+                </a:prstGeom>
+              </p:spPr>
+              <p:txBody>
+                <a:bodyPr wrap="square">
+                  <a:spAutoFit/>
+                </a:bodyPr>
+                <a:lstStyle/>
+                <a:p>
+                  <a:pPr/>
+                  <a14:m>
+                    <m:oMathPara xmlns:m="http://schemas.openxmlformats.org/officeDocument/2006/math">
+                      <m:oMathParaPr>
+                        <m:jc m:val="centerGroup"/>
+                      </m:oMathParaPr>
+                      <m:oMath xmlns:m="http://schemas.openxmlformats.org/officeDocument/2006/math">
+                        <m:sSub>
+                          <m:sSubPr>
+                            <m:ctrlPr>
+                              <a:rPr lang="ar-AE" sz="975" i="1">
+                                <a:latin typeface="Cambria Math" panose="02040503050406030204" pitchFamily="18" charset="0"/>
+                              </a:rPr>
+                            </m:ctrlPr>
+                          </m:sSubPr>
+                          <m:e>
+                            <m:r>
+                              <a:rPr lang="ar-AE" sz="975">
+                                <a:latin typeface="Cambria Math" panose="02040503050406030204" pitchFamily="18" charset="0"/>
+                              </a:rPr>
+                              <m:t>𝑓</m:t>
+                            </m:r>
+                          </m:e>
+                          <m:sub>
+                            <m:r>
+                              <a:rPr lang="ar-AE" sz="975">
+                                <a:latin typeface="Cambria Math" panose="02040503050406030204" pitchFamily="18" charset="0"/>
+                              </a:rPr>
+                              <m:t>𝑋</m:t>
+                            </m:r>
+                          </m:sub>
+                        </m:sSub>
+                        <m:r>
+                          <a:rPr lang="en-GB" sz="975" i="1">
+                            <a:latin typeface="Cambria Math" panose="02040503050406030204" pitchFamily="18" charset="0"/>
+                          </a:rPr>
+                          <m:t>=</m:t>
+                        </m:r>
+                        <m:r>
+                          <a:rPr lang="en-GB" sz="975" i="1">
+                            <a:latin typeface="Cambria Math" panose="02040503050406030204" pitchFamily="18" charset="0"/>
+                          </a:rPr>
+                          <m:t>𝑓</m:t>
+                        </m:r>
+                        <m:d>
+                          <m:dPr>
+                            <m:ctrlPr>
+                              <a:rPr lang="en-GB" sz="975" i="1">
+                                <a:latin typeface="Cambria Math" panose="02040503050406030204" pitchFamily="18" charset="0"/>
+                              </a:rPr>
+                            </m:ctrlPr>
+                          </m:dPr>
+                          <m:e>
+                            <m:r>
+                              <a:rPr lang="en-GB" sz="975" i="1">
+                                <a:latin typeface="Cambria Math" panose="02040503050406030204" pitchFamily="18" charset="0"/>
+                              </a:rPr>
+                              <m:t>𝑒</m:t>
+                            </m:r>
+                          </m:e>
+                        </m:d>
+                        <m:r>
+                          <a:rPr lang="en-GB" sz="975" i="1">
+                            <a:latin typeface="Cambria Math" panose="02040503050406030204" pitchFamily="18" charset="0"/>
+                          </a:rPr>
+                          <m:t> ?</m:t>
+                        </m:r>
+                      </m:oMath>
+                    </m:oMathPara>
+                  </a14:m>
+                  <a:endParaRPr lang="en-GB" sz="975" i="1" dirty="0">
+                    <a:latin typeface="Cambria Math" panose="02040503050406030204" pitchFamily="18" charset="0"/>
+                  </a:endParaRPr>
+                </a:p>
+                <a:p>
+                  <a:pPr/>
+                  <a14:m>
+                    <m:oMathPara xmlns:m="http://schemas.openxmlformats.org/officeDocument/2006/math">
+                      <m:oMathParaPr>
+                        <m:jc m:val="centerGroup"/>
+                      </m:oMathParaPr>
+                      <m:oMath xmlns:m="http://schemas.openxmlformats.org/officeDocument/2006/math">
+                        <m:sSub>
+                          <m:sSubPr>
+                            <m:ctrlPr>
+                              <a:rPr lang="ar-AE" sz="975" i="1">
+                                <a:latin typeface="Cambria Math" panose="02040503050406030204" pitchFamily="18" charset="0"/>
+                              </a:rPr>
+                            </m:ctrlPr>
+                          </m:sSubPr>
+                          <m:e>
+                            <m:r>
+                              <a:rPr lang="ar-AE" sz="975">
+                                <a:latin typeface="Cambria Math" panose="02040503050406030204" pitchFamily="18" charset="0"/>
+                              </a:rPr>
+                              <m:t>𝑓</m:t>
+                            </m:r>
+                          </m:e>
+                          <m:sub>
+                            <m:r>
+                              <a:rPr lang="ar-AE" sz="975">
+                                <a:latin typeface="Cambria Math" panose="02040503050406030204" pitchFamily="18" charset="0"/>
+                              </a:rPr>
+                              <m:t>𝑋</m:t>
+                            </m:r>
+                          </m:sub>
+                        </m:sSub>
+                        <m:r>
+                          <a:rPr lang="en-GB" sz="975" i="1">
+                            <a:latin typeface="Cambria Math" panose="02040503050406030204" pitchFamily="18" charset="0"/>
+                          </a:rPr>
+                          <m:t>=</m:t>
+                        </m:r>
+                        <m:r>
+                          <a:rPr lang="en-GB" sz="975" i="1">
+                            <a:latin typeface="Cambria Math" panose="02040503050406030204" pitchFamily="18" charset="0"/>
+                          </a:rPr>
+                          <m:t>𝑓</m:t>
+                        </m:r>
+                        <m:d>
+                          <m:dPr>
+                            <m:ctrlPr>
+                              <a:rPr lang="en-GB" sz="975" i="1">
+                                <a:latin typeface="Cambria Math" panose="02040503050406030204" pitchFamily="18" charset="0"/>
+                              </a:rPr>
+                            </m:ctrlPr>
+                          </m:dPr>
+                          <m:e>
+                            <m:r>
+                              <a:rPr lang="en-GB" sz="975" i="1">
+                                <a:latin typeface="Cambria Math" panose="02040503050406030204" pitchFamily="18" charset="0"/>
+                              </a:rPr>
+                              <m:t>𝑟</m:t>
+                            </m:r>
+                          </m:e>
+                        </m:d>
+                        <m:r>
+                          <a:rPr lang="en-GB" sz="975" i="1">
+                            <a:latin typeface="Cambria Math" panose="02040503050406030204" pitchFamily="18" charset="0"/>
+                          </a:rPr>
+                          <m:t> ?</m:t>
+                        </m:r>
+                      </m:oMath>
+                    </m:oMathPara>
+                  </a14:m>
+                  <a:endParaRPr lang="en-GB" sz="975" i="1" dirty="0">
+                    <a:latin typeface="Cambria Math" panose="02040503050406030204" pitchFamily="18" charset="0"/>
+                  </a:endParaRPr>
+                </a:p>
+                <a:p>
+                  <a:pPr algn="ctr"/>
+                  <a:r>
+                    <a:rPr lang="en-GB" sz="975" i="1" dirty="0">
+                      <a:latin typeface="Cambria Math" panose="02040503050406030204" pitchFamily="18" charset="0"/>
+                    </a:rPr>
+                    <a:t>…</a:t>
+                  </a:r>
+                </a:p>
+              </p:txBody>
+            </p:sp>
+          </mc:Choice>
+          <mc:Fallback xmlns="">
+            <p:sp>
+              <p:nvSpPr>
+                <p:cNvPr id="9" name="Rectangle 8">
+                  <a:extLst>
+                    <a:ext uri="{FF2B5EF4-FFF2-40B4-BE49-F238E27FC236}">
+                      <a16:creationId xmlns:a16="http://schemas.microsoft.com/office/drawing/2014/main" id="{BBFEA59C-8967-CB48-B2B5-5A7EA7E6A951}"/>
+                    </a:ext>
+                  </a:extLst>
+                </p:cNvPr>
+                <p:cNvSpPr>
+                  <a:spLocks noRot="1" noChangeAspect="1" noMove="1" noResize="1" noEditPoints="1" noAdjustHandles="1" noChangeArrowheads="1" noChangeShapeType="1" noTextEdit="1"/>
+                </p:cNvSpPr>
+                <p:nvPr/>
+              </p:nvSpPr>
+              <p:spPr>
+                <a:xfrm>
+                  <a:off x="3819713" y="1426976"/>
+                  <a:ext cx="1123801" cy="375547"/>
+                </a:xfrm>
+                <a:prstGeom prst="rect">
+                  <a:avLst/>
+                </a:prstGeom>
+                <a:blipFill>
+                  <a:blip r:embed="rId5"/>
+                  <a:stretch>
+                    <a:fillRect b="-6977"/>
+                  </a:stretch>
+                </a:blipFill>
+              </p:spPr>
+              <p:txBody>
+                <a:bodyPr/>
+                <a:lstStyle/>
+                <a:p>
+                  <a:r>
+                    <a:rPr lang="en-US">
+                      <a:noFill/>
+                    </a:rPr>
+                    <a:t> </a:t>
+                  </a:r>
+                </a:p>
+              </p:txBody>
+            </p:sp>
+          </mc:Fallback>
+        </mc:AlternateContent>
+        <p:cxnSp>
+          <p:nvCxnSpPr>
+            <p:cNvPr id="7" name="Straight Connector 6">
+              <a:extLst>
+                <a:ext uri="{FF2B5EF4-FFF2-40B4-BE49-F238E27FC236}">
+                  <a16:creationId xmlns:a16="http://schemas.microsoft.com/office/drawing/2014/main" id="{CEBCC7F6-052F-3A4D-999D-979C96F01D44}"/>
+                </a:ext>
+              </a:extLst>
+            </p:cNvPr>
+            <p:cNvCxnSpPr>
+              <a:cxnSpLocks/>
+            </p:cNvCxnSpPr>
+            <p:nvPr/>
+          </p:nvCxnSpPr>
+          <p:spPr>
+            <a:xfrm>
+              <a:off x="4723389" y="1183340"/>
+              <a:ext cx="152400" cy="152400"/>
+            </a:xfrm>
+            <a:prstGeom prst="line">
+              <a:avLst/>
+            </a:prstGeom>
+            <a:ln w="12700">
+              <a:solidFill>
+                <a:schemeClr val="tx1">
+                  <a:lumMod val="50000"/>
+                  <a:lumOff val="50000"/>
+                </a:schemeClr>
+              </a:solidFill>
+            </a:ln>
+          </p:spPr>
+          <p:style>
+            <a:lnRef idx="1">
+              <a:schemeClr val="accent1"/>
+            </a:lnRef>
+            <a:fillRef idx="0">
+              <a:schemeClr val="accent1"/>
+            </a:fillRef>
+            <a:effectRef idx="0">
+              <a:schemeClr val="accent1"/>
+            </a:effectRef>
+            <a:fontRef idx="minor">
+              <a:schemeClr val="tx1"/>
+            </a:fontRef>
+          </p:style>
+        </p:cxnSp>
+        <p:cxnSp>
+          <p:nvCxnSpPr>
+            <p:cNvPr id="8" name="Straight Connector 7">
+              <a:extLst>
+                <a:ext uri="{FF2B5EF4-FFF2-40B4-BE49-F238E27FC236}">
+                  <a16:creationId xmlns:a16="http://schemas.microsoft.com/office/drawing/2014/main" id="{2E125432-D0F8-DA4E-8EF1-0FB78226183A}"/>
+                </a:ext>
+              </a:extLst>
+            </p:cNvPr>
+            <p:cNvCxnSpPr>
+              <a:cxnSpLocks/>
+            </p:cNvCxnSpPr>
+            <p:nvPr/>
+          </p:nvCxnSpPr>
+          <p:spPr>
+            <a:xfrm flipV="1">
+              <a:off x="4570990" y="1190064"/>
+              <a:ext cx="152398" cy="137026"/>
+            </a:xfrm>
+            <a:prstGeom prst="line">
+              <a:avLst/>
+            </a:prstGeom>
+            <a:ln w="12700">
+              <a:solidFill>
+                <a:schemeClr val="tx1">
+                  <a:lumMod val="50000"/>
+                  <a:lumOff val="50000"/>
+                </a:schemeClr>
+              </a:solidFill>
+            </a:ln>
+          </p:spPr>
+          <p:style>
+            <a:lnRef idx="1">
+              <a:schemeClr val="accent1"/>
+            </a:lnRef>
+            <a:fillRef idx="0">
+              <a:schemeClr val="accent1"/>
+            </a:fillRef>
+            <a:effectRef idx="0">
+              <a:schemeClr val="accent1"/>
+            </a:effectRef>
+            <a:fontRef idx="minor">
+              <a:schemeClr val="tx1"/>
+            </a:fontRef>
+          </p:style>
+        </p:cxnSp>
+        <mc:AlternateContent xmlns:mc="http://schemas.openxmlformats.org/markup-compatibility/2006" xmlns:a14="http://schemas.microsoft.com/office/drawing/2010/main">
+          <mc:Choice Requires="a14">
+            <p:sp>
+              <p:nvSpPr>
+                <p:cNvPr id="9" name="Rectangle 8">
+                  <a:extLst>
+                    <a:ext uri="{FF2B5EF4-FFF2-40B4-BE49-F238E27FC236}">
+                      <a16:creationId xmlns:a16="http://schemas.microsoft.com/office/drawing/2014/main" id="{E010211B-572D-D943-89CF-BA10E7F4ED7E}"/>
+                    </a:ext>
+                  </a:extLst>
+                </p:cNvPr>
+                <p:cNvSpPr/>
+                <p:nvPr/>
+              </p:nvSpPr>
+              <p:spPr>
+                <a:xfrm>
+                  <a:off x="4677659" y="1419894"/>
+                  <a:ext cx="929973" cy="377811"/>
+                </a:xfrm>
+                <a:prstGeom prst="rect">
+                  <a:avLst/>
+                </a:prstGeom>
+              </p:spPr>
+              <p:txBody>
+                <a:bodyPr wrap="square">
+                  <a:spAutoFit/>
+                </a:bodyPr>
+                <a:lstStyle/>
+                <a:p>
+                  <a:pPr/>
+                  <a14:m>
+                    <m:oMathPara xmlns:m="http://schemas.openxmlformats.org/officeDocument/2006/math">
+                      <m:oMathParaPr>
+                        <m:jc m:val="centerGroup"/>
+                      </m:oMathParaPr>
+                      <m:oMath xmlns:m="http://schemas.openxmlformats.org/officeDocument/2006/math">
+                        <m:sSub>
+                          <m:sSubPr>
+                            <m:ctrlPr>
+                              <a:rPr lang="ar-AE" sz="982" i="1">
+                                <a:latin typeface="Cambria Math" panose="02040503050406030204" pitchFamily="18" charset="0"/>
+                              </a:rPr>
+                            </m:ctrlPr>
+                          </m:sSubPr>
+                          <m:e>
+                            <m:r>
+                              <a:rPr lang="ar-AE" sz="982">
+                                <a:latin typeface="Cambria Math" panose="02040503050406030204" pitchFamily="18" charset="0"/>
+                              </a:rPr>
+                              <m:t>𝑓</m:t>
+                            </m:r>
+                          </m:e>
+                          <m:sub>
+                            <m:r>
+                              <a:rPr lang="ar-AE" sz="982">
+                                <a:latin typeface="Cambria Math" panose="02040503050406030204" pitchFamily="18" charset="0"/>
+                              </a:rPr>
+                              <m:t>𝑋</m:t>
+                            </m:r>
+                          </m:sub>
+                        </m:sSub>
+                        <m:r>
+                          <a:rPr lang="en-GB" sz="982" i="1">
+                            <a:latin typeface="Cambria Math" panose="02040503050406030204" pitchFamily="18" charset="0"/>
+                          </a:rPr>
+                          <m:t>=</m:t>
+                        </m:r>
+                        <m:r>
+                          <a:rPr lang="en-GB" sz="982" i="1">
+                            <a:latin typeface="Cambria Math" panose="02040503050406030204" pitchFamily="18" charset="0"/>
+                          </a:rPr>
+                          <m:t>𝑓</m:t>
+                        </m:r>
+                        <m:d>
+                          <m:dPr>
+                            <m:ctrlPr>
+                              <a:rPr lang="en-GB" sz="982" i="1">
+                                <a:latin typeface="Cambria Math" panose="02040503050406030204" pitchFamily="18" charset="0"/>
+                              </a:rPr>
+                            </m:ctrlPr>
+                          </m:dPr>
+                          <m:e>
+                            <m:r>
+                              <a:rPr lang="en-GB" sz="982" i="1">
+                                <a:latin typeface="Cambria Math" panose="02040503050406030204" pitchFamily="18" charset="0"/>
+                              </a:rPr>
+                              <m:t>𝑒</m:t>
+                            </m:r>
+                            <m:r>
+                              <a:rPr lang="en-GB" sz="982" i="1">
+                                <a:latin typeface="Cambria Math" panose="02040503050406030204" pitchFamily="18" charset="0"/>
+                              </a:rPr>
+                              <m:t>,</m:t>
+                            </m:r>
+                            <m:r>
+                              <a:rPr lang="en-GB" sz="982" i="1">
+                                <a:latin typeface="Cambria Math" panose="02040503050406030204" pitchFamily="18" charset="0"/>
+                              </a:rPr>
+                              <m:t>𝑟</m:t>
+                            </m:r>
+                          </m:e>
+                        </m:d>
+                        <m:r>
+                          <a:rPr lang="en-GB" sz="982" i="1">
+                            <a:latin typeface="Cambria Math" panose="02040503050406030204" pitchFamily="18" charset="0"/>
+                          </a:rPr>
+                          <m:t> ?</m:t>
+                        </m:r>
+                      </m:oMath>
+                    </m:oMathPara>
+                  </a14:m>
+                  <a:endParaRPr lang="en-GB" sz="982" i="1" dirty="0">
+                    <a:latin typeface="Cambria Math" panose="02040503050406030204" pitchFamily="18" charset="0"/>
+                  </a:endParaRPr>
+                </a:p>
+                <a:p>
+                  <a:pPr/>
+                  <a14:m>
+                    <m:oMathPara xmlns:m="http://schemas.openxmlformats.org/officeDocument/2006/math">
+                      <m:oMathParaPr>
+                        <m:jc m:val="centerGroup"/>
+                      </m:oMathParaPr>
+                      <m:oMath xmlns:m="http://schemas.openxmlformats.org/officeDocument/2006/math">
+                        <m:sSub>
+                          <m:sSubPr>
+                            <m:ctrlPr>
+                              <a:rPr lang="ar-AE" sz="982" i="1">
+                                <a:latin typeface="Cambria Math" panose="02040503050406030204" pitchFamily="18" charset="0"/>
+                              </a:rPr>
+                            </m:ctrlPr>
+                          </m:sSubPr>
+                          <m:e>
+                            <m:r>
+                              <a:rPr lang="ar-AE" sz="982">
+                                <a:latin typeface="Cambria Math" panose="02040503050406030204" pitchFamily="18" charset="0"/>
+                              </a:rPr>
+                              <m:t>𝑓</m:t>
+                            </m:r>
+                          </m:e>
+                          <m:sub>
+                            <m:r>
+                              <a:rPr lang="ar-AE" sz="982">
+                                <a:latin typeface="Cambria Math" panose="02040503050406030204" pitchFamily="18" charset="0"/>
+                              </a:rPr>
+                              <m:t>𝑋</m:t>
+                            </m:r>
+                          </m:sub>
+                        </m:sSub>
+                        <m:r>
+                          <a:rPr lang="en-GB" sz="982" i="1">
+                            <a:latin typeface="Cambria Math" panose="02040503050406030204" pitchFamily="18" charset="0"/>
+                          </a:rPr>
+                          <m:t>=</m:t>
+                        </m:r>
+                        <m:r>
+                          <a:rPr lang="en-GB" sz="982" i="1">
+                            <a:latin typeface="Cambria Math" panose="02040503050406030204" pitchFamily="18" charset="0"/>
+                          </a:rPr>
+                          <m:t>𝑓</m:t>
+                        </m:r>
+                        <m:d>
+                          <m:dPr>
+                            <m:ctrlPr>
+                              <a:rPr lang="en-GB" sz="982" i="1">
+                                <a:latin typeface="Cambria Math" panose="02040503050406030204" pitchFamily="18" charset="0"/>
+                              </a:rPr>
+                            </m:ctrlPr>
+                          </m:dPr>
+                          <m:e>
+                            <m:r>
+                              <a:rPr lang="en-GB" sz="982" i="1">
+                                <a:latin typeface="Cambria Math" panose="02040503050406030204" pitchFamily="18" charset="0"/>
+                              </a:rPr>
+                              <m:t>𝑒</m:t>
+                            </m:r>
+                            <m:r>
+                              <a:rPr lang="en-GB" sz="982" i="1">
+                                <a:latin typeface="Cambria Math" panose="02040503050406030204" pitchFamily="18" charset="0"/>
+                              </a:rPr>
+                              <m:t>,</m:t>
+                            </m:r>
+                            <m:sSub>
+                              <m:sSubPr>
+                                <m:ctrlPr>
+                                  <a:rPr lang="en-GB" sz="982" i="1">
+                                    <a:latin typeface="Cambria Math" panose="02040503050406030204" pitchFamily="18" charset="0"/>
+                                  </a:rPr>
+                                </m:ctrlPr>
+                              </m:sSubPr>
+                              <m:e>
+                                <m:r>
+                                  <a:rPr lang="en-GB" sz="982" i="1">
+                                    <a:latin typeface="Cambria Math" panose="02040503050406030204" pitchFamily="18" charset="0"/>
+                                  </a:rPr>
+                                  <m:t>𝑟</m:t>
+                                </m:r>
+                              </m:e>
+                              <m:sub>
+                                <m:r>
+                                  <a:rPr lang="en-GB" sz="982" i="1">
+                                    <a:latin typeface="Cambria Math" panose="02040503050406030204" pitchFamily="18" charset="0"/>
+                                  </a:rPr>
+                                  <m:t>𝑎</m:t>
+                                </m:r>
+                              </m:sub>
+                            </m:sSub>
+                          </m:e>
+                        </m:d>
+                        <m:r>
+                          <a:rPr lang="en-GB" sz="982" i="1">
+                            <a:latin typeface="Cambria Math" panose="02040503050406030204" pitchFamily="18" charset="0"/>
+                          </a:rPr>
+                          <m:t> ?</m:t>
+                        </m:r>
+                      </m:oMath>
+                    </m:oMathPara>
+                  </a14:m>
+                  <a:endParaRPr lang="en-GB" sz="982" i="1" dirty="0">
+                    <a:latin typeface="Cambria Math" panose="02040503050406030204" pitchFamily="18" charset="0"/>
+                  </a:endParaRPr>
+                </a:p>
+                <a:p>
+                  <a:pPr algn="ctr"/>
+                  <a:r>
+                    <a:rPr lang="en-GB" sz="982" i="1" dirty="0">
+                      <a:latin typeface="Cambria Math" panose="02040503050406030204" pitchFamily="18" charset="0"/>
+                    </a:rPr>
+                    <a:t>…</a:t>
+                  </a:r>
+                </a:p>
+              </p:txBody>
+            </p:sp>
+          </mc:Choice>
+          <mc:Fallback xmlns="">
+            <p:sp>
+              <p:nvSpPr>
+                <p:cNvPr id="26" name="Rectangle 25">
+                  <a:extLst>
+                    <a:ext uri="{FF2B5EF4-FFF2-40B4-BE49-F238E27FC236}">
+                      <a16:creationId xmlns:a16="http://schemas.microsoft.com/office/drawing/2014/main" id="{FBFC93C4-424F-AD45-8FE1-389A9D093FD9}"/>
+                    </a:ext>
+                  </a:extLst>
+                </p:cNvPr>
+                <p:cNvSpPr>
+                  <a:spLocks noRot="1" noChangeAspect="1" noMove="1" noResize="1" noEditPoints="1" noAdjustHandles="1" noChangeArrowheads="1" noChangeShapeType="1" noTextEdit="1"/>
+                </p:cNvSpPr>
+                <p:nvPr/>
+              </p:nvSpPr>
+              <p:spPr>
+                <a:xfrm>
+                  <a:off x="4677659" y="1419894"/>
+                  <a:ext cx="929973" cy="377811"/>
+                </a:xfrm>
+                <a:prstGeom prst="rect">
+                  <a:avLst/>
+                </a:prstGeom>
+                <a:blipFill>
+                  <a:blip r:embed="rId6"/>
+                  <a:stretch>
+                    <a:fillRect b="-6818"/>
+                  </a:stretch>
+                </a:blipFill>
+              </p:spPr>
+              <p:txBody>
+                <a:bodyPr/>
+                <a:lstStyle/>
+                <a:p>
+                  <a:r>
+                    <a:rPr lang="en-US">
+                      <a:noFill/>
+                    </a:rPr>
+                    <a:t> </a:t>
+                  </a:r>
+                </a:p>
+              </p:txBody>
+            </p:sp>
+          </mc:Fallback>
+        </mc:AlternateContent>
+        <p:sp>
+          <p:nvSpPr>
+            <p:cNvPr id="10" name="TextBox 9">
+              <a:extLst>
+                <a:ext uri="{FF2B5EF4-FFF2-40B4-BE49-F238E27FC236}">
+                  <a16:creationId xmlns:a16="http://schemas.microsoft.com/office/drawing/2014/main" id="{13346BFA-9804-DA46-B640-D5C0927253EB}"/>
+                </a:ext>
+              </a:extLst>
+            </p:cNvPr>
+            <p:cNvSpPr txBox="1"/>
+            <p:nvPr/>
+          </p:nvSpPr>
+          <p:spPr>
+            <a:xfrm>
+              <a:off x="4089603" y="1261262"/>
+              <a:ext cx="553206" cy="171615"/>
+            </a:xfrm>
+            <a:prstGeom prst="rect">
+              <a:avLst/>
+            </a:prstGeom>
+            <a:noFill/>
+          </p:spPr>
+          <p:txBody>
+            <a:bodyPr wrap="square" rtlCol="0">
+              <a:spAutoFit/>
+            </a:bodyPr>
+            <a:lstStyle/>
+            <a:p>
+              <a:pPr algn="ctr"/>
+              <a:r>
+                <a:rPr lang="en-US" sz="1011" dirty="0"/>
+                <a:t>1 sector</a:t>
+              </a:r>
+            </a:p>
+          </p:txBody>
+        </p:sp>
+        <p:sp>
+          <p:nvSpPr>
+            <p:cNvPr id="11" name="TextBox 10">
+              <a:extLst>
+                <a:ext uri="{FF2B5EF4-FFF2-40B4-BE49-F238E27FC236}">
+                  <a16:creationId xmlns:a16="http://schemas.microsoft.com/office/drawing/2014/main" id="{81296C18-3549-4D41-985E-714F3381AB09}"/>
+                </a:ext>
+              </a:extLst>
+            </p:cNvPr>
+            <p:cNvSpPr txBox="1"/>
+            <p:nvPr/>
+          </p:nvSpPr>
+          <p:spPr>
+            <a:xfrm>
+              <a:off x="4829059" y="1262167"/>
+              <a:ext cx="550477" cy="171615"/>
+            </a:xfrm>
+            <a:prstGeom prst="rect">
+              <a:avLst/>
+            </a:prstGeom>
+            <a:noFill/>
+          </p:spPr>
+          <p:txBody>
+            <a:bodyPr wrap="square" rtlCol="0">
+              <a:spAutoFit/>
+            </a:bodyPr>
+            <a:lstStyle/>
+            <a:p>
+              <a:pPr algn="ctr"/>
+              <a:r>
+                <a:rPr lang="en-US" sz="1011" dirty="0"/>
+                <a:t>2 sectors</a:t>
+              </a:r>
+            </a:p>
+          </p:txBody>
+        </p:sp>
+      </p:grpSp>
+      <p:pic>
+        <p:nvPicPr>
+          <p:cNvPr id="20" name="Picture 19">
+            <a:extLst>
+              <a:ext uri="{FF2B5EF4-FFF2-40B4-BE49-F238E27FC236}">
+                <a16:creationId xmlns:a16="http://schemas.microsoft.com/office/drawing/2014/main" id="{36A56CB9-F8C2-5E47-A031-9B6BEA89C96F}"/>
+              </a:ext>
+            </a:extLst>
+          </p:cNvPr>
+          <p:cNvPicPr>
+            <a:picLocks noChangeAspect="1"/>
+          </p:cNvPicPr>
+          <p:nvPr/>
+        </p:nvPicPr>
+        <p:blipFill>
+          <a:blip r:embed="rId7"/>
+          <a:stretch>
+            <a:fillRect/>
+          </a:stretch>
+        </p:blipFill>
+        <p:spPr>
+          <a:xfrm>
+            <a:off x="3294086" y="462652"/>
+            <a:ext cx="2216449" cy="1994400"/>
+          </a:xfrm>
+          <a:prstGeom prst="rect">
+            <a:avLst/>
+          </a:prstGeom>
+        </p:spPr>
+      </p:pic>
+      <p:pic>
+        <p:nvPicPr>
+          <p:cNvPr id="26" name="Picture 25">
+            <a:extLst>
+              <a:ext uri="{FF2B5EF4-FFF2-40B4-BE49-F238E27FC236}">
+                <a16:creationId xmlns:a16="http://schemas.microsoft.com/office/drawing/2014/main" id="{1214D10C-D3B7-074D-ACAE-40702D9A9CDA}"/>
+              </a:ext>
+            </a:extLst>
+          </p:cNvPr>
+          <p:cNvPicPr>
+            <a:picLocks noChangeAspect="1"/>
+          </p:cNvPicPr>
+          <p:nvPr/>
+        </p:nvPicPr>
+        <p:blipFill>
+          <a:blip r:embed="rId8"/>
+          <a:stretch>
+            <a:fillRect/>
+          </a:stretch>
+        </p:blipFill>
+        <p:spPr>
+          <a:xfrm>
+            <a:off x="5857210" y="2951534"/>
+            <a:ext cx="2000405" cy="1989384"/>
+          </a:xfrm>
+          <a:prstGeom prst="rect">
+            <a:avLst/>
+          </a:prstGeom>
+        </p:spPr>
+      </p:pic>
+      <p:pic>
+        <p:nvPicPr>
+          <p:cNvPr id="28" name="Picture 27">
+            <a:extLst>
+              <a:ext uri="{FF2B5EF4-FFF2-40B4-BE49-F238E27FC236}">
+                <a16:creationId xmlns:a16="http://schemas.microsoft.com/office/drawing/2014/main" id="{064DDE42-E2CF-2F42-A2DA-694DE7C340A6}"/>
+              </a:ext>
+            </a:extLst>
+          </p:cNvPr>
+          <p:cNvPicPr>
+            <a:picLocks noChangeAspect="1"/>
+          </p:cNvPicPr>
+          <p:nvPr/>
+        </p:nvPicPr>
+        <p:blipFill>
+          <a:blip r:embed="rId9"/>
+          <a:stretch>
+            <a:fillRect/>
+          </a:stretch>
+        </p:blipFill>
+        <p:spPr>
+          <a:xfrm>
+            <a:off x="1020666" y="2805230"/>
+            <a:ext cx="2004923" cy="2160000"/>
+          </a:xfrm>
+          <a:prstGeom prst="rect">
+            <a:avLst/>
+          </a:prstGeom>
+        </p:spPr>
+      </p:pic>
+      <p:pic>
+        <p:nvPicPr>
+          <p:cNvPr id="30" name="Picture 29">
+            <a:extLst>
+              <a:ext uri="{FF2B5EF4-FFF2-40B4-BE49-F238E27FC236}">
+                <a16:creationId xmlns:a16="http://schemas.microsoft.com/office/drawing/2014/main" id="{BB035F7B-BD00-CA4F-8964-C62DBB1EC5E5}"/>
+              </a:ext>
+            </a:extLst>
+          </p:cNvPr>
+          <p:cNvPicPr>
+            <a:picLocks noChangeAspect="1"/>
+          </p:cNvPicPr>
+          <p:nvPr/>
+        </p:nvPicPr>
+        <p:blipFill>
+          <a:blip r:embed="rId10"/>
+          <a:stretch>
+            <a:fillRect/>
+          </a:stretch>
+        </p:blipFill>
+        <p:spPr>
+          <a:xfrm>
+            <a:off x="3436473" y="2805230"/>
+            <a:ext cx="2004923" cy="2160000"/>
+          </a:xfrm>
+          <a:prstGeom prst="rect">
+            <a:avLst/>
+          </a:prstGeom>
+        </p:spPr>
+      </p:pic>
+      <p:pic>
+        <p:nvPicPr>
+          <p:cNvPr id="17" name="Picture 16">
+            <a:extLst>
+              <a:ext uri="{FF2B5EF4-FFF2-40B4-BE49-F238E27FC236}">
+                <a16:creationId xmlns:a16="http://schemas.microsoft.com/office/drawing/2014/main" id="{6324BA25-BC7C-894F-AA56-D2C0E3D25091}"/>
+              </a:ext>
+            </a:extLst>
+          </p:cNvPr>
+          <p:cNvPicPr>
+            <a:picLocks noChangeAspect="1"/>
+          </p:cNvPicPr>
+          <p:nvPr/>
+        </p:nvPicPr>
+        <p:blipFill>
+          <a:blip r:embed="rId11"/>
+          <a:stretch>
+            <a:fillRect/>
+          </a:stretch>
+        </p:blipFill>
+        <p:spPr>
+          <a:xfrm>
+            <a:off x="5639955" y="462652"/>
+            <a:ext cx="2216449" cy="1994400"/>
+          </a:xfrm>
+          <a:prstGeom prst="rect">
+            <a:avLst/>
+          </a:prstGeom>
+        </p:spPr>
+      </p:pic>
+    </p:spTree>
+    <p:extLst>
+      <p:ext uri="{BB962C8B-B14F-4D97-AF65-F5344CB8AC3E}">
+        <p14:creationId xmlns:p14="http://schemas.microsoft.com/office/powerpoint/2010/main" val="897640836"/>
+      </p:ext>
+    </p:extLst>
+  </p:cSld>
+  <p:clrMapOvr>
+    <a:masterClrMapping/>
+  </p:clrMapOvr>
+</p:sld>
+</file>
+
 <file path=ppt/theme/theme1.xml><?xml version="1.0" encoding="utf-8"?>
 <a:theme xmlns:a="http://schemas.openxmlformats.org/drawingml/2006/main" name="Office Theme">
   <a:themeElements>

</xml_diff>

<commit_message>
some work figure 3
</commit_message>
<xml_diff>
--- a/figure-assembly/figure-3.pptx
+++ b/figure-assembly/figure-3.pptx
@@ -245,7 +245,7 @@
           <a:p>
             <a:fld id="{25EC0CD3-564D-9742-98B5-86271438CCE6}" type="datetimeFigureOut">
               <a:rPr lang="en-US" smtClean="0"/>
-              <a:t>1/25/19</a:t>
+              <a:t>2/9/19</a:t>
             </a:fld>
             <a:endParaRPr lang="en-US"/>
           </a:p>
@@ -415,7 +415,7 @@
           <a:p>
             <a:fld id="{25EC0CD3-564D-9742-98B5-86271438CCE6}" type="datetimeFigureOut">
               <a:rPr lang="en-US" smtClean="0"/>
-              <a:t>1/25/19</a:t>
+              <a:t>2/9/19</a:t>
             </a:fld>
             <a:endParaRPr lang="en-US"/>
           </a:p>
@@ -595,7 +595,7 @@
           <a:p>
             <a:fld id="{25EC0CD3-564D-9742-98B5-86271438CCE6}" type="datetimeFigureOut">
               <a:rPr lang="en-US" smtClean="0"/>
-              <a:t>1/25/19</a:t>
+              <a:t>2/9/19</a:t>
             </a:fld>
             <a:endParaRPr lang="en-US"/>
           </a:p>
@@ -765,7 +765,7 @@
           <a:p>
             <a:fld id="{25EC0CD3-564D-9742-98B5-86271438CCE6}" type="datetimeFigureOut">
               <a:rPr lang="en-US" smtClean="0"/>
-              <a:t>1/25/19</a:t>
+              <a:t>2/9/19</a:t>
             </a:fld>
             <a:endParaRPr lang="en-US"/>
           </a:p>
@@ -1009,7 +1009,7 @@
           <a:p>
             <a:fld id="{25EC0CD3-564D-9742-98B5-86271438CCE6}" type="datetimeFigureOut">
               <a:rPr lang="en-US" smtClean="0"/>
-              <a:t>1/25/19</a:t>
+              <a:t>2/9/19</a:t>
             </a:fld>
             <a:endParaRPr lang="en-US"/>
           </a:p>
@@ -1241,7 +1241,7 @@
           <a:p>
             <a:fld id="{25EC0CD3-564D-9742-98B5-86271438CCE6}" type="datetimeFigureOut">
               <a:rPr lang="en-US" smtClean="0"/>
-              <a:t>1/25/19</a:t>
+              <a:t>2/9/19</a:t>
             </a:fld>
             <a:endParaRPr lang="en-US"/>
           </a:p>
@@ -1608,7 +1608,7 @@
           <a:p>
             <a:fld id="{25EC0CD3-564D-9742-98B5-86271438CCE6}" type="datetimeFigureOut">
               <a:rPr lang="en-US" smtClean="0"/>
-              <a:t>1/25/19</a:t>
+              <a:t>2/9/19</a:t>
             </a:fld>
             <a:endParaRPr lang="en-US"/>
           </a:p>
@@ -1726,7 +1726,7 @@
           <a:p>
             <a:fld id="{25EC0CD3-564D-9742-98B5-86271438CCE6}" type="datetimeFigureOut">
               <a:rPr lang="en-US" smtClean="0"/>
-              <a:t>1/25/19</a:t>
+              <a:t>2/9/19</a:t>
             </a:fld>
             <a:endParaRPr lang="en-US"/>
           </a:p>
@@ -1821,7 +1821,7 @@
           <a:p>
             <a:fld id="{25EC0CD3-564D-9742-98B5-86271438CCE6}" type="datetimeFigureOut">
               <a:rPr lang="en-US" smtClean="0"/>
-              <a:t>1/25/19</a:t>
+              <a:t>2/9/19</a:t>
             </a:fld>
             <a:endParaRPr lang="en-US"/>
           </a:p>
@@ -2098,7 +2098,7 @@
           <a:p>
             <a:fld id="{25EC0CD3-564D-9742-98B5-86271438CCE6}" type="datetimeFigureOut">
               <a:rPr lang="en-US" smtClean="0"/>
-              <a:t>1/25/19</a:t>
+              <a:t>2/9/19</a:t>
             </a:fld>
             <a:endParaRPr lang="en-US"/>
           </a:p>
@@ -2355,7 +2355,7 @@
           <a:p>
             <a:fld id="{25EC0CD3-564D-9742-98B5-86271438CCE6}" type="datetimeFigureOut">
               <a:rPr lang="en-US" smtClean="0"/>
-              <a:t>1/25/19</a:t>
+              <a:t>2/9/19</a:t>
             </a:fld>
             <a:endParaRPr lang="en-US"/>
           </a:p>
@@ -2568,7 +2568,7 @@
           <a:p>
             <a:fld id="{25EC0CD3-564D-9742-98B5-86271438CCE6}" type="datetimeFigureOut">
               <a:rPr lang="en-US" smtClean="0"/>
-              <a:t>1/25/19</a:t>
+              <a:t>2/9/19</a:t>
             </a:fld>
             <a:endParaRPr lang="en-US"/>
           </a:p>
@@ -5751,8 +5751,8 @@
         </p:nvSpPr>
         <p:spPr>
           <a:xfrm>
-            <a:off x="542724" y="403776"/>
-            <a:ext cx="3018980" cy="369332"/>
+            <a:off x="433395" y="393560"/>
+            <a:ext cx="3018980" cy="400110"/>
           </a:xfrm>
           <a:prstGeom prst="rect">
             <a:avLst/>
@@ -5767,25 +5767,25 @@
           <a:p>
             <a:pPr algn="ctr"/>
             <a:r>
-              <a:rPr lang="en-US" sz="900" dirty="0"/>
+              <a:rPr lang="en-US" sz="1000" dirty="0"/>
               <a:t>Regulation of </a:t>
             </a:r>
             <a:r>
-              <a:rPr lang="en-US" sz="900" i="1" dirty="0"/>
+              <a:rPr lang="en-US" sz="1000" i="1" dirty="0"/>
               <a:t>X </a:t>
             </a:r>
             <a:r>
-              <a:rPr lang="en-US" sz="900" dirty="0"/>
+              <a:rPr lang="en-US" sz="1000" dirty="0"/>
               <a:t>expression </a:t>
             </a:r>
           </a:p>
           <a:p>
             <a:pPr algn="ctr"/>
             <a:r>
-              <a:rPr lang="en-US" sz="900" dirty="0"/>
+              <a:rPr lang="en-US" sz="1000" dirty="0"/>
               <a:t>by  coarse-grained proteome sectors ? </a:t>
             </a:r>
-            <a:endParaRPr lang="en-US" sz="900" i="1" dirty="0"/>
+            <a:endParaRPr lang="en-US" sz="1000" i="1" dirty="0"/>
           </a:p>
         </p:txBody>
       </p:sp>
@@ -5803,10 +5803,10 @@
         </p:nvGrpSpPr>
         <p:grpSpPr>
           <a:xfrm>
-            <a:off x="744286" y="874714"/>
-            <a:ext cx="2582550" cy="1497280"/>
+            <a:off x="634957" y="874714"/>
+            <a:ext cx="2582550" cy="1508822"/>
             <a:chOff x="3819713" y="765944"/>
-            <a:chExt cx="1787919" cy="1036579"/>
+            <a:chExt cx="1787919" cy="1044569"/>
           </a:xfrm>
         </p:grpSpPr>
         <p:grpSp>
@@ -6186,8 +6186,8 @@
             </a:fontRef>
           </p:style>
         </p:cxnSp>
-        <mc:AlternateContent xmlns:mc="http://schemas.openxmlformats.org/markup-compatibility/2006" xmlns:a14="http://schemas.microsoft.com/office/drawing/2010/main">
-          <mc:Choice Requires="a14">
+        <mc:AlternateContent xmlns:mc="http://schemas.openxmlformats.org/markup-compatibility/2006">
+          <mc:Choice xmlns:a14="http://schemas.microsoft.com/office/drawing/2010/main" Requires="a14">
             <p:sp>
               <p:nvSpPr>
                 <p:cNvPr id="6" name="Rectangle 5">
@@ -6203,7 +6203,7 @@
               <p:spPr>
                 <a:xfrm>
                   <a:off x="3819713" y="1426976"/>
-                  <a:ext cx="1123801" cy="375547"/>
+                  <a:ext cx="1123801" cy="383537"/>
                 </a:xfrm>
                 <a:prstGeom prst="rect">
                   <a:avLst/>
@@ -6225,14 +6225,14 @@
                         <m:sSub>
                           <m:sSubPr>
                             <m:ctrlPr>
-                              <a:rPr lang="ar-AE" sz="975" i="1">
+                              <a:rPr lang="ar-AE" sz="1000" i="1">
                                 <a:latin typeface="Cambria Math" panose="02040503050406030204" pitchFamily="18" charset="0"/>
                               </a:rPr>
                             </m:ctrlPr>
                           </m:sSubPr>
                           <m:e>
                             <m:r>
-                              <a:rPr lang="ar-AE" sz="975">
+                              <a:rPr lang="ar-AE" sz="1000">
                                 <a:latin typeface="Cambria Math" panose="02040503050406030204" pitchFamily="18" charset="0"/>
                               </a:rPr>
                               <m:t>𝑓</m:t>
@@ -6240,7 +6240,7 @@
                           </m:e>
                           <m:sub>
                             <m:r>
-                              <a:rPr lang="ar-AE" sz="975">
+                              <a:rPr lang="ar-AE" sz="1000">
                                 <a:latin typeface="Cambria Math" panose="02040503050406030204" pitchFamily="18" charset="0"/>
                               </a:rPr>
                               <m:t>𝑋</m:t>
@@ -6248,13 +6248,13 @@
                           </m:sub>
                         </m:sSub>
                         <m:r>
-                          <a:rPr lang="en-GB" sz="975" i="1">
+                          <a:rPr lang="en-GB" sz="1000" i="1">
                             <a:latin typeface="Cambria Math" panose="02040503050406030204" pitchFamily="18" charset="0"/>
                           </a:rPr>
                           <m:t>=</m:t>
                         </m:r>
                         <m:r>
-                          <a:rPr lang="en-GB" sz="975" i="1">
+                          <a:rPr lang="en-GB" sz="1000" i="1">
                             <a:latin typeface="Cambria Math" panose="02040503050406030204" pitchFamily="18" charset="0"/>
                           </a:rPr>
                           <m:t>𝑓</m:t>
@@ -6262,14 +6262,14 @@
                         <m:d>
                           <m:dPr>
                             <m:ctrlPr>
-                              <a:rPr lang="en-GB" sz="975" i="1">
+                              <a:rPr lang="en-GB" sz="1000" i="1">
                                 <a:latin typeface="Cambria Math" panose="02040503050406030204" pitchFamily="18" charset="0"/>
                               </a:rPr>
                             </m:ctrlPr>
                           </m:dPr>
                           <m:e>
                             <m:r>
-                              <a:rPr lang="en-GB" sz="975" i="1">
+                              <a:rPr lang="en-GB" sz="1000" i="1">
                                 <a:latin typeface="Cambria Math" panose="02040503050406030204" pitchFamily="18" charset="0"/>
                               </a:rPr>
                               <m:t>𝑒</m:t>
@@ -6277,7 +6277,7 @@
                           </m:e>
                         </m:d>
                         <m:r>
-                          <a:rPr lang="en-GB" sz="975" i="1">
+                          <a:rPr lang="en-GB" sz="1000" i="1">
                             <a:latin typeface="Cambria Math" panose="02040503050406030204" pitchFamily="18" charset="0"/>
                           </a:rPr>
                           <m:t> ?</m:t>
@@ -6285,7 +6285,7 @@
                       </m:oMath>
                     </m:oMathPara>
                   </a14:m>
-                  <a:endParaRPr lang="en-GB" sz="975" i="1" dirty="0">
+                  <a:endParaRPr lang="en-GB" sz="1000" i="1" dirty="0">
                     <a:latin typeface="Cambria Math" panose="02040503050406030204" pitchFamily="18" charset="0"/>
                   </a:endParaRPr>
                 </a:p>
@@ -6300,14 +6300,14 @@
                         <m:sSub>
                           <m:sSubPr>
                             <m:ctrlPr>
-                              <a:rPr lang="ar-AE" sz="975" i="1">
+                              <a:rPr lang="ar-AE" sz="1000" i="1">
                                 <a:latin typeface="Cambria Math" panose="02040503050406030204" pitchFamily="18" charset="0"/>
                               </a:rPr>
                             </m:ctrlPr>
                           </m:sSubPr>
                           <m:e>
                             <m:r>
-                              <a:rPr lang="ar-AE" sz="975">
+                              <a:rPr lang="ar-AE" sz="1000">
                                 <a:latin typeface="Cambria Math" panose="02040503050406030204" pitchFamily="18" charset="0"/>
                               </a:rPr>
                               <m:t>𝑓</m:t>
@@ -6315,7 +6315,7 @@
                           </m:e>
                           <m:sub>
                             <m:r>
-                              <a:rPr lang="ar-AE" sz="975">
+                              <a:rPr lang="ar-AE" sz="1000">
                                 <a:latin typeface="Cambria Math" panose="02040503050406030204" pitchFamily="18" charset="0"/>
                               </a:rPr>
                               <m:t>𝑋</m:t>
@@ -6323,13 +6323,13 @@
                           </m:sub>
                         </m:sSub>
                         <m:r>
-                          <a:rPr lang="en-GB" sz="975" i="1">
+                          <a:rPr lang="en-GB" sz="1000" i="1">
                             <a:latin typeface="Cambria Math" panose="02040503050406030204" pitchFamily="18" charset="0"/>
                           </a:rPr>
                           <m:t>=</m:t>
                         </m:r>
                         <m:r>
-                          <a:rPr lang="en-GB" sz="975" i="1">
+                          <a:rPr lang="en-GB" sz="1000" i="1">
                             <a:latin typeface="Cambria Math" panose="02040503050406030204" pitchFamily="18" charset="0"/>
                           </a:rPr>
                           <m:t>𝑓</m:t>
@@ -6337,14 +6337,14 @@
                         <m:d>
                           <m:dPr>
                             <m:ctrlPr>
-                              <a:rPr lang="en-GB" sz="975" i="1">
+                              <a:rPr lang="en-GB" sz="1000" i="1">
                                 <a:latin typeface="Cambria Math" panose="02040503050406030204" pitchFamily="18" charset="0"/>
                               </a:rPr>
                             </m:ctrlPr>
                           </m:dPr>
                           <m:e>
                             <m:r>
-                              <a:rPr lang="en-GB" sz="975" i="1">
+                              <a:rPr lang="en-GB" sz="1000" i="1">
                                 <a:latin typeface="Cambria Math" panose="02040503050406030204" pitchFamily="18" charset="0"/>
                               </a:rPr>
                               <m:t>𝑟</m:t>
@@ -6352,7 +6352,7 @@
                           </m:e>
                         </m:d>
                         <m:r>
-                          <a:rPr lang="en-GB" sz="975" i="1">
+                          <a:rPr lang="en-GB" sz="1000" i="1">
                             <a:latin typeface="Cambria Math" panose="02040503050406030204" pitchFamily="18" charset="0"/>
                           </a:rPr>
                           <m:t> ?</m:t>
@@ -6360,14 +6360,14 @@
                       </m:oMath>
                     </m:oMathPara>
                   </a14:m>
-                  <a:endParaRPr lang="en-GB" sz="975" i="1" dirty="0">
+                  <a:endParaRPr lang="en-GB" sz="1000" i="1" dirty="0">
                     <a:latin typeface="Cambria Math" panose="02040503050406030204" pitchFamily="18" charset="0"/>
                   </a:endParaRPr>
                 </a:p>
                 <a:p>
                   <a:pPr algn="ctr"/>
                   <a:r>
-                    <a:rPr lang="en-GB" sz="975" i="1" dirty="0">
+                    <a:rPr lang="en-GB" sz="1000" i="1" dirty="0">
                       <a:latin typeface="Cambria Math" panose="02040503050406030204" pitchFamily="18" charset="0"/>
                     </a:rPr>
                     <a:t>…</a:t>
@@ -6376,13 +6376,13 @@
               </p:txBody>
             </p:sp>
           </mc:Choice>
-          <mc:Fallback xmlns="">
+          <mc:Fallback>
             <p:sp>
               <p:nvSpPr>
-                <p:cNvPr id="9" name="Rectangle 8">
+                <p:cNvPr id="6" name="Rectangle 5">
                   <a:extLst>
                     <a:ext uri="{FF2B5EF4-FFF2-40B4-BE49-F238E27FC236}">
-                      <a16:creationId xmlns:a16="http://schemas.microsoft.com/office/drawing/2014/main" id="{BBFEA59C-8967-CB48-B2B5-5A7EA7E6A951}"/>
+                      <a16:creationId xmlns:a16="http://schemas.microsoft.com/office/drawing/2014/main" id="{078E68AA-B5E7-164A-98AE-06FEF9DC2005}"/>
                     </a:ext>
                   </a:extLst>
                 </p:cNvPr>
@@ -6394,7 +6394,7 @@
               <p:spPr>
                 <a:xfrm>
                   <a:off x="3819713" y="1426976"/>
-                  <a:ext cx="1123801" cy="375547"/>
+                  <a:ext cx="1123801" cy="383537"/>
                 </a:xfrm>
                 <a:prstGeom prst="rect">
                   <a:avLst/>
@@ -6402,7 +6402,7 @@
                 <a:blipFill>
                   <a:blip r:embed="rId5"/>
                   <a:stretch>
-                    <a:fillRect b="-6977"/>
+                    <a:fillRect b="-4545"/>
                   </a:stretch>
                 </a:blipFill>
               </p:spPr>
@@ -6513,8 +6513,8 @@
             </a:fontRef>
           </p:style>
         </p:cxnSp>
-        <mc:AlternateContent xmlns:mc="http://schemas.openxmlformats.org/markup-compatibility/2006" xmlns:a14="http://schemas.microsoft.com/office/drawing/2010/main">
-          <mc:Choice Requires="a14">
+        <mc:AlternateContent xmlns:mc="http://schemas.openxmlformats.org/markup-compatibility/2006">
+          <mc:Choice xmlns:a14="http://schemas.microsoft.com/office/drawing/2010/main" Requires="a14">
             <p:sp>
               <p:nvSpPr>
                 <p:cNvPr id="9" name="Rectangle 8">
@@ -6530,7 +6530,7 @@
               <p:spPr>
                 <a:xfrm>
                   <a:off x="4677659" y="1419894"/>
-                  <a:ext cx="929973" cy="377811"/>
+                  <a:ext cx="929973" cy="383537"/>
                 </a:xfrm>
                 <a:prstGeom prst="rect">
                   <a:avLst/>
@@ -6552,14 +6552,14 @@
                         <m:sSub>
                           <m:sSubPr>
                             <m:ctrlPr>
-                              <a:rPr lang="ar-AE" sz="982" i="1">
+                              <a:rPr lang="ar-AE" sz="1000" i="1">
                                 <a:latin typeface="Cambria Math" panose="02040503050406030204" pitchFamily="18" charset="0"/>
                               </a:rPr>
                             </m:ctrlPr>
                           </m:sSubPr>
                           <m:e>
                             <m:r>
-                              <a:rPr lang="ar-AE" sz="982">
+                              <a:rPr lang="ar-AE" sz="1000">
                                 <a:latin typeface="Cambria Math" panose="02040503050406030204" pitchFamily="18" charset="0"/>
                               </a:rPr>
                               <m:t>𝑓</m:t>
@@ -6567,7 +6567,7 @@
                           </m:e>
                           <m:sub>
                             <m:r>
-                              <a:rPr lang="ar-AE" sz="982">
+                              <a:rPr lang="ar-AE" sz="1000">
                                 <a:latin typeface="Cambria Math" panose="02040503050406030204" pitchFamily="18" charset="0"/>
                               </a:rPr>
                               <m:t>𝑋</m:t>
@@ -6575,13 +6575,13 @@
                           </m:sub>
                         </m:sSub>
                         <m:r>
-                          <a:rPr lang="en-GB" sz="982" i="1">
+                          <a:rPr lang="en-GB" sz="1000" i="1">
                             <a:latin typeface="Cambria Math" panose="02040503050406030204" pitchFamily="18" charset="0"/>
                           </a:rPr>
                           <m:t>=</m:t>
                         </m:r>
                         <m:r>
-                          <a:rPr lang="en-GB" sz="982" i="1">
+                          <a:rPr lang="en-GB" sz="1000" i="1">
                             <a:latin typeface="Cambria Math" panose="02040503050406030204" pitchFamily="18" charset="0"/>
                           </a:rPr>
                           <m:t>𝑓</m:t>
@@ -6589,26 +6589,26 @@
                         <m:d>
                           <m:dPr>
                             <m:ctrlPr>
-                              <a:rPr lang="en-GB" sz="982" i="1">
+                              <a:rPr lang="en-GB" sz="1000" i="1">
                                 <a:latin typeface="Cambria Math" panose="02040503050406030204" pitchFamily="18" charset="0"/>
                               </a:rPr>
                             </m:ctrlPr>
                           </m:dPr>
                           <m:e>
                             <m:r>
-                              <a:rPr lang="en-GB" sz="982" i="1">
+                              <a:rPr lang="en-GB" sz="1000" i="1">
                                 <a:latin typeface="Cambria Math" panose="02040503050406030204" pitchFamily="18" charset="0"/>
                               </a:rPr>
                               <m:t>𝑒</m:t>
                             </m:r>
                             <m:r>
-                              <a:rPr lang="en-GB" sz="982" i="1">
+                              <a:rPr lang="en-GB" sz="1000" i="1">
                                 <a:latin typeface="Cambria Math" panose="02040503050406030204" pitchFamily="18" charset="0"/>
                               </a:rPr>
                               <m:t>,</m:t>
                             </m:r>
                             <m:r>
-                              <a:rPr lang="en-GB" sz="982" i="1">
+                              <a:rPr lang="en-GB" sz="1000" i="1">
                                 <a:latin typeface="Cambria Math" panose="02040503050406030204" pitchFamily="18" charset="0"/>
                               </a:rPr>
                               <m:t>𝑟</m:t>
@@ -6616,7 +6616,7 @@
                           </m:e>
                         </m:d>
                         <m:r>
-                          <a:rPr lang="en-GB" sz="982" i="1">
+                          <a:rPr lang="en-GB" sz="1000" i="1">
                             <a:latin typeface="Cambria Math" panose="02040503050406030204" pitchFamily="18" charset="0"/>
                           </a:rPr>
                           <m:t> ?</m:t>
@@ -6624,7 +6624,7 @@
                       </m:oMath>
                     </m:oMathPara>
                   </a14:m>
-                  <a:endParaRPr lang="en-GB" sz="982" i="1" dirty="0">
+                  <a:endParaRPr lang="en-GB" sz="1000" i="1" dirty="0">
                     <a:latin typeface="Cambria Math" panose="02040503050406030204" pitchFamily="18" charset="0"/>
                   </a:endParaRPr>
                 </a:p>
@@ -6639,14 +6639,14 @@
                         <m:sSub>
                           <m:sSubPr>
                             <m:ctrlPr>
-                              <a:rPr lang="ar-AE" sz="982" i="1">
+                              <a:rPr lang="ar-AE" sz="1000" i="1">
                                 <a:latin typeface="Cambria Math" panose="02040503050406030204" pitchFamily="18" charset="0"/>
                               </a:rPr>
                             </m:ctrlPr>
                           </m:sSubPr>
                           <m:e>
                             <m:r>
-                              <a:rPr lang="ar-AE" sz="982">
+                              <a:rPr lang="ar-AE" sz="1000">
                                 <a:latin typeface="Cambria Math" panose="02040503050406030204" pitchFamily="18" charset="0"/>
                               </a:rPr>
                               <m:t>𝑓</m:t>
@@ -6654,7 +6654,7 @@
                           </m:e>
                           <m:sub>
                             <m:r>
-                              <a:rPr lang="ar-AE" sz="982">
+                              <a:rPr lang="ar-AE" sz="1000">
                                 <a:latin typeface="Cambria Math" panose="02040503050406030204" pitchFamily="18" charset="0"/>
                               </a:rPr>
                               <m:t>𝑋</m:t>
@@ -6662,13 +6662,13 @@
                           </m:sub>
                         </m:sSub>
                         <m:r>
-                          <a:rPr lang="en-GB" sz="982" i="1">
+                          <a:rPr lang="en-GB" sz="1000" i="1">
                             <a:latin typeface="Cambria Math" panose="02040503050406030204" pitchFamily="18" charset="0"/>
                           </a:rPr>
                           <m:t>=</m:t>
                         </m:r>
                         <m:r>
-                          <a:rPr lang="en-GB" sz="982" i="1">
+                          <a:rPr lang="en-GB" sz="1000" i="1">
                             <a:latin typeface="Cambria Math" panose="02040503050406030204" pitchFamily="18" charset="0"/>
                           </a:rPr>
                           <m:t>𝑓</m:t>
@@ -6676,20 +6676,20 @@
                         <m:d>
                           <m:dPr>
                             <m:ctrlPr>
-                              <a:rPr lang="en-GB" sz="982" i="1">
+                              <a:rPr lang="en-GB" sz="1000" i="1">
                                 <a:latin typeface="Cambria Math" panose="02040503050406030204" pitchFamily="18" charset="0"/>
                               </a:rPr>
                             </m:ctrlPr>
                           </m:dPr>
                           <m:e>
                             <m:r>
-                              <a:rPr lang="en-GB" sz="982" i="1">
+                              <a:rPr lang="en-GB" sz="1000" i="1">
                                 <a:latin typeface="Cambria Math" panose="02040503050406030204" pitchFamily="18" charset="0"/>
                               </a:rPr>
                               <m:t>𝑒</m:t>
                             </m:r>
                             <m:r>
-                              <a:rPr lang="en-GB" sz="982" i="1">
+                              <a:rPr lang="en-GB" sz="1000" i="1">
                                 <a:latin typeface="Cambria Math" panose="02040503050406030204" pitchFamily="18" charset="0"/>
                               </a:rPr>
                               <m:t>,</m:t>
@@ -6697,14 +6697,14 @@
                             <m:sSub>
                               <m:sSubPr>
                                 <m:ctrlPr>
-                                  <a:rPr lang="en-GB" sz="982" i="1">
+                                  <a:rPr lang="en-GB" sz="1000" i="1">
                                     <a:latin typeface="Cambria Math" panose="02040503050406030204" pitchFamily="18" charset="0"/>
                                   </a:rPr>
                                 </m:ctrlPr>
                               </m:sSubPr>
                               <m:e>
                                 <m:r>
-                                  <a:rPr lang="en-GB" sz="982" i="1">
+                                  <a:rPr lang="en-GB" sz="1000" i="1">
                                     <a:latin typeface="Cambria Math" panose="02040503050406030204" pitchFamily="18" charset="0"/>
                                   </a:rPr>
                                   <m:t>𝑟</m:t>
@@ -6712,7 +6712,7 @@
                               </m:e>
                               <m:sub>
                                 <m:r>
-                                  <a:rPr lang="en-GB" sz="982" i="1">
+                                  <a:rPr lang="en-GB" sz="1000" i="1">
                                     <a:latin typeface="Cambria Math" panose="02040503050406030204" pitchFamily="18" charset="0"/>
                                   </a:rPr>
                                   <m:t>𝑎</m:t>
@@ -6722,7 +6722,7 @@
                           </m:e>
                         </m:d>
                         <m:r>
-                          <a:rPr lang="en-GB" sz="982" i="1">
+                          <a:rPr lang="en-GB" sz="1000" i="1">
                             <a:latin typeface="Cambria Math" panose="02040503050406030204" pitchFamily="18" charset="0"/>
                           </a:rPr>
                           <m:t> ?</m:t>
@@ -6730,14 +6730,14 @@
                       </m:oMath>
                     </m:oMathPara>
                   </a14:m>
-                  <a:endParaRPr lang="en-GB" sz="982" i="1" dirty="0">
+                  <a:endParaRPr lang="en-GB" sz="1000" i="1" dirty="0">
                     <a:latin typeface="Cambria Math" panose="02040503050406030204" pitchFamily="18" charset="0"/>
                   </a:endParaRPr>
                 </a:p>
                 <a:p>
                   <a:pPr algn="ctr"/>
                   <a:r>
-                    <a:rPr lang="en-GB" sz="982" i="1" dirty="0">
+                    <a:rPr lang="en-GB" sz="1000" i="1" dirty="0">
                       <a:latin typeface="Cambria Math" panose="02040503050406030204" pitchFamily="18" charset="0"/>
                     </a:rPr>
                     <a:t>…</a:t>
@@ -6746,13 +6746,13 @@
               </p:txBody>
             </p:sp>
           </mc:Choice>
-          <mc:Fallback xmlns="">
+          <mc:Fallback>
             <p:sp>
               <p:nvSpPr>
-                <p:cNvPr id="26" name="Rectangle 25">
+                <p:cNvPr id="9" name="Rectangle 8">
                   <a:extLst>
                     <a:ext uri="{FF2B5EF4-FFF2-40B4-BE49-F238E27FC236}">
-                      <a16:creationId xmlns:a16="http://schemas.microsoft.com/office/drawing/2014/main" id="{FBFC93C4-424F-AD45-8FE1-389A9D093FD9}"/>
+                      <a16:creationId xmlns:a16="http://schemas.microsoft.com/office/drawing/2014/main" id="{E010211B-572D-D943-89CF-BA10E7F4ED7E}"/>
                     </a:ext>
                   </a:extLst>
                 </p:cNvPr>
@@ -6764,7 +6764,7 @@
               <p:spPr>
                 <a:xfrm>
                   <a:off x="4677659" y="1419894"/>
-                  <a:ext cx="929973" cy="377811"/>
+                  <a:ext cx="929973" cy="383537"/>
                 </a:xfrm>
                 <a:prstGeom prst="rect">
                   <a:avLst/>
@@ -6772,7 +6772,7 @@
                 <a:blipFill>
                   <a:blip r:embed="rId6"/>
                   <a:stretch>
-                    <a:fillRect b="-6818"/>
+                    <a:fillRect b="-4444"/>
                   </a:stretch>
                 </a:blipFill>
               </p:spPr>
@@ -6821,7 +6821,7 @@
             <a:p>
               <a:pPr algn="ctr"/>
               <a:r>
-                <a:rPr lang="en-US" sz="1011" dirty="0"/>
+                <a:rPr lang="en-US" sz="1000" dirty="0"/>
                 <a:t>1 sector</a:t>
               </a:r>
             </a:p>
@@ -6857,7 +6857,7 @@
             <a:p>
               <a:pPr algn="ctr"/>
               <a:r>
-                <a:rPr lang="en-US" sz="1011" dirty="0"/>
+                <a:rPr lang="en-US" sz="1000" dirty="0"/>
                 <a:t>2 sectors</a:t>
               </a:r>
             </a:p>
@@ -6886,7 +6886,7 @@
         </p:blipFill>
         <p:spPr>
           <a:xfrm>
-            <a:off x="3294086" y="462652"/>
+            <a:off x="3244391" y="462652"/>
             <a:ext cx="2216449" cy="1994400"/>
           </a:xfrm>
           <a:prstGeom prst="rect">
@@ -6916,8 +6916,8 @@
         </p:blipFill>
         <p:spPr>
           <a:xfrm>
-            <a:off x="5857210" y="2951534"/>
-            <a:ext cx="2000405" cy="1989384"/>
+            <a:off x="5857209" y="2951534"/>
+            <a:ext cx="2063368" cy="2052000"/>
           </a:xfrm>
           <a:prstGeom prst="rect">
             <a:avLst/>
@@ -6946,8 +6946,8 @@
         </p:blipFill>
         <p:spPr>
           <a:xfrm>
-            <a:off x="1020666" y="2805230"/>
-            <a:ext cx="2004923" cy="2160000"/>
+            <a:off x="881519" y="2805230"/>
+            <a:ext cx="2071754" cy="2232000"/>
           </a:xfrm>
           <a:prstGeom prst="rect">
             <a:avLst/>
@@ -6976,8 +6976,8 @@
         </p:blipFill>
         <p:spPr>
           <a:xfrm>
-            <a:off x="3436473" y="2805230"/>
-            <a:ext cx="2004923" cy="2160000"/>
+            <a:off x="3374990" y="2805230"/>
+            <a:ext cx="2071754" cy="2232000"/>
           </a:xfrm>
           <a:prstGeom prst="rect">
             <a:avLst/>
@@ -7006,7 +7006,7 @@
         </p:blipFill>
         <p:spPr>
           <a:xfrm>
-            <a:off x="5639955" y="462652"/>
+            <a:off x="5689650" y="462652"/>
             <a:ext cx="2216449" cy="1994400"/>
           </a:xfrm>
           <a:prstGeom prst="rect">
@@ -7014,6 +7014,304 @@
           </a:prstGeom>
         </p:spPr>
       </p:pic>
+      <p:sp>
+        <p:nvSpPr>
+          <p:cNvPr id="19" name="TextBox 18">
+            <a:extLst>
+              <a:ext uri="{FF2B5EF4-FFF2-40B4-BE49-F238E27FC236}">
+                <a16:creationId xmlns:a16="http://schemas.microsoft.com/office/drawing/2014/main" id="{20507238-4087-2D47-964A-1B78B92EF112}"/>
+              </a:ext>
+            </a:extLst>
+          </p:cNvPr>
+          <p:cNvSpPr txBox="1"/>
+          <p:nvPr/>
+        </p:nvSpPr>
+        <p:spPr>
+          <a:xfrm>
+            <a:off x="3007303" y="170654"/>
+            <a:ext cx="653849" cy="369332"/>
+          </a:xfrm>
+          <a:prstGeom prst="rect">
+            <a:avLst/>
+          </a:prstGeom>
+          <a:noFill/>
+        </p:spPr>
+        <p:txBody>
+          <a:bodyPr wrap="square" rtlCol="0">
+            <a:spAutoFit/>
+          </a:bodyPr>
+          <a:lstStyle/>
+          <a:p>
+            <a:pPr algn="ctr"/>
+            <a:r>
+              <a:rPr lang="en-US" dirty="0"/>
+              <a:t>B</a:t>
+            </a:r>
+          </a:p>
+        </p:txBody>
+      </p:sp>
+      <p:sp>
+        <p:nvSpPr>
+          <p:cNvPr id="21" name="TextBox 20">
+            <a:extLst>
+              <a:ext uri="{FF2B5EF4-FFF2-40B4-BE49-F238E27FC236}">
+                <a16:creationId xmlns:a16="http://schemas.microsoft.com/office/drawing/2014/main" id="{21F4215F-59F0-B54E-9769-46355C84593F}"/>
+              </a:ext>
+            </a:extLst>
+          </p:cNvPr>
+          <p:cNvSpPr txBox="1"/>
+          <p:nvPr/>
+        </p:nvSpPr>
+        <p:spPr>
+          <a:xfrm>
+            <a:off x="540959" y="174634"/>
+            <a:ext cx="653849" cy="369332"/>
+          </a:xfrm>
+          <a:prstGeom prst="rect">
+            <a:avLst/>
+          </a:prstGeom>
+          <a:noFill/>
+        </p:spPr>
+        <p:txBody>
+          <a:bodyPr wrap="square" rtlCol="0">
+            <a:spAutoFit/>
+          </a:bodyPr>
+          <a:lstStyle/>
+          <a:p>
+            <a:pPr algn="ctr"/>
+            <a:r>
+              <a:rPr lang="en-US" dirty="0"/>
+              <a:t>A</a:t>
+            </a:r>
+          </a:p>
+        </p:txBody>
+      </p:sp>
+      <p:sp>
+        <p:nvSpPr>
+          <p:cNvPr id="22" name="TextBox 21">
+            <a:extLst>
+              <a:ext uri="{FF2B5EF4-FFF2-40B4-BE49-F238E27FC236}">
+                <a16:creationId xmlns:a16="http://schemas.microsoft.com/office/drawing/2014/main" id="{27551EE1-A98C-2041-A253-62722020151F}"/>
+              </a:ext>
+            </a:extLst>
+          </p:cNvPr>
+          <p:cNvSpPr txBox="1"/>
+          <p:nvPr/>
+        </p:nvSpPr>
+        <p:spPr>
+          <a:xfrm>
+            <a:off x="5491091" y="180663"/>
+            <a:ext cx="653849" cy="369332"/>
+          </a:xfrm>
+          <a:prstGeom prst="rect">
+            <a:avLst/>
+          </a:prstGeom>
+          <a:noFill/>
+        </p:spPr>
+        <p:txBody>
+          <a:bodyPr wrap="square" rtlCol="0">
+            <a:spAutoFit/>
+          </a:bodyPr>
+          <a:lstStyle/>
+          <a:p>
+            <a:pPr algn="ctr"/>
+            <a:r>
+              <a:rPr lang="en-US" dirty="0"/>
+              <a:t>C</a:t>
+            </a:r>
+          </a:p>
+        </p:txBody>
+      </p:sp>
+      <p:sp>
+        <p:nvSpPr>
+          <p:cNvPr id="23" name="TextBox 22">
+            <a:extLst>
+              <a:ext uri="{FF2B5EF4-FFF2-40B4-BE49-F238E27FC236}">
+                <a16:creationId xmlns:a16="http://schemas.microsoft.com/office/drawing/2014/main" id="{F297667D-011D-CD4B-A527-B5CF14C57BDE}"/>
+              </a:ext>
+            </a:extLst>
+          </p:cNvPr>
+          <p:cNvSpPr txBox="1"/>
+          <p:nvPr/>
+        </p:nvSpPr>
+        <p:spPr>
+          <a:xfrm>
+            <a:off x="634957" y="2582202"/>
+            <a:ext cx="653849" cy="369332"/>
+          </a:xfrm>
+          <a:prstGeom prst="rect">
+            <a:avLst/>
+          </a:prstGeom>
+          <a:noFill/>
+        </p:spPr>
+        <p:txBody>
+          <a:bodyPr wrap="square" rtlCol="0">
+            <a:spAutoFit/>
+          </a:bodyPr>
+          <a:lstStyle/>
+          <a:p>
+            <a:pPr algn="ctr"/>
+            <a:r>
+              <a:rPr lang="en-US" dirty="0"/>
+              <a:t>D</a:t>
+            </a:r>
+          </a:p>
+        </p:txBody>
+      </p:sp>
+      <p:sp>
+        <p:nvSpPr>
+          <p:cNvPr id="24" name="TextBox 23">
+            <a:extLst>
+              <a:ext uri="{FF2B5EF4-FFF2-40B4-BE49-F238E27FC236}">
+                <a16:creationId xmlns:a16="http://schemas.microsoft.com/office/drawing/2014/main" id="{C420FE4E-2EA8-9840-8AFC-3AE73632EBDF}"/>
+              </a:ext>
+            </a:extLst>
+          </p:cNvPr>
+          <p:cNvSpPr txBox="1"/>
+          <p:nvPr/>
+        </p:nvSpPr>
+        <p:spPr>
+          <a:xfrm>
+            <a:off x="3020659" y="2604363"/>
+            <a:ext cx="653849" cy="369332"/>
+          </a:xfrm>
+          <a:prstGeom prst="rect">
+            <a:avLst/>
+          </a:prstGeom>
+          <a:noFill/>
+        </p:spPr>
+        <p:txBody>
+          <a:bodyPr wrap="square" rtlCol="0">
+            <a:spAutoFit/>
+          </a:bodyPr>
+          <a:lstStyle/>
+          <a:p>
+            <a:pPr algn="ctr"/>
+            <a:r>
+              <a:rPr lang="en-US" dirty="0"/>
+              <a:t>E</a:t>
+            </a:r>
+          </a:p>
+        </p:txBody>
+      </p:sp>
+      <p:sp>
+        <p:nvSpPr>
+          <p:cNvPr id="25" name="TextBox 24">
+            <a:extLst>
+              <a:ext uri="{FF2B5EF4-FFF2-40B4-BE49-F238E27FC236}">
+                <a16:creationId xmlns:a16="http://schemas.microsoft.com/office/drawing/2014/main" id="{5E4D8413-5FED-1646-BA5D-1F9555E1FBCA}"/>
+              </a:ext>
+            </a:extLst>
+          </p:cNvPr>
+          <p:cNvSpPr txBox="1"/>
+          <p:nvPr/>
+        </p:nvSpPr>
+        <p:spPr>
+          <a:xfrm>
+            <a:off x="5491091" y="2620564"/>
+            <a:ext cx="653849" cy="369332"/>
+          </a:xfrm>
+          <a:prstGeom prst="rect">
+            <a:avLst/>
+          </a:prstGeom>
+          <a:noFill/>
+        </p:spPr>
+        <p:txBody>
+          <a:bodyPr wrap="square" rtlCol="0">
+            <a:spAutoFit/>
+          </a:bodyPr>
+          <a:lstStyle/>
+          <a:p>
+            <a:pPr algn="ctr"/>
+            <a:r>
+              <a:rPr lang="en-US" dirty="0"/>
+              <a:t>F</a:t>
+            </a:r>
+          </a:p>
+        </p:txBody>
+      </p:sp>
+      <p:cxnSp>
+        <p:nvCxnSpPr>
+          <p:cNvPr id="27" name="Straight Connector 26">
+            <a:extLst>
+              <a:ext uri="{FF2B5EF4-FFF2-40B4-BE49-F238E27FC236}">
+                <a16:creationId xmlns:a16="http://schemas.microsoft.com/office/drawing/2014/main" id="{B3F9305B-2E5A-BD4F-AC61-F45DADDEE5B4}"/>
+              </a:ext>
+            </a:extLst>
+          </p:cNvPr>
+          <p:cNvCxnSpPr>
+            <a:cxnSpLocks/>
+          </p:cNvCxnSpPr>
+          <p:nvPr/>
+        </p:nvCxnSpPr>
+        <p:spPr>
+          <a:xfrm flipV="1">
+            <a:off x="2273224" y="948153"/>
+            <a:ext cx="218779" cy="27550"/>
+          </a:xfrm>
+          <a:prstGeom prst="line">
+            <a:avLst/>
+          </a:prstGeom>
+          <a:ln w="12700">
+            <a:solidFill>
+              <a:schemeClr val="tx1">
+                <a:lumMod val="50000"/>
+                <a:lumOff val="50000"/>
+              </a:schemeClr>
+            </a:solidFill>
+          </a:ln>
+        </p:spPr>
+        <p:style>
+          <a:lnRef idx="1">
+            <a:schemeClr val="accent1"/>
+          </a:lnRef>
+          <a:fillRef idx="0">
+            <a:schemeClr val="accent1"/>
+          </a:fillRef>
+          <a:effectRef idx="0">
+            <a:schemeClr val="accent1"/>
+          </a:effectRef>
+          <a:fontRef idx="minor">
+            <a:schemeClr val="tx1"/>
+          </a:fontRef>
+        </p:style>
+      </p:cxnSp>
+      <p:sp>
+        <p:nvSpPr>
+          <p:cNvPr id="29" name="TextBox 28">
+            <a:extLst>
+              <a:ext uri="{FF2B5EF4-FFF2-40B4-BE49-F238E27FC236}">
+                <a16:creationId xmlns:a16="http://schemas.microsoft.com/office/drawing/2014/main" id="{56D539A0-2282-9F42-84DD-84E704C697CE}"/>
+              </a:ext>
+            </a:extLst>
+          </p:cNvPr>
+          <p:cNvSpPr txBox="1"/>
+          <p:nvPr/>
+        </p:nvSpPr>
+        <p:spPr>
+          <a:xfrm>
+            <a:off x="2451139" y="819101"/>
+            <a:ext cx="675188" cy="247888"/>
+          </a:xfrm>
+          <a:prstGeom prst="rect">
+            <a:avLst/>
+          </a:prstGeom>
+          <a:noFill/>
+        </p:spPr>
+        <p:txBody>
+          <a:bodyPr wrap="square" rtlCol="0">
+            <a:spAutoFit/>
+          </a:bodyPr>
+          <a:lstStyle/>
+          <a:p>
+            <a:pPr algn="ctr"/>
+            <a:r>
+              <a:rPr lang="en-US" sz="1000" dirty="0"/>
+              <a:t>invariant</a:t>
+            </a:r>
+          </a:p>
+        </p:txBody>
+      </p:sp>
     </p:spTree>
     <p:extLst>
       <p:ext uri="{BB962C8B-B14F-4D97-AF65-F5344CB8AC3E}">

</xml_diff>

<commit_message>
work on figure 3!
</commit_message>
<xml_diff>
--- a/figure-assembly/figure-3.pptx
+++ b/figure-assembly/figure-3.pptx
@@ -5,9 +5,9 @@
     <p:sldMasterId id="2147483672" r:id="rId1"/>
   </p:sldMasterIdLst>
   <p:sldIdLst>
-    <p:sldId id="256" r:id="rId2"/>
-    <p:sldId id="257" r:id="rId3"/>
-    <p:sldId id="258" r:id="rId4"/>
+    <p:sldId id="258" r:id="rId2"/>
+    <p:sldId id="256" r:id="rId3"/>
+    <p:sldId id="257" r:id="rId4"/>
   </p:sldIdLst>
   <p:sldSz cx="9906000" cy="6858000" type="A4"/>
   <p:notesSz cx="6858000" cy="9144000"/>
@@ -245,7 +245,7 @@
           <a:p>
             <a:fld id="{25EC0CD3-564D-9742-98B5-86271438CCE6}" type="datetimeFigureOut">
               <a:rPr lang="en-US" smtClean="0"/>
-              <a:t>2/9/19</a:t>
+              <a:t>2/13/19</a:t>
             </a:fld>
             <a:endParaRPr lang="en-US"/>
           </a:p>
@@ -415,7 +415,7 @@
           <a:p>
             <a:fld id="{25EC0CD3-564D-9742-98B5-86271438CCE6}" type="datetimeFigureOut">
               <a:rPr lang="en-US" smtClean="0"/>
-              <a:t>2/9/19</a:t>
+              <a:t>2/13/19</a:t>
             </a:fld>
             <a:endParaRPr lang="en-US"/>
           </a:p>
@@ -595,7 +595,7 @@
           <a:p>
             <a:fld id="{25EC0CD3-564D-9742-98B5-86271438CCE6}" type="datetimeFigureOut">
               <a:rPr lang="en-US" smtClean="0"/>
-              <a:t>2/9/19</a:t>
+              <a:t>2/13/19</a:t>
             </a:fld>
             <a:endParaRPr lang="en-US"/>
           </a:p>
@@ -765,7 +765,7 @@
           <a:p>
             <a:fld id="{25EC0CD3-564D-9742-98B5-86271438CCE6}" type="datetimeFigureOut">
               <a:rPr lang="en-US" smtClean="0"/>
-              <a:t>2/9/19</a:t>
+              <a:t>2/13/19</a:t>
             </a:fld>
             <a:endParaRPr lang="en-US"/>
           </a:p>
@@ -1009,7 +1009,7 @@
           <a:p>
             <a:fld id="{25EC0CD3-564D-9742-98B5-86271438CCE6}" type="datetimeFigureOut">
               <a:rPr lang="en-US" smtClean="0"/>
-              <a:t>2/9/19</a:t>
+              <a:t>2/13/19</a:t>
             </a:fld>
             <a:endParaRPr lang="en-US"/>
           </a:p>
@@ -1241,7 +1241,7 @@
           <a:p>
             <a:fld id="{25EC0CD3-564D-9742-98B5-86271438CCE6}" type="datetimeFigureOut">
               <a:rPr lang="en-US" smtClean="0"/>
-              <a:t>2/9/19</a:t>
+              <a:t>2/13/19</a:t>
             </a:fld>
             <a:endParaRPr lang="en-US"/>
           </a:p>
@@ -1608,7 +1608,7 @@
           <a:p>
             <a:fld id="{25EC0CD3-564D-9742-98B5-86271438CCE6}" type="datetimeFigureOut">
               <a:rPr lang="en-US" smtClean="0"/>
-              <a:t>2/9/19</a:t>
+              <a:t>2/13/19</a:t>
             </a:fld>
             <a:endParaRPr lang="en-US"/>
           </a:p>
@@ -1726,7 +1726,7 @@
           <a:p>
             <a:fld id="{25EC0CD3-564D-9742-98B5-86271438CCE6}" type="datetimeFigureOut">
               <a:rPr lang="en-US" smtClean="0"/>
-              <a:t>2/9/19</a:t>
+              <a:t>2/13/19</a:t>
             </a:fld>
             <a:endParaRPr lang="en-US"/>
           </a:p>
@@ -1821,7 +1821,7 @@
           <a:p>
             <a:fld id="{25EC0CD3-564D-9742-98B5-86271438CCE6}" type="datetimeFigureOut">
               <a:rPr lang="en-US" smtClean="0"/>
-              <a:t>2/9/19</a:t>
+              <a:t>2/13/19</a:t>
             </a:fld>
             <a:endParaRPr lang="en-US"/>
           </a:p>
@@ -2098,7 +2098,7 @@
           <a:p>
             <a:fld id="{25EC0CD3-564D-9742-98B5-86271438CCE6}" type="datetimeFigureOut">
               <a:rPr lang="en-US" smtClean="0"/>
-              <a:t>2/9/19</a:t>
+              <a:t>2/13/19</a:t>
             </a:fld>
             <a:endParaRPr lang="en-US"/>
           </a:p>
@@ -2355,7 +2355,7 @@
           <a:p>
             <a:fld id="{25EC0CD3-564D-9742-98B5-86271438CCE6}" type="datetimeFigureOut">
               <a:rPr lang="en-US" smtClean="0"/>
-              <a:t>2/9/19</a:t>
+              <a:t>2/13/19</a:t>
             </a:fld>
             <a:endParaRPr lang="en-US"/>
           </a:p>
@@ -2568,7 +2568,7 @@
           <a:p>
             <a:fld id="{25EC0CD3-564D-9742-98B5-86271438CCE6}" type="datetimeFigureOut">
               <a:rPr lang="en-US" smtClean="0"/>
-              <a:t>2/9/19</a:t>
+              <a:t>2/13/19</a:t>
             </a:fld>
             <a:endParaRPr lang="en-US"/>
           </a:p>
@@ -2957,6 +2957,1611 @@
 </file>
 
 <file path=ppt/slides/slide1.xml><?xml version="1.0" encoding="utf-8"?>
+<p:sld xmlns:a="http://schemas.openxmlformats.org/drawingml/2006/main" xmlns:r="http://schemas.openxmlformats.org/officeDocument/2006/relationships" xmlns:p="http://schemas.openxmlformats.org/presentationml/2006/main">
+  <p:cSld>
+    <p:spTree>
+      <p:nvGrpSpPr>
+        <p:cNvPr id="1" name=""/>
+        <p:cNvGrpSpPr/>
+        <p:nvPr/>
+      </p:nvGrpSpPr>
+      <p:grpSpPr>
+        <a:xfrm>
+          <a:off x="0" y="0"/>
+          <a:ext cx="0" cy="0"/>
+          <a:chOff x="0" y="0"/>
+          <a:chExt cx="0" cy="0"/>
+        </a:xfrm>
+      </p:grpSpPr>
+      <p:pic>
+        <p:nvPicPr>
+          <p:cNvPr id="41" name="Picture 40">
+            <a:extLst>
+              <a:ext uri="{FF2B5EF4-FFF2-40B4-BE49-F238E27FC236}">
+                <a16:creationId xmlns:a16="http://schemas.microsoft.com/office/drawing/2014/main" id="{A655A352-AC0B-CD4C-A87A-EDD9E337C163}"/>
+              </a:ext>
+            </a:extLst>
+          </p:cNvPr>
+          <p:cNvPicPr>
+            <a:picLocks noChangeAspect="1"/>
+          </p:cNvPicPr>
+          <p:nvPr/>
+        </p:nvPicPr>
+        <p:blipFill>
+          <a:blip r:embed="rId2"/>
+          <a:stretch>
+            <a:fillRect/>
+          </a:stretch>
+        </p:blipFill>
+        <p:spPr>
+          <a:xfrm>
+            <a:off x="5645771" y="428081"/>
+            <a:ext cx="2217600" cy="1995436"/>
+          </a:xfrm>
+          <a:prstGeom prst="rect">
+            <a:avLst/>
+          </a:prstGeom>
+        </p:spPr>
+      </p:pic>
+      <p:pic>
+        <p:nvPicPr>
+          <p:cNvPr id="39" name="Picture 38">
+            <a:extLst>
+              <a:ext uri="{FF2B5EF4-FFF2-40B4-BE49-F238E27FC236}">
+                <a16:creationId xmlns:a16="http://schemas.microsoft.com/office/drawing/2014/main" id="{7D561F86-DEFC-C04C-9D00-A0B4EE7B9415}"/>
+              </a:ext>
+            </a:extLst>
+          </p:cNvPr>
+          <p:cNvPicPr>
+            <a:picLocks noChangeAspect="1"/>
+          </p:cNvPicPr>
+          <p:nvPr/>
+        </p:nvPicPr>
+        <p:blipFill>
+          <a:blip r:embed="rId3"/>
+          <a:stretch>
+            <a:fillRect/>
+          </a:stretch>
+        </p:blipFill>
+        <p:spPr>
+          <a:xfrm>
+            <a:off x="3226801" y="428081"/>
+            <a:ext cx="2217600" cy="1995436"/>
+          </a:xfrm>
+          <a:prstGeom prst="rect">
+            <a:avLst/>
+          </a:prstGeom>
+        </p:spPr>
+      </p:pic>
+      <p:sp>
+        <p:nvSpPr>
+          <p:cNvPr id="2" name="TextBox 1">
+            <a:extLst>
+              <a:ext uri="{FF2B5EF4-FFF2-40B4-BE49-F238E27FC236}">
+                <a16:creationId xmlns:a16="http://schemas.microsoft.com/office/drawing/2014/main" id="{0B7C7307-DE28-5B43-9C37-B804F1844236}"/>
+              </a:ext>
+            </a:extLst>
+          </p:cNvPr>
+          <p:cNvSpPr txBox="1"/>
+          <p:nvPr/>
+        </p:nvSpPr>
+        <p:spPr>
+          <a:xfrm>
+            <a:off x="433395" y="393560"/>
+            <a:ext cx="3018980" cy="400110"/>
+          </a:xfrm>
+          <a:prstGeom prst="rect">
+            <a:avLst/>
+          </a:prstGeom>
+          <a:noFill/>
+        </p:spPr>
+        <p:txBody>
+          <a:bodyPr wrap="square" rtlCol="0">
+            <a:spAutoFit/>
+          </a:bodyPr>
+          <a:lstStyle/>
+          <a:p>
+            <a:pPr algn="ctr"/>
+            <a:r>
+              <a:rPr lang="en-US" sz="1000" dirty="0"/>
+              <a:t>Regulation of </a:t>
+            </a:r>
+            <a:r>
+              <a:rPr lang="en-US" sz="1000" i="1" dirty="0"/>
+              <a:t>X </a:t>
+            </a:r>
+            <a:r>
+              <a:rPr lang="en-US" sz="1000" dirty="0"/>
+              <a:t>expression </a:t>
+            </a:r>
+          </a:p>
+          <a:p>
+            <a:pPr algn="ctr"/>
+            <a:r>
+              <a:rPr lang="en-US" sz="1000" dirty="0"/>
+              <a:t>by  coarse-grained proteome sectors ? </a:t>
+            </a:r>
+            <a:endParaRPr lang="en-US" sz="1000" i="1" dirty="0"/>
+          </a:p>
+        </p:txBody>
+      </p:sp>
+      <p:grpSp>
+        <p:nvGrpSpPr>
+          <p:cNvPr id="3" name="Group 2">
+            <a:extLst>
+              <a:ext uri="{FF2B5EF4-FFF2-40B4-BE49-F238E27FC236}">
+                <a16:creationId xmlns:a16="http://schemas.microsoft.com/office/drawing/2014/main" id="{2B125E49-DFF6-D145-BB57-74F0E088AC66}"/>
+              </a:ext>
+            </a:extLst>
+          </p:cNvPr>
+          <p:cNvGrpSpPr/>
+          <p:nvPr/>
+        </p:nvGrpSpPr>
+        <p:grpSpPr>
+          <a:xfrm>
+            <a:off x="634957" y="874714"/>
+            <a:ext cx="2582550" cy="1508822"/>
+            <a:chOff x="3819713" y="765944"/>
+            <a:chExt cx="1787919" cy="1044569"/>
+          </a:xfrm>
+        </p:grpSpPr>
+        <p:grpSp>
+          <p:nvGrpSpPr>
+            <p:cNvPr id="4" name="Group 3">
+              <a:extLst>
+                <a:ext uri="{FF2B5EF4-FFF2-40B4-BE49-F238E27FC236}">
+                  <a16:creationId xmlns:a16="http://schemas.microsoft.com/office/drawing/2014/main" id="{FA9E0486-59F0-D745-AA41-3A1D171609F7}"/>
+                </a:ext>
+              </a:extLst>
+            </p:cNvPr>
+            <p:cNvGrpSpPr/>
+            <p:nvPr/>
+          </p:nvGrpSpPr>
+          <p:grpSpPr>
+            <a:xfrm>
+              <a:off x="4037627" y="765944"/>
+              <a:ext cx="1123801" cy="286455"/>
+              <a:chOff x="2233978" y="1508637"/>
+              <a:chExt cx="1997868" cy="509254"/>
+            </a:xfrm>
+          </p:grpSpPr>
+          <mc:AlternateContent xmlns:mc="http://schemas.openxmlformats.org/markup-compatibility/2006" xmlns:a14="http://schemas.microsoft.com/office/drawing/2010/main">
+            <mc:Choice Requires="a14">
+              <p:sp>
+                <p:nvSpPr>
+                  <p:cNvPr id="12" name="Rectangle 11">
+                    <a:extLst>
+                      <a:ext uri="{FF2B5EF4-FFF2-40B4-BE49-F238E27FC236}">
+                        <a16:creationId xmlns:a16="http://schemas.microsoft.com/office/drawing/2014/main" id="{D6968C6D-2F86-A945-A7D1-900F9C99A29E}"/>
+                      </a:ext>
+                    </a:extLst>
+                  </p:cNvPr>
+                  <p:cNvSpPr/>
+                  <p:nvPr/>
+                </p:nvSpPr>
+                <p:spPr>
+                  <a:xfrm>
+                    <a:off x="2233978" y="1508637"/>
+                    <a:ext cx="1997868" cy="509254"/>
+                  </a:xfrm>
+                  <a:prstGeom prst="rect">
+                    <a:avLst/>
+                  </a:prstGeom>
+                </p:spPr>
+                <p:txBody>
+                  <a:bodyPr wrap="square">
+                    <a:spAutoFit/>
+                  </a:bodyPr>
+                  <a:lstStyle/>
+                  <a:p>
+                    <a:pPr/>
+                    <a14:m>
+                      <m:oMathPara xmlns:m="http://schemas.openxmlformats.org/officeDocument/2006/math">
+                        <m:oMathParaPr>
+                          <m:jc m:val="centerGroup"/>
+                        </m:oMathParaPr>
+                        <m:oMath xmlns:m="http://schemas.openxmlformats.org/officeDocument/2006/math">
+                          <m:sSub>
+                            <m:sSubPr>
+                              <m:ctrlPr>
+                                <a:rPr lang="ar-AE" sz="975" i="1" smtClean="0">
+                                  <a:latin typeface="Cambria Math" panose="02040503050406030204" pitchFamily="18" charset="0"/>
+                                </a:rPr>
+                              </m:ctrlPr>
+                            </m:sSubPr>
+                            <m:e>
+                              <m:r>
+                                <a:rPr lang="ar-AE" sz="975">
+                                  <a:latin typeface="Cambria Math" panose="02040503050406030204" pitchFamily="18" charset="0"/>
+                                </a:rPr>
+                                <m:t>𝑉</m:t>
+                              </m:r>
+                            </m:e>
+                            <m:sub>
+                              <m:r>
+                                <a:rPr lang="ar-AE" sz="975">
+                                  <a:latin typeface="Cambria Math" panose="02040503050406030204" pitchFamily="18" charset="0"/>
+                                </a:rPr>
+                                <m:t>𝑑𝑖𝑣</m:t>
+                              </m:r>
+                            </m:sub>
+                          </m:sSub>
+                          <m:r>
+                            <a:rPr lang="en-GB" sz="975" b="0" i="1" smtClean="0">
+                              <a:latin typeface="Cambria Math" panose="02040503050406030204" pitchFamily="18" charset="0"/>
+                              <a:ea typeface="Cambria Math" panose="02040503050406030204" pitchFamily="18" charset="0"/>
+                            </a:rPr>
+                            <m:t>=</m:t>
+                          </m:r>
+                          <m:f>
+                            <m:fPr>
+                              <m:ctrlPr>
+                                <a:rPr lang="ar-AE" sz="975" i="1">
+                                  <a:latin typeface="Cambria Math" panose="02040503050406030204" pitchFamily="18" charset="0"/>
+                                  <a:ea typeface="Cambria Math" panose="02040503050406030204" pitchFamily="18" charset="0"/>
+                                </a:rPr>
+                              </m:ctrlPr>
+                            </m:fPr>
+                            <m:num>
+                              <m:sSub>
+                                <m:sSubPr>
+                                  <m:ctrlPr>
+                                    <a:rPr lang="ar-AE" sz="975" i="1" smtClean="0">
+                                      <a:latin typeface="Cambria Math" panose="02040503050406030204" pitchFamily="18" charset="0"/>
+                                      <a:ea typeface="Cambria Math" panose="02040503050406030204" pitchFamily="18" charset="0"/>
+                                    </a:rPr>
+                                  </m:ctrlPr>
+                                </m:sSubPr>
+                                <m:e>
+                                  <m:r>
+                                    <a:rPr lang="en-GB" sz="975" b="0" i="1" smtClean="0">
+                                      <a:latin typeface="Cambria Math" panose="02040503050406030204" pitchFamily="18" charset="0"/>
+                                      <a:ea typeface="Cambria Math" panose="02040503050406030204" pitchFamily="18" charset="0"/>
+                                    </a:rPr>
+                                    <m:t>𝑋</m:t>
+                                  </m:r>
+                                </m:e>
+                                <m:sub>
+                                  <m:r>
+                                    <a:rPr lang="en-GB" sz="975" b="0" i="1" smtClean="0">
+                                      <a:latin typeface="Cambria Math" panose="02040503050406030204" pitchFamily="18" charset="0"/>
+                                      <a:ea typeface="Cambria Math" panose="02040503050406030204" pitchFamily="18" charset="0"/>
+                                    </a:rPr>
+                                    <m:t>𝑑𝑖𝑣</m:t>
+                                  </m:r>
+                                </m:sub>
+                              </m:sSub>
+                            </m:num>
+                            <m:den>
+                              <m:r>
+                                <a:rPr lang="en-GB" sz="975" i="1">
+                                  <a:latin typeface="Cambria Math" panose="02040503050406030204" pitchFamily="18" charset="0"/>
+                                  <a:ea typeface="Cambria Math" panose="02040503050406030204" pitchFamily="18" charset="0"/>
+                                </a:rPr>
+                                <m:t>𝑥</m:t>
+                              </m:r>
+                            </m:den>
+                          </m:f>
+                          <m:r>
+                            <a:rPr lang="en-GB" sz="975" i="1">
+                              <a:latin typeface="Cambria Math" panose="02040503050406030204" pitchFamily="18" charset="0"/>
+                              <a:ea typeface="Cambria Math" panose="02040503050406030204" pitchFamily="18" charset="0"/>
+                            </a:rPr>
+                            <m:t>=</m:t>
+                          </m:r>
+                          <m:f>
+                            <m:fPr>
+                              <m:ctrlPr>
+                                <a:rPr lang="ar-AE" sz="975" i="1">
+                                  <a:latin typeface="Cambria Math" panose="02040503050406030204" pitchFamily="18" charset="0"/>
+                                </a:rPr>
+                              </m:ctrlPr>
+                            </m:fPr>
+                            <m:num>
+                              <m:sSub>
+                                <m:sSubPr>
+                                  <m:ctrlPr>
+                                    <a:rPr lang="ar-AE" sz="975" i="1" smtClean="0">
+                                      <a:latin typeface="Cambria Math" panose="02040503050406030204" pitchFamily="18" charset="0"/>
+                                    </a:rPr>
+                                  </m:ctrlPr>
+                                </m:sSubPr>
+                                <m:e>
+                                  <m:r>
+                                    <a:rPr lang="en-GB" sz="975" b="0" i="1" smtClean="0">
+                                      <a:latin typeface="Cambria Math" panose="02040503050406030204" pitchFamily="18" charset="0"/>
+                                    </a:rPr>
+                                    <m:t>𝑋</m:t>
+                                  </m:r>
+                                </m:e>
+                                <m:sub>
+                                  <m:r>
+                                    <a:rPr lang="en-GB" sz="975" b="0" i="1" smtClean="0">
+                                      <a:latin typeface="Cambria Math" panose="02040503050406030204" pitchFamily="18" charset="0"/>
+                                    </a:rPr>
+                                    <m:t>𝑑𝑖𝑣</m:t>
+                                  </m:r>
+                                </m:sub>
+                              </m:sSub>
+                            </m:num>
+                            <m:den>
+                              <m:sSub>
+                                <m:sSubPr>
+                                  <m:ctrlPr>
+                                    <a:rPr lang="ar-AE" sz="975" i="1">
+                                      <a:latin typeface="Cambria Math" panose="02040503050406030204" pitchFamily="18" charset="0"/>
+                                    </a:rPr>
+                                  </m:ctrlPr>
+                                </m:sSubPr>
+                                <m:e>
+                                  <m:r>
+                                    <a:rPr lang="ar-AE" sz="975">
+                                      <a:latin typeface="Cambria Math" panose="02040503050406030204" pitchFamily="18" charset="0"/>
+                                    </a:rPr>
+                                    <m:t>𝑓</m:t>
+                                  </m:r>
+                                </m:e>
+                                <m:sub>
+                                  <m:r>
+                                    <a:rPr lang="ar-AE" sz="975">
+                                      <a:latin typeface="Cambria Math" panose="02040503050406030204" pitchFamily="18" charset="0"/>
+                                    </a:rPr>
+                                    <m:t>𝑋</m:t>
+                                  </m:r>
+                                </m:sub>
+                              </m:sSub>
+                              <m:r>
+                                <a:rPr lang="ar-AE" sz="975">
+                                  <a:latin typeface="Cambria Math" panose="02040503050406030204" pitchFamily="18" charset="0"/>
+                                </a:rPr>
+                                <m:t>(1−</m:t>
+                              </m:r>
+                              <m:r>
+                                <a:rPr lang="ar-AE" sz="975">
+                                  <a:latin typeface="Cambria Math" panose="02040503050406030204" pitchFamily="18" charset="0"/>
+                                </a:rPr>
+                                <m:t>𝑎</m:t>
+                              </m:r>
+                              <m:r>
+                                <a:rPr lang="ar-AE" sz="975">
+                                  <a:latin typeface="Cambria Math" panose="02040503050406030204" pitchFamily="18" charset="0"/>
+                                </a:rPr>
+                                <m:t>)</m:t>
+                              </m:r>
+                            </m:den>
+                          </m:f>
+                        </m:oMath>
+                      </m:oMathPara>
+                    </a14:m>
+                    <a:endParaRPr lang="en-US" sz="975" dirty="0"/>
+                  </a:p>
+                </p:txBody>
+              </p:sp>
+            </mc:Choice>
+            <mc:Fallback xmlns="">
+              <p:sp>
+                <p:nvSpPr>
+                  <p:cNvPr id="5" name="Rectangle 4">
+                    <a:extLst>
+                      <a:ext uri="{FF2B5EF4-FFF2-40B4-BE49-F238E27FC236}">
+                        <a16:creationId xmlns:a16="http://schemas.microsoft.com/office/drawing/2014/main" id="{FAF41DE5-820C-514A-964A-465E1F99AF43}"/>
+                      </a:ext>
+                    </a:extLst>
+                  </p:cNvPr>
+                  <p:cNvSpPr>
+                    <a:spLocks noRot="1" noChangeAspect="1" noMove="1" noResize="1" noEditPoints="1" noAdjustHandles="1" noChangeArrowheads="1" noChangeShapeType="1" noTextEdit="1"/>
+                  </p:cNvSpPr>
+                  <p:nvPr/>
+                </p:nvSpPr>
+                <p:spPr>
+                  <a:xfrm>
+                    <a:off x="2233978" y="1508637"/>
+                    <a:ext cx="1997868" cy="509254"/>
+                  </a:xfrm>
+                  <a:prstGeom prst="rect">
+                    <a:avLst/>
+                  </a:prstGeom>
+                  <a:blipFill>
+                    <a:blip r:embed="rId4"/>
+                    <a:stretch>
+                      <a:fillRect/>
+                    </a:stretch>
+                  </a:blipFill>
+                </p:spPr>
+                <p:txBody>
+                  <a:bodyPr/>
+                  <a:lstStyle/>
+                  <a:p>
+                    <a:r>
+                      <a:rPr lang="en-US">
+                        <a:noFill/>
+                      </a:rPr>
+                      <a:t> </a:t>
+                    </a:r>
+                  </a:p>
+                </p:txBody>
+              </p:sp>
+            </mc:Fallback>
+          </mc:AlternateContent>
+          <p:sp>
+            <p:nvSpPr>
+              <p:cNvPr id="13" name="Rounded Rectangle 12">
+                <a:extLst>
+                  <a:ext uri="{FF2B5EF4-FFF2-40B4-BE49-F238E27FC236}">
+                    <a16:creationId xmlns:a16="http://schemas.microsoft.com/office/drawing/2014/main" id="{9A48231A-EE8A-3441-A88C-43A0B143E614}"/>
+                  </a:ext>
+                </a:extLst>
+              </p:cNvPr>
+              <p:cNvSpPr/>
+              <p:nvPr/>
+            </p:nvSpPr>
+            <p:spPr>
+              <a:xfrm>
+                <a:off x="3369621" y="1776341"/>
+                <a:ext cx="166977" cy="198229"/>
+              </a:xfrm>
+              <a:prstGeom prst="roundRect">
+                <a:avLst/>
+              </a:prstGeom>
+              <a:noFill/>
+              <a:ln>
+                <a:solidFill>
+                  <a:srgbClr val="FF0000"/>
+                </a:solidFill>
+              </a:ln>
+            </p:spPr>
+            <p:style>
+              <a:lnRef idx="2">
+                <a:schemeClr val="accent1">
+                  <a:shade val="50000"/>
+                </a:schemeClr>
+              </a:lnRef>
+              <a:fillRef idx="1">
+                <a:schemeClr val="accent1"/>
+              </a:fillRef>
+              <a:effectRef idx="0">
+                <a:schemeClr val="accent1"/>
+              </a:effectRef>
+              <a:fontRef idx="minor">
+                <a:schemeClr val="lt1"/>
+              </a:fontRef>
+            </p:style>
+            <p:txBody>
+              <a:bodyPr rtlCol="0" anchor="ctr"/>
+              <a:lstStyle/>
+              <a:p>
+                <a:pPr algn="ctr"/>
+                <a:endParaRPr lang="en-US" sz="1463"/>
+              </a:p>
+            </p:txBody>
+          </p:sp>
+        </p:grpSp>
+        <p:cxnSp>
+          <p:nvCxnSpPr>
+            <p:cNvPr id="5" name="Straight Connector 4">
+              <a:extLst>
+                <a:ext uri="{FF2B5EF4-FFF2-40B4-BE49-F238E27FC236}">
+                  <a16:creationId xmlns:a16="http://schemas.microsoft.com/office/drawing/2014/main" id="{4D7B527C-2E77-3745-9959-E979D6F57D43}"/>
+                </a:ext>
+              </a:extLst>
+            </p:cNvPr>
+            <p:cNvCxnSpPr>
+              <a:cxnSpLocks/>
+            </p:cNvCxnSpPr>
+            <p:nvPr/>
+          </p:nvCxnSpPr>
+          <p:spPr>
+            <a:xfrm>
+              <a:off x="4723389" y="1026558"/>
+              <a:ext cx="0" cy="163506"/>
+            </a:xfrm>
+            <a:prstGeom prst="line">
+              <a:avLst/>
+            </a:prstGeom>
+            <a:ln w="12700">
+              <a:solidFill>
+                <a:schemeClr val="tx1">
+                  <a:lumMod val="50000"/>
+                  <a:lumOff val="50000"/>
+                </a:schemeClr>
+              </a:solidFill>
+            </a:ln>
+          </p:spPr>
+          <p:style>
+            <a:lnRef idx="1">
+              <a:schemeClr val="accent1"/>
+            </a:lnRef>
+            <a:fillRef idx="0">
+              <a:schemeClr val="accent1"/>
+            </a:fillRef>
+            <a:effectRef idx="0">
+              <a:schemeClr val="accent1"/>
+            </a:effectRef>
+            <a:fontRef idx="minor">
+              <a:schemeClr val="tx1"/>
+            </a:fontRef>
+          </p:style>
+        </p:cxnSp>
+        <mc:AlternateContent xmlns:mc="http://schemas.openxmlformats.org/markup-compatibility/2006" xmlns:a14="http://schemas.microsoft.com/office/drawing/2010/main">
+          <mc:Choice Requires="a14">
+            <p:sp>
+              <p:nvSpPr>
+                <p:cNvPr id="6" name="Rectangle 5">
+                  <a:extLst>
+                    <a:ext uri="{FF2B5EF4-FFF2-40B4-BE49-F238E27FC236}">
+                      <a16:creationId xmlns:a16="http://schemas.microsoft.com/office/drawing/2014/main" id="{078E68AA-B5E7-164A-98AE-06FEF9DC2005}"/>
+                    </a:ext>
+                  </a:extLst>
+                </p:cNvPr>
+                <p:cNvSpPr/>
+                <p:nvPr/>
+              </p:nvSpPr>
+              <p:spPr>
+                <a:xfrm>
+                  <a:off x="3819713" y="1426976"/>
+                  <a:ext cx="1123801" cy="383537"/>
+                </a:xfrm>
+                <a:prstGeom prst="rect">
+                  <a:avLst/>
+                </a:prstGeom>
+              </p:spPr>
+              <p:txBody>
+                <a:bodyPr wrap="square">
+                  <a:spAutoFit/>
+                </a:bodyPr>
+                <a:lstStyle/>
+                <a:p>
+                  <a:pPr/>
+                  <a14:m>
+                    <m:oMathPara xmlns:m="http://schemas.openxmlformats.org/officeDocument/2006/math">
+                      <m:oMathParaPr>
+                        <m:jc m:val="centerGroup"/>
+                      </m:oMathParaPr>
+                      <m:oMath xmlns:m="http://schemas.openxmlformats.org/officeDocument/2006/math">
+                        <m:sSub>
+                          <m:sSubPr>
+                            <m:ctrlPr>
+                              <a:rPr lang="ar-AE" sz="1000" i="1">
+                                <a:latin typeface="Cambria Math" panose="02040503050406030204" pitchFamily="18" charset="0"/>
+                              </a:rPr>
+                            </m:ctrlPr>
+                          </m:sSubPr>
+                          <m:e>
+                            <m:r>
+                              <a:rPr lang="ar-AE" sz="1000">
+                                <a:latin typeface="Cambria Math" panose="02040503050406030204" pitchFamily="18" charset="0"/>
+                              </a:rPr>
+                              <m:t>𝑓</m:t>
+                            </m:r>
+                          </m:e>
+                          <m:sub>
+                            <m:r>
+                              <a:rPr lang="ar-AE" sz="1000">
+                                <a:latin typeface="Cambria Math" panose="02040503050406030204" pitchFamily="18" charset="0"/>
+                              </a:rPr>
+                              <m:t>𝑋</m:t>
+                            </m:r>
+                          </m:sub>
+                        </m:sSub>
+                        <m:r>
+                          <a:rPr lang="en-GB" sz="1000" i="1">
+                            <a:latin typeface="Cambria Math" panose="02040503050406030204" pitchFamily="18" charset="0"/>
+                          </a:rPr>
+                          <m:t>=</m:t>
+                        </m:r>
+                        <m:r>
+                          <a:rPr lang="en-GB" sz="1000" i="1">
+                            <a:latin typeface="Cambria Math" panose="02040503050406030204" pitchFamily="18" charset="0"/>
+                          </a:rPr>
+                          <m:t>𝑓</m:t>
+                        </m:r>
+                        <m:d>
+                          <m:dPr>
+                            <m:ctrlPr>
+                              <a:rPr lang="en-GB" sz="1000" i="1">
+                                <a:latin typeface="Cambria Math" panose="02040503050406030204" pitchFamily="18" charset="0"/>
+                              </a:rPr>
+                            </m:ctrlPr>
+                          </m:dPr>
+                          <m:e>
+                            <m:r>
+                              <a:rPr lang="en-GB" sz="1000" i="1">
+                                <a:latin typeface="Cambria Math" panose="02040503050406030204" pitchFamily="18" charset="0"/>
+                              </a:rPr>
+                              <m:t>𝑒</m:t>
+                            </m:r>
+                          </m:e>
+                        </m:d>
+                        <m:r>
+                          <a:rPr lang="en-GB" sz="1000" i="1">
+                            <a:latin typeface="Cambria Math" panose="02040503050406030204" pitchFamily="18" charset="0"/>
+                          </a:rPr>
+                          <m:t> ?</m:t>
+                        </m:r>
+                      </m:oMath>
+                    </m:oMathPara>
+                  </a14:m>
+                  <a:endParaRPr lang="en-GB" sz="1000" i="1" dirty="0">
+                    <a:latin typeface="Cambria Math" panose="02040503050406030204" pitchFamily="18" charset="0"/>
+                  </a:endParaRPr>
+                </a:p>
+                <a:p>
+                  <a:pPr/>
+                  <a14:m>
+                    <m:oMathPara xmlns:m="http://schemas.openxmlformats.org/officeDocument/2006/math">
+                      <m:oMathParaPr>
+                        <m:jc m:val="centerGroup"/>
+                      </m:oMathParaPr>
+                      <m:oMath xmlns:m="http://schemas.openxmlformats.org/officeDocument/2006/math">
+                        <m:sSub>
+                          <m:sSubPr>
+                            <m:ctrlPr>
+                              <a:rPr lang="ar-AE" sz="1000" i="1">
+                                <a:latin typeface="Cambria Math" panose="02040503050406030204" pitchFamily="18" charset="0"/>
+                              </a:rPr>
+                            </m:ctrlPr>
+                          </m:sSubPr>
+                          <m:e>
+                            <m:r>
+                              <a:rPr lang="ar-AE" sz="1000">
+                                <a:latin typeface="Cambria Math" panose="02040503050406030204" pitchFamily="18" charset="0"/>
+                              </a:rPr>
+                              <m:t>𝑓</m:t>
+                            </m:r>
+                          </m:e>
+                          <m:sub>
+                            <m:r>
+                              <a:rPr lang="ar-AE" sz="1000">
+                                <a:latin typeface="Cambria Math" panose="02040503050406030204" pitchFamily="18" charset="0"/>
+                              </a:rPr>
+                              <m:t>𝑋</m:t>
+                            </m:r>
+                          </m:sub>
+                        </m:sSub>
+                        <m:r>
+                          <a:rPr lang="en-GB" sz="1000" i="1">
+                            <a:latin typeface="Cambria Math" panose="02040503050406030204" pitchFamily="18" charset="0"/>
+                          </a:rPr>
+                          <m:t>=</m:t>
+                        </m:r>
+                        <m:r>
+                          <a:rPr lang="en-GB" sz="1000" i="1">
+                            <a:latin typeface="Cambria Math" panose="02040503050406030204" pitchFamily="18" charset="0"/>
+                          </a:rPr>
+                          <m:t>𝑓</m:t>
+                        </m:r>
+                        <m:d>
+                          <m:dPr>
+                            <m:ctrlPr>
+                              <a:rPr lang="en-GB" sz="1000" i="1">
+                                <a:latin typeface="Cambria Math" panose="02040503050406030204" pitchFamily="18" charset="0"/>
+                              </a:rPr>
+                            </m:ctrlPr>
+                          </m:dPr>
+                          <m:e>
+                            <m:r>
+                              <a:rPr lang="en-GB" sz="1000" i="1">
+                                <a:latin typeface="Cambria Math" panose="02040503050406030204" pitchFamily="18" charset="0"/>
+                              </a:rPr>
+                              <m:t>𝑟</m:t>
+                            </m:r>
+                          </m:e>
+                        </m:d>
+                        <m:r>
+                          <a:rPr lang="en-GB" sz="1000" i="1">
+                            <a:latin typeface="Cambria Math" panose="02040503050406030204" pitchFamily="18" charset="0"/>
+                          </a:rPr>
+                          <m:t> ?</m:t>
+                        </m:r>
+                      </m:oMath>
+                    </m:oMathPara>
+                  </a14:m>
+                  <a:endParaRPr lang="en-GB" sz="1000" i="1" dirty="0">
+                    <a:latin typeface="Cambria Math" panose="02040503050406030204" pitchFamily="18" charset="0"/>
+                  </a:endParaRPr>
+                </a:p>
+                <a:p>
+                  <a:pPr algn="ctr"/>
+                  <a:r>
+                    <a:rPr lang="en-GB" sz="1000" i="1" dirty="0">
+                      <a:latin typeface="Cambria Math" panose="02040503050406030204" pitchFamily="18" charset="0"/>
+                    </a:rPr>
+                    <a:t>…</a:t>
+                  </a:r>
+                </a:p>
+              </p:txBody>
+            </p:sp>
+          </mc:Choice>
+          <mc:Fallback xmlns="">
+            <p:sp>
+              <p:nvSpPr>
+                <p:cNvPr id="6" name="Rectangle 5">
+                  <a:extLst>
+                    <a:ext uri="{FF2B5EF4-FFF2-40B4-BE49-F238E27FC236}">
+                      <a16:creationId xmlns:a16="http://schemas.microsoft.com/office/drawing/2014/main" id="{078E68AA-B5E7-164A-98AE-06FEF9DC2005}"/>
+                    </a:ext>
+                  </a:extLst>
+                </p:cNvPr>
+                <p:cNvSpPr>
+                  <a:spLocks noRot="1" noChangeAspect="1" noMove="1" noResize="1" noEditPoints="1" noAdjustHandles="1" noChangeArrowheads="1" noChangeShapeType="1" noTextEdit="1"/>
+                </p:cNvSpPr>
+                <p:nvPr/>
+              </p:nvSpPr>
+              <p:spPr>
+                <a:xfrm>
+                  <a:off x="3819713" y="1426976"/>
+                  <a:ext cx="1123801" cy="383537"/>
+                </a:xfrm>
+                <a:prstGeom prst="rect">
+                  <a:avLst/>
+                </a:prstGeom>
+                <a:blipFill>
+                  <a:blip r:embed="rId5"/>
+                  <a:stretch>
+                    <a:fillRect b="-4545"/>
+                  </a:stretch>
+                </a:blipFill>
+              </p:spPr>
+              <p:txBody>
+                <a:bodyPr/>
+                <a:lstStyle/>
+                <a:p>
+                  <a:r>
+                    <a:rPr lang="en-US">
+                      <a:noFill/>
+                    </a:rPr>
+                    <a:t> </a:t>
+                  </a:r>
+                </a:p>
+              </p:txBody>
+            </p:sp>
+          </mc:Fallback>
+        </mc:AlternateContent>
+        <p:cxnSp>
+          <p:nvCxnSpPr>
+            <p:cNvPr id="7" name="Straight Connector 6">
+              <a:extLst>
+                <a:ext uri="{FF2B5EF4-FFF2-40B4-BE49-F238E27FC236}">
+                  <a16:creationId xmlns:a16="http://schemas.microsoft.com/office/drawing/2014/main" id="{CEBCC7F6-052F-3A4D-999D-979C96F01D44}"/>
+                </a:ext>
+              </a:extLst>
+            </p:cNvPr>
+            <p:cNvCxnSpPr>
+              <a:cxnSpLocks/>
+            </p:cNvCxnSpPr>
+            <p:nvPr/>
+          </p:nvCxnSpPr>
+          <p:spPr>
+            <a:xfrm>
+              <a:off x="4723389" y="1183340"/>
+              <a:ext cx="152400" cy="152400"/>
+            </a:xfrm>
+            <a:prstGeom prst="line">
+              <a:avLst/>
+            </a:prstGeom>
+            <a:ln w="12700">
+              <a:solidFill>
+                <a:schemeClr val="tx1">
+                  <a:lumMod val="50000"/>
+                  <a:lumOff val="50000"/>
+                </a:schemeClr>
+              </a:solidFill>
+            </a:ln>
+          </p:spPr>
+          <p:style>
+            <a:lnRef idx="1">
+              <a:schemeClr val="accent1"/>
+            </a:lnRef>
+            <a:fillRef idx="0">
+              <a:schemeClr val="accent1"/>
+            </a:fillRef>
+            <a:effectRef idx="0">
+              <a:schemeClr val="accent1"/>
+            </a:effectRef>
+            <a:fontRef idx="minor">
+              <a:schemeClr val="tx1"/>
+            </a:fontRef>
+          </p:style>
+        </p:cxnSp>
+        <p:cxnSp>
+          <p:nvCxnSpPr>
+            <p:cNvPr id="8" name="Straight Connector 7">
+              <a:extLst>
+                <a:ext uri="{FF2B5EF4-FFF2-40B4-BE49-F238E27FC236}">
+                  <a16:creationId xmlns:a16="http://schemas.microsoft.com/office/drawing/2014/main" id="{2E125432-D0F8-DA4E-8EF1-0FB78226183A}"/>
+                </a:ext>
+              </a:extLst>
+            </p:cNvPr>
+            <p:cNvCxnSpPr>
+              <a:cxnSpLocks/>
+            </p:cNvCxnSpPr>
+            <p:nvPr/>
+          </p:nvCxnSpPr>
+          <p:spPr>
+            <a:xfrm flipV="1">
+              <a:off x="4570990" y="1190064"/>
+              <a:ext cx="152398" cy="137026"/>
+            </a:xfrm>
+            <a:prstGeom prst="line">
+              <a:avLst/>
+            </a:prstGeom>
+            <a:ln w="12700">
+              <a:solidFill>
+                <a:schemeClr val="tx1">
+                  <a:lumMod val="50000"/>
+                  <a:lumOff val="50000"/>
+                </a:schemeClr>
+              </a:solidFill>
+            </a:ln>
+          </p:spPr>
+          <p:style>
+            <a:lnRef idx="1">
+              <a:schemeClr val="accent1"/>
+            </a:lnRef>
+            <a:fillRef idx="0">
+              <a:schemeClr val="accent1"/>
+            </a:fillRef>
+            <a:effectRef idx="0">
+              <a:schemeClr val="accent1"/>
+            </a:effectRef>
+            <a:fontRef idx="minor">
+              <a:schemeClr val="tx1"/>
+            </a:fontRef>
+          </p:style>
+        </p:cxnSp>
+        <mc:AlternateContent xmlns:mc="http://schemas.openxmlformats.org/markup-compatibility/2006" xmlns:a14="http://schemas.microsoft.com/office/drawing/2010/main">
+          <mc:Choice Requires="a14">
+            <p:sp>
+              <p:nvSpPr>
+                <p:cNvPr id="9" name="Rectangle 8">
+                  <a:extLst>
+                    <a:ext uri="{FF2B5EF4-FFF2-40B4-BE49-F238E27FC236}">
+                      <a16:creationId xmlns:a16="http://schemas.microsoft.com/office/drawing/2014/main" id="{E010211B-572D-D943-89CF-BA10E7F4ED7E}"/>
+                    </a:ext>
+                  </a:extLst>
+                </p:cNvPr>
+                <p:cNvSpPr/>
+                <p:nvPr/>
+              </p:nvSpPr>
+              <p:spPr>
+                <a:xfrm>
+                  <a:off x="4677659" y="1419894"/>
+                  <a:ext cx="929973" cy="383537"/>
+                </a:xfrm>
+                <a:prstGeom prst="rect">
+                  <a:avLst/>
+                </a:prstGeom>
+              </p:spPr>
+              <p:txBody>
+                <a:bodyPr wrap="square">
+                  <a:spAutoFit/>
+                </a:bodyPr>
+                <a:lstStyle/>
+                <a:p>
+                  <a:pPr/>
+                  <a14:m>
+                    <m:oMathPara xmlns:m="http://schemas.openxmlformats.org/officeDocument/2006/math">
+                      <m:oMathParaPr>
+                        <m:jc m:val="centerGroup"/>
+                      </m:oMathParaPr>
+                      <m:oMath xmlns:m="http://schemas.openxmlformats.org/officeDocument/2006/math">
+                        <m:sSub>
+                          <m:sSubPr>
+                            <m:ctrlPr>
+                              <a:rPr lang="ar-AE" sz="1000" i="1">
+                                <a:latin typeface="Cambria Math" panose="02040503050406030204" pitchFamily="18" charset="0"/>
+                              </a:rPr>
+                            </m:ctrlPr>
+                          </m:sSubPr>
+                          <m:e>
+                            <m:r>
+                              <a:rPr lang="ar-AE" sz="1000">
+                                <a:latin typeface="Cambria Math" panose="02040503050406030204" pitchFamily="18" charset="0"/>
+                              </a:rPr>
+                              <m:t>𝑓</m:t>
+                            </m:r>
+                          </m:e>
+                          <m:sub>
+                            <m:r>
+                              <a:rPr lang="ar-AE" sz="1000">
+                                <a:latin typeface="Cambria Math" panose="02040503050406030204" pitchFamily="18" charset="0"/>
+                              </a:rPr>
+                              <m:t>𝑋</m:t>
+                            </m:r>
+                          </m:sub>
+                        </m:sSub>
+                        <m:r>
+                          <a:rPr lang="en-GB" sz="1000" i="1">
+                            <a:latin typeface="Cambria Math" panose="02040503050406030204" pitchFamily="18" charset="0"/>
+                          </a:rPr>
+                          <m:t>=</m:t>
+                        </m:r>
+                        <m:r>
+                          <a:rPr lang="en-GB" sz="1000" i="1">
+                            <a:latin typeface="Cambria Math" panose="02040503050406030204" pitchFamily="18" charset="0"/>
+                          </a:rPr>
+                          <m:t>𝑓</m:t>
+                        </m:r>
+                        <m:d>
+                          <m:dPr>
+                            <m:ctrlPr>
+                              <a:rPr lang="en-GB" sz="1000" i="1">
+                                <a:latin typeface="Cambria Math" panose="02040503050406030204" pitchFamily="18" charset="0"/>
+                              </a:rPr>
+                            </m:ctrlPr>
+                          </m:dPr>
+                          <m:e>
+                            <m:r>
+                              <a:rPr lang="en-GB" sz="1000" i="1">
+                                <a:latin typeface="Cambria Math" panose="02040503050406030204" pitchFamily="18" charset="0"/>
+                              </a:rPr>
+                              <m:t>𝑒</m:t>
+                            </m:r>
+                            <m:r>
+                              <a:rPr lang="en-GB" sz="1000" i="1">
+                                <a:latin typeface="Cambria Math" panose="02040503050406030204" pitchFamily="18" charset="0"/>
+                              </a:rPr>
+                              <m:t>,</m:t>
+                            </m:r>
+                            <m:r>
+                              <a:rPr lang="en-GB" sz="1000" i="1">
+                                <a:latin typeface="Cambria Math" panose="02040503050406030204" pitchFamily="18" charset="0"/>
+                              </a:rPr>
+                              <m:t>𝑟</m:t>
+                            </m:r>
+                          </m:e>
+                        </m:d>
+                        <m:r>
+                          <a:rPr lang="en-GB" sz="1000" i="1">
+                            <a:latin typeface="Cambria Math" panose="02040503050406030204" pitchFamily="18" charset="0"/>
+                          </a:rPr>
+                          <m:t> ?</m:t>
+                        </m:r>
+                      </m:oMath>
+                    </m:oMathPara>
+                  </a14:m>
+                  <a:endParaRPr lang="en-GB" sz="1000" i="1" dirty="0">
+                    <a:latin typeface="Cambria Math" panose="02040503050406030204" pitchFamily="18" charset="0"/>
+                  </a:endParaRPr>
+                </a:p>
+                <a:p>
+                  <a:pPr/>
+                  <a14:m>
+                    <m:oMathPara xmlns:m="http://schemas.openxmlformats.org/officeDocument/2006/math">
+                      <m:oMathParaPr>
+                        <m:jc m:val="centerGroup"/>
+                      </m:oMathParaPr>
+                      <m:oMath xmlns:m="http://schemas.openxmlformats.org/officeDocument/2006/math">
+                        <m:sSub>
+                          <m:sSubPr>
+                            <m:ctrlPr>
+                              <a:rPr lang="ar-AE" sz="1000" i="1">
+                                <a:latin typeface="Cambria Math" panose="02040503050406030204" pitchFamily="18" charset="0"/>
+                              </a:rPr>
+                            </m:ctrlPr>
+                          </m:sSubPr>
+                          <m:e>
+                            <m:r>
+                              <a:rPr lang="ar-AE" sz="1000">
+                                <a:latin typeface="Cambria Math" panose="02040503050406030204" pitchFamily="18" charset="0"/>
+                              </a:rPr>
+                              <m:t>𝑓</m:t>
+                            </m:r>
+                          </m:e>
+                          <m:sub>
+                            <m:r>
+                              <a:rPr lang="ar-AE" sz="1000">
+                                <a:latin typeface="Cambria Math" panose="02040503050406030204" pitchFamily="18" charset="0"/>
+                              </a:rPr>
+                              <m:t>𝑋</m:t>
+                            </m:r>
+                          </m:sub>
+                        </m:sSub>
+                        <m:r>
+                          <a:rPr lang="en-GB" sz="1000" i="1">
+                            <a:latin typeface="Cambria Math" panose="02040503050406030204" pitchFamily="18" charset="0"/>
+                          </a:rPr>
+                          <m:t>=</m:t>
+                        </m:r>
+                        <m:r>
+                          <a:rPr lang="en-GB" sz="1000" i="1">
+                            <a:latin typeface="Cambria Math" panose="02040503050406030204" pitchFamily="18" charset="0"/>
+                          </a:rPr>
+                          <m:t>𝑓</m:t>
+                        </m:r>
+                        <m:d>
+                          <m:dPr>
+                            <m:ctrlPr>
+                              <a:rPr lang="en-GB" sz="1000" i="1">
+                                <a:latin typeface="Cambria Math" panose="02040503050406030204" pitchFamily="18" charset="0"/>
+                              </a:rPr>
+                            </m:ctrlPr>
+                          </m:dPr>
+                          <m:e>
+                            <m:r>
+                              <a:rPr lang="en-GB" sz="1000" i="1">
+                                <a:latin typeface="Cambria Math" panose="02040503050406030204" pitchFamily="18" charset="0"/>
+                              </a:rPr>
+                              <m:t>𝑒</m:t>
+                            </m:r>
+                            <m:r>
+                              <a:rPr lang="en-GB" sz="1000" i="1">
+                                <a:latin typeface="Cambria Math" panose="02040503050406030204" pitchFamily="18" charset="0"/>
+                              </a:rPr>
+                              <m:t>,</m:t>
+                            </m:r>
+                            <m:sSub>
+                              <m:sSubPr>
+                                <m:ctrlPr>
+                                  <a:rPr lang="en-GB" sz="1000" i="1">
+                                    <a:latin typeface="Cambria Math" panose="02040503050406030204" pitchFamily="18" charset="0"/>
+                                  </a:rPr>
+                                </m:ctrlPr>
+                              </m:sSubPr>
+                              <m:e>
+                                <m:r>
+                                  <a:rPr lang="en-GB" sz="1000" i="1">
+                                    <a:latin typeface="Cambria Math" panose="02040503050406030204" pitchFamily="18" charset="0"/>
+                                  </a:rPr>
+                                  <m:t>𝑟</m:t>
+                                </m:r>
+                              </m:e>
+                              <m:sub>
+                                <m:r>
+                                  <a:rPr lang="en-GB" sz="1000" i="1">
+                                    <a:latin typeface="Cambria Math" panose="02040503050406030204" pitchFamily="18" charset="0"/>
+                                  </a:rPr>
+                                  <m:t>𝑎</m:t>
+                                </m:r>
+                              </m:sub>
+                            </m:sSub>
+                          </m:e>
+                        </m:d>
+                        <m:r>
+                          <a:rPr lang="en-GB" sz="1000" i="1">
+                            <a:latin typeface="Cambria Math" panose="02040503050406030204" pitchFamily="18" charset="0"/>
+                          </a:rPr>
+                          <m:t> ?</m:t>
+                        </m:r>
+                      </m:oMath>
+                    </m:oMathPara>
+                  </a14:m>
+                  <a:endParaRPr lang="en-GB" sz="1000" i="1" dirty="0">
+                    <a:latin typeface="Cambria Math" panose="02040503050406030204" pitchFamily="18" charset="0"/>
+                  </a:endParaRPr>
+                </a:p>
+                <a:p>
+                  <a:pPr algn="ctr"/>
+                  <a:r>
+                    <a:rPr lang="en-GB" sz="1000" i="1" dirty="0">
+                      <a:latin typeface="Cambria Math" panose="02040503050406030204" pitchFamily="18" charset="0"/>
+                    </a:rPr>
+                    <a:t>…</a:t>
+                  </a:r>
+                </a:p>
+              </p:txBody>
+            </p:sp>
+          </mc:Choice>
+          <mc:Fallback xmlns="">
+            <p:sp>
+              <p:nvSpPr>
+                <p:cNvPr id="9" name="Rectangle 8">
+                  <a:extLst>
+                    <a:ext uri="{FF2B5EF4-FFF2-40B4-BE49-F238E27FC236}">
+                      <a16:creationId xmlns:a16="http://schemas.microsoft.com/office/drawing/2014/main" id="{E010211B-572D-D943-89CF-BA10E7F4ED7E}"/>
+                    </a:ext>
+                  </a:extLst>
+                </p:cNvPr>
+                <p:cNvSpPr>
+                  <a:spLocks noRot="1" noChangeAspect="1" noMove="1" noResize="1" noEditPoints="1" noAdjustHandles="1" noChangeArrowheads="1" noChangeShapeType="1" noTextEdit="1"/>
+                </p:cNvSpPr>
+                <p:nvPr/>
+              </p:nvSpPr>
+              <p:spPr>
+                <a:xfrm>
+                  <a:off x="4677659" y="1419894"/>
+                  <a:ext cx="929973" cy="383537"/>
+                </a:xfrm>
+                <a:prstGeom prst="rect">
+                  <a:avLst/>
+                </a:prstGeom>
+                <a:blipFill>
+                  <a:blip r:embed="rId6"/>
+                  <a:stretch>
+                    <a:fillRect b="-4444"/>
+                  </a:stretch>
+                </a:blipFill>
+              </p:spPr>
+              <p:txBody>
+                <a:bodyPr/>
+                <a:lstStyle/>
+                <a:p>
+                  <a:r>
+                    <a:rPr lang="en-US">
+                      <a:noFill/>
+                    </a:rPr>
+                    <a:t> </a:t>
+                  </a:r>
+                </a:p>
+              </p:txBody>
+            </p:sp>
+          </mc:Fallback>
+        </mc:AlternateContent>
+        <p:sp>
+          <p:nvSpPr>
+            <p:cNvPr id="10" name="TextBox 9">
+              <a:extLst>
+                <a:ext uri="{FF2B5EF4-FFF2-40B4-BE49-F238E27FC236}">
+                  <a16:creationId xmlns:a16="http://schemas.microsoft.com/office/drawing/2014/main" id="{13346BFA-9804-DA46-B640-D5C0927253EB}"/>
+                </a:ext>
+              </a:extLst>
+            </p:cNvPr>
+            <p:cNvSpPr txBox="1"/>
+            <p:nvPr/>
+          </p:nvSpPr>
+          <p:spPr>
+            <a:xfrm>
+              <a:off x="4089603" y="1261262"/>
+              <a:ext cx="553206" cy="171615"/>
+            </a:xfrm>
+            <a:prstGeom prst="rect">
+              <a:avLst/>
+            </a:prstGeom>
+            <a:noFill/>
+          </p:spPr>
+          <p:txBody>
+            <a:bodyPr wrap="square" rtlCol="0">
+              <a:spAutoFit/>
+            </a:bodyPr>
+            <a:lstStyle/>
+            <a:p>
+              <a:pPr algn="ctr"/>
+              <a:r>
+                <a:rPr lang="en-US" sz="1000" dirty="0"/>
+                <a:t>1 sector</a:t>
+              </a:r>
+            </a:p>
+          </p:txBody>
+        </p:sp>
+        <p:sp>
+          <p:nvSpPr>
+            <p:cNvPr id="11" name="TextBox 10">
+              <a:extLst>
+                <a:ext uri="{FF2B5EF4-FFF2-40B4-BE49-F238E27FC236}">
+                  <a16:creationId xmlns:a16="http://schemas.microsoft.com/office/drawing/2014/main" id="{81296C18-3549-4D41-985E-714F3381AB09}"/>
+                </a:ext>
+              </a:extLst>
+            </p:cNvPr>
+            <p:cNvSpPr txBox="1"/>
+            <p:nvPr/>
+          </p:nvSpPr>
+          <p:spPr>
+            <a:xfrm>
+              <a:off x="4829059" y="1262167"/>
+              <a:ext cx="550477" cy="171615"/>
+            </a:xfrm>
+            <a:prstGeom prst="rect">
+              <a:avLst/>
+            </a:prstGeom>
+            <a:noFill/>
+          </p:spPr>
+          <p:txBody>
+            <a:bodyPr wrap="square" rtlCol="0">
+              <a:spAutoFit/>
+            </a:bodyPr>
+            <a:lstStyle/>
+            <a:p>
+              <a:pPr algn="ctr"/>
+              <a:r>
+                <a:rPr lang="en-US" sz="1000" dirty="0"/>
+                <a:t>2 sectors</a:t>
+              </a:r>
+            </a:p>
+          </p:txBody>
+        </p:sp>
+      </p:grpSp>
+      <p:sp>
+        <p:nvSpPr>
+          <p:cNvPr id="19" name="TextBox 18">
+            <a:extLst>
+              <a:ext uri="{FF2B5EF4-FFF2-40B4-BE49-F238E27FC236}">
+                <a16:creationId xmlns:a16="http://schemas.microsoft.com/office/drawing/2014/main" id="{20507238-4087-2D47-964A-1B78B92EF112}"/>
+              </a:ext>
+            </a:extLst>
+          </p:cNvPr>
+          <p:cNvSpPr txBox="1"/>
+          <p:nvPr/>
+        </p:nvSpPr>
+        <p:spPr>
+          <a:xfrm>
+            <a:off x="3007303" y="170654"/>
+            <a:ext cx="653849" cy="369332"/>
+          </a:xfrm>
+          <a:prstGeom prst="rect">
+            <a:avLst/>
+          </a:prstGeom>
+          <a:noFill/>
+        </p:spPr>
+        <p:txBody>
+          <a:bodyPr wrap="square" rtlCol="0">
+            <a:spAutoFit/>
+          </a:bodyPr>
+          <a:lstStyle/>
+          <a:p>
+            <a:pPr algn="ctr"/>
+            <a:r>
+              <a:rPr lang="en-US" dirty="0"/>
+              <a:t>B</a:t>
+            </a:r>
+          </a:p>
+        </p:txBody>
+      </p:sp>
+      <p:pic>
+        <p:nvPicPr>
+          <p:cNvPr id="33" name="Picture 32">
+            <a:extLst>
+              <a:ext uri="{FF2B5EF4-FFF2-40B4-BE49-F238E27FC236}">
+                <a16:creationId xmlns:a16="http://schemas.microsoft.com/office/drawing/2014/main" id="{9831F8D0-FB67-574A-87CD-EB9A4EBD5347}"/>
+              </a:ext>
+            </a:extLst>
+          </p:cNvPr>
+          <p:cNvPicPr>
+            <a:picLocks noChangeAspect="1"/>
+          </p:cNvPicPr>
+          <p:nvPr/>
+        </p:nvPicPr>
+        <p:blipFill>
+          <a:blip r:embed="rId7"/>
+          <a:stretch>
+            <a:fillRect/>
+          </a:stretch>
+        </p:blipFill>
+        <p:spPr>
+          <a:xfrm>
+            <a:off x="867883" y="2805230"/>
+            <a:ext cx="2073600" cy="2233989"/>
+          </a:xfrm>
+          <a:prstGeom prst="rect">
+            <a:avLst/>
+          </a:prstGeom>
+        </p:spPr>
+      </p:pic>
+      <p:sp>
+        <p:nvSpPr>
+          <p:cNvPr id="21" name="TextBox 20">
+            <a:extLst>
+              <a:ext uri="{FF2B5EF4-FFF2-40B4-BE49-F238E27FC236}">
+                <a16:creationId xmlns:a16="http://schemas.microsoft.com/office/drawing/2014/main" id="{21F4215F-59F0-B54E-9769-46355C84593F}"/>
+              </a:ext>
+            </a:extLst>
+          </p:cNvPr>
+          <p:cNvSpPr txBox="1"/>
+          <p:nvPr/>
+        </p:nvSpPr>
+        <p:spPr>
+          <a:xfrm>
+            <a:off x="540959" y="174634"/>
+            <a:ext cx="653849" cy="369332"/>
+          </a:xfrm>
+          <a:prstGeom prst="rect">
+            <a:avLst/>
+          </a:prstGeom>
+          <a:noFill/>
+        </p:spPr>
+        <p:txBody>
+          <a:bodyPr wrap="square" rtlCol="0">
+            <a:spAutoFit/>
+          </a:bodyPr>
+          <a:lstStyle/>
+          <a:p>
+            <a:pPr algn="ctr"/>
+            <a:r>
+              <a:rPr lang="en-US" dirty="0"/>
+              <a:t>A</a:t>
+            </a:r>
+          </a:p>
+        </p:txBody>
+      </p:sp>
+      <p:sp>
+        <p:nvSpPr>
+          <p:cNvPr id="22" name="TextBox 21">
+            <a:extLst>
+              <a:ext uri="{FF2B5EF4-FFF2-40B4-BE49-F238E27FC236}">
+                <a16:creationId xmlns:a16="http://schemas.microsoft.com/office/drawing/2014/main" id="{27551EE1-A98C-2041-A253-62722020151F}"/>
+              </a:ext>
+            </a:extLst>
+          </p:cNvPr>
+          <p:cNvSpPr txBox="1"/>
+          <p:nvPr/>
+        </p:nvSpPr>
+        <p:spPr>
+          <a:xfrm>
+            <a:off x="5491091" y="180663"/>
+            <a:ext cx="653849" cy="369332"/>
+          </a:xfrm>
+          <a:prstGeom prst="rect">
+            <a:avLst/>
+          </a:prstGeom>
+          <a:noFill/>
+        </p:spPr>
+        <p:txBody>
+          <a:bodyPr wrap="square" rtlCol="0">
+            <a:spAutoFit/>
+          </a:bodyPr>
+          <a:lstStyle/>
+          <a:p>
+            <a:pPr algn="ctr"/>
+            <a:r>
+              <a:rPr lang="en-US" dirty="0"/>
+              <a:t>C</a:t>
+            </a:r>
+          </a:p>
+        </p:txBody>
+      </p:sp>
+      <p:pic>
+        <p:nvPicPr>
+          <p:cNvPr id="35" name="Picture 34">
+            <a:extLst>
+              <a:ext uri="{FF2B5EF4-FFF2-40B4-BE49-F238E27FC236}">
+                <a16:creationId xmlns:a16="http://schemas.microsoft.com/office/drawing/2014/main" id="{72DA2C83-4893-634D-976B-FB5CB5675CE3}"/>
+              </a:ext>
+            </a:extLst>
+          </p:cNvPr>
+          <p:cNvPicPr>
+            <a:picLocks noChangeAspect="1"/>
+          </p:cNvPicPr>
+          <p:nvPr/>
+        </p:nvPicPr>
+        <p:blipFill>
+          <a:blip r:embed="rId8"/>
+          <a:stretch>
+            <a:fillRect/>
+          </a:stretch>
+        </p:blipFill>
+        <p:spPr>
+          <a:xfrm>
+            <a:off x="3334227" y="2805230"/>
+            <a:ext cx="2073600" cy="2233989"/>
+          </a:xfrm>
+          <a:prstGeom prst="rect">
+            <a:avLst/>
+          </a:prstGeom>
+        </p:spPr>
+      </p:pic>
+      <p:sp>
+        <p:nvSpPr>
+          <p:cNvPr id="23" name="TextBox 22">
+            <a:extLst>
+              <a:ext uri="{FF2B5EF4-FFF2-40B4-BE49-F238E27FC236}">
+                <a16:creationId xmlns:a16="http://schemas.microsoft.com/office/drawing/2014/main" id="{F297667D-011D-CD4B-A527-B5CF14C57BDE}"/>
+              </a:ext>
+            </a:extLst>
+          </p:cNvPr>
+          <p:cNvSpPr txBox="1"/>
+          <p:nvPr/>
+        </p:nvSpPr>
+        <p:spPr>
+          <a:xfrm>
+            <a:off x="634957" y="2582202"/>
+            <a:ext cx="653849" cy="369332"/>
+          </a:xfrm>
+          <a:prstGeom prst="rect">
+            <a:avLst/>
+          </a:prstGeom>
+          <a:noFill/>
+        </p:spPr>
+        <p:txBody>
+          <a:bodyPr wrap="square" rtlCol="0">
+            <a:spAutoFit/>
+          </a:bodyPr>
+          <a:lstStyle/>
+          <a:p>
+            <a:pPr algn="ctr"/>
+            <a:r>
+              <a:rPr lang="en-US" dirty="0"/>
+              <a:t>D</a:t>
+            </a:r>
+          </a:p>
+        </p:txBody>
+      </p:sp>
+      <p:sp>
+        <p:nvSpPr>
+          <p:cNvPr id="24" name="TextBox 23">
+            <a:extLst>
+              <a:ext uri="{FF2B5EF4-FFF2-40B4-BE49-F238E27FC236}">
+                <a16:creationId xmlns:a16="http://schemas.microsoft.com/office/drawing/2014/main" id="{C420FE4E-2EA8-9840-8AFC-3AE73632EBDF}"/>
+              </a:ext>
+            </a:extLst>
+          </p:cNvPr>
+          <p:cNvSpPr txBox="1"/>
+          <p:nvPr/>
+        </p:nvSpPr>
+        <p:spPr>
+          <a:xfrm>
+            <a:off x="3020659" y="2604363"/>
+            <a:ext cx="653849" cy="369332"/>
+          </a:xfrm>
+          <a:prstGeom prst="rect">
+            <a:avLst/>
+          </a:prstGeom>
+          <a:noFill/>
+        </p:spPr>
+        <p:txBody>
+          <a:bodyPr wrap="square" rtlCol="0">
+            <a:spAutoFit/>
+          </a:bodyPr>
+          <a:lstStyle/>
+          <a:p>
+            <a:pPr algn="ctr"/>
+            <a:r>
+              <a:rPr lang="en-US" dirty="0"/>
+              <a:t>E</a:t>
+            </a:r>
+          </a:p>
+        </p:txBody>
+      </p:sp>
+      <p:sp>
+        <p:nvSpPr>
+          <p:cNvPr id="25" name="TextBox 24">
+            <a:extLst>
+              <a:ext uri="{FF2B5EF4-FFF2-40B4-BE49-F238E27FC236}">
+                <a16:creationId xmlns:a16="http://schemas.microsoft.com/office/drawing/2014/main" id="{5E4D8413-5FED-1646-BA5D-1F9555E1FBCA}"/>
+              </a:ext>
+            </a:extLst>
+          </p:cNvPr>
+          <p:cNvSpPr txBox="1"/>
+          <p:nvPr/>
+        </p:nvSpPr>
+        <p:spPr>
+          <a:xfrm>
+            <a:off x="5491091" y="2620564"/>
+            <a:ext cx="653849" cy="369332"/>
+          </a:xfrm>
+          <a:prstGeom prst="rect">
+            <a:avLst/>
+          </a:prstGeom>
+          <a:noFill/>
+        </p:spPr>
+        <p:txBody>
+          <a:bodyPr wrap="square" rtlCol="0">
+            <a:spAutoFit/>
+          </a:bodyPr>
+          <a:lstStyle/>
+          <a:p>
+            <a:pPr algn="ctr"/>
+            <a:r>
+              <a:rPr lang="en-US" dirty="0"/>
+              <a:t>F</a:t>
+            </a:r>
+          </a:p>
+        </p:txBody>
+      </p:sp>
+      <p:cxnSp>
+        <p:nvCxnSpPr>
+          <p:cNvPr id="27" name="Straight Connector 26">
+            <a:extLst>
+              <a:ext uri="{FF2B5EF4-FFF2-40B4-BE49-F238E27FC236}">
+                <a16:creationId xmlns:a16="http://schemas.microsoft.com/office/drawing/2014/main" id="{B3F9305B-2E5A-BD4F-AC61-F45DADDEE5B4}"/>
+              </a:ext>
+            </a:extLst>
+          </p:cNvPr>
+          <p:cNvCxnSpPr>
+            <a:cxnSpLocks/>
+          </p:cNvCxnSpPr>
+          <p:nvPr/>
+        </p:nvCxnSpPr>
+        <p:spPr>
+          <a:xfrm flipV="1">
+            <a:off x="2273224" y="948153"/>
+            <a:ext cx="218779" cy="27550"/>
+          </a:xfrm>
+          <a:prstGeom prst="line">
+            <a:avLst/>
+          </a:prstGeom>
+          <a:ln w="12700">
+            <a:solidFill>
+              <a:schemeClr val="tx1">
+                <a:lumMod val="50000"/>
+                <a:lumOff val="50000"/>
+              </a:schemeClr>
+            </a:solidFill>
+          </a:ln>
+        </p:spPr>
+        <p:style>
+          <a:lnRef idx="1">
+            <a:schemeClr val="accent1"/>
+          </a:lnRef>
+          <a:fillRef idx="0">
+            <a:schemeClr val="accent1"/>
+          </a:fillRef>
+          <a:effectRef idx="0">
+            <a:schemeClr val="accent1"/>
+          </a:effectRef>
+          <a:fontRef idx="minor">
+            <a:schemeClr val="tx1"/>
+          </a:fontRef>
+        </p:style>
+      </p:cxnSp>
+      <p:sp>
+        <p:nvSpPr>
+          <p:cNvPr id="29" name="TextBox 28">
+            <a:extLst>
+              <a:ext uri="{FF2B5EF4-FFF2-40B4-BE49-F238E27FC236}">
+                <a16:creationId xmlns:a16="http://schemas.microsoft.com/office/drawing/2014/main" id="{56D539A0-2282-9F42-84DD-84E704C697CE}"/>
+              </a:ext>
+            </a:extLst>
+          </p:cNvPr>
+          <p:cNvSpPr txBox="1"/>
+          <p:nvPr/>
+        </p:nvSpPr>
+        <p:spPr>
+          <a:xfrm>
+            <a:off x="2451139" y="819101"/>
+            <a:ext cx="675188" cy="247888"/>
+          </a:xfrm>
+          <a:prstGeom prst="rect">
+            <a:avLst/>
+          </a:prstGeom>
+          <a:noFill/>
+        </p:spPr>
+        <p:txBody>
+          <a:bodyPr wrap="square" rtlCol="0">
+            <a:spAutoFit/>
+          </a:bodyPr>
+          <a:lstStyle/>
+          <a:p>
+            <a:pPr algn="ctr"/>
+            <a:r>
+              <a:rPr lang="en-US" sz="1000" dirty="0"/>
+              <a:t>invariant</a:t>
+            </a:r>
+          </a:p>
+        </p:txBody>
+      </p:sp>
+      <p:pic>
+        <p:nvPicPr>
+          <p:cNvPr id="37" name="Picture 36">
+            <a:extLst>
+              <a:ext uri="{FF2B5EF4-FFF2-40B4-BE49-F238E27FC236}">
+                <a16:creationId xmlns:a16="http://schemas.microsoft.com/office/drawing/2014/main" id="{C33EAE6D-2370-424C-A3AF-8B31FB7A7009}"/>
+              </a:ext>
+            </a:extLst>
+          </p:cNvPr>
+          <p:cNvPicPr>
+            <a:picLocks noChangeAspect="1"/>
+          </p:cNvPicPr>
+          <p:nvPr/>
+        </p:nvPicPr>
+        <p:blipFill>
+          <a:blip r:embed="rId9"/>
+          <a:stretch>
+            <a:fillRect/>
+          </a:stretch>
+        </p:blipFill>
+        <p:spPr>
+          <a:xfrm>
+            <a:off x="5800571" y="2989896"/>
+            <a:ext cx="2062800" cy="2051435"/>
+          </a:xfrm>
+          <a:prstGeom prst="rect">
+            <a:avLst/>
+          </a:prstGeom>
+        </p:spPr>
+      </p:pic>
+    </p:spTree>
+    <p:extLst>
+      <p:ext uri="{BB962C8B-B14F-4D97-AF65-F5344CB8AC3E}">
+        <p14:creationId xmlns:p14="http://schemas.microsoft.com/office/powerpoint/2010/main" val="897640836"/>
+      </p:ext>
+    </p:extLst>
+  </p:cSld>
+  <p:clrMapOvr>
+    <a:masterClrMapping/>
+  </p:clrMapOvr>
+</p:sld>
+</file>
+
+<file path=ppt/slides/slide2.xml><?xml version="1.0" encoding="utf-8"?>
 <p:sld xmlns:a="http://schemas.openxmlformats.org/drawingml/2006/main" xmlns:r="http://schemas.openxmlformats.org/officeDocument/2006/relationships" xmlns:p="http://schemas.openxmlformats.org/presentationml/2006/main">
   <p:cSld>
     <p:spTree>
@@ -4413,7 +6018,7 @@
 </p:sld>
 </file>
 
-<file path=ppt/slides/slide2.xml><?xml version="1.0" encoding="utf-8"?>
+<file path=ppt/slides/slide3.xml><?xml version="1.0" encoding="utf-8"?>
 <p:sld xmlns:a="http://schemas.openxmlformats.org/drawingml/2006/main" xmlns:r="http://schemas.openxmlformats.org/officeDocument/2006/relationships" xmlns:p="http://schemas.openxmlformats.org/presentationml/2006/main">
   <p:cSld>
     <p:spTree>
@@ -5720,1611 +7325,6 @@
 </p:sld>
 </file>
 
-<file path=ppt/slides/slide3.xml><?xml version="1.0" encoding="utf-8"?>
-<p:sld xmlns:a="http://schemas.openxmlformats.org/drawingml/2006/main" xmlns:r="http://schemas.openxmlformats.org/officeDocument/2006/relationships" xmlns:p="http://schemas.openxmlformats.org/presentationml/2006/main">
-  <p:cSld>
-    <p:spTree>
-      <p:nvGrpSpPr>
-        <p:cNvPr id="1" name=""/>
-        <p:cNvGrpSpPr/>
-        <p:nvPr/>
-      </p:nvGrpSpPr>
-      <p:grpSpPr>
-        <a:xfrm>
-          <a:off x="0" y="0"/>
-          <a:ext cx="0" cy="0"/>
-          <a:chOff x="0" y="0"/>
-          <a:chExt cx="0" cy="0"/>
-        </a:xfrm>
-      </p:grpSpPr>
-      <p:sp>
-        <p:nvSpPr>
-          <p:cNvPr id="2" name="TextBox 1">
-            <a:extLst>
-              <a:ext uri="{FF2B5EF4-FFF2-40B4-BE49-F238E27FC236}">
-                <a16:creationId xmlns:a16="http://schemas.microsoft.com/office/drawing/2014/main" id="{0B7C7307-DE28-5B43-9C37-B804F1844236}"/>
-              </a:ext>
-            </a:extLst>
-          </p:cNvPr>
-          <p:cNvSpPr txBox="1"/>
-          <p:nvPr/>
-        </p:nvSpPr>
-        <p:spPr>
-          <a:xfrm>
-            <a:off x="433395" y="393560"/>
-            <a:ext cx="3018980" cy="400110"/>
-          </a:xfrm>
-          <a:prstGeom prst="rect">
-            <a:avLst/>
-          </a:prstGeom>
-          <a:noFill/>
-        </p:spPr>
-        <p:txBody>
-          <a:bodyPr wrap="square" rtlCol="0">
-            <a:spAutoFit/>
-          </a:bodyPr>
-          <a:lstStyle/>
-          <a:p>
-            <a:pPr algn="ctr"/>
-            <a:r>
-              <a:rPr lang="en-US" sz="1000" dirty="0"/>
-              <a:t>Regulation of </a:t>
-            </a:r>
-            <a:r>
-              <a:rPr lang="en-US" sz="1000" i="1" dirty="0"/>
-              <a:t>X </a:t>
-            </a:r>
-            <a:r>
-              <a:rPr lang="en-US" sz="1000" dirty="0"/>
-              <a:t>expression </a:t>
-            </a:r>
-          </a:p>
-          <a:p>
-            <a:pPr algn="ctr"/>
-            <a:r>
-              <a:rPr lang="en-US" sz="1000" dirty="0"/>
-              <a:t>by  coarse-grained proteome sectors ? </a:t>
-            </a:r>
-            <a:endParaRPr lang="en-US" sz="1000" i="1" dirty="0"/>
-          </a:p>
-        </p:txBody>
-      </p:sp>
-      <p:grpSp>
-        <p:nvGrpSpPr>
-          <p:cNvPr id="3" name="Group 2">
-            <a:extLst>
-              <a:ext uri="{FF2B5EF4-FFF2-40B4-BE49-F238E27FC236}">
-                <a16:creationId xmlns:a16="http://schemas.microsoft.com/office/drawing/2014/main" id="{2B125E49-DFF6-D145-BB57-74F0E088AC66}"/>
-              </a:ext>
-            </a:extLst>
-          </p:cNvPr>
-          <p:cNvGrpSpPr/>
-          <p:nvPr/>
-        </p:nvGrpSpPr>
-        <p:grpSpPr>
-          <a:xfrm>
-            <a:off x="634957" y="874714"/>
-            <a:ext cx="2582550" cy="1508822"/>
-            <a:chOff x="3819713" y="765944"/>
-            <a:chExt cx="1787919" cy="1044569"/>
-          </a:xfrm>
-        </p:grpSpPr>
-        <p:grpSp>
-          <p:nvGrpSpPr>
-            <p:cNvPr id="4" name="Group 3">
-              <a:extLst>
-                <a:ext uri="{FF2B5EF4-FFF2-40B4-BE49-F238E27FC236}">
-                  <a16:creationId xmlns:a16="http://schemas.microsoft.com/office/drawing/2014/main" id="{FA9E0486-59F0-D745-AA41-3A1D171609F7}"/>
-                </a:ext>
-              </a:extLst>
-            </p:cNvPr>
-            <p:cNvGrpSpPr/>
-            <p:nvPr/>
-          </p:nvGrpSpPr>
-          <p:grpSpPr>
-            <a:xfrm>
-              <a:off x="4037627" y="765944"/>
-              <a:ext cx="1123801" cy="286455"/>
-              <a:chOff x="2233978" y="1508637"/>
-              <a:chExt cx="1997868" cy="509254"/>
-            </a:xfrm>
-          </p:grpSpPr>
-          <mc:AlternateContent xmlns:mc="http://schemas.openxmlformats.org/markup-compatibility/2006" xmlns:a14="http://schemas.microsoft.com/office/drawing/2010/main">
-            <mc:Choice Requires="a14">
-              <p:sp>
-                <p:nvSpPr>
-                  <p:cNvPr id="12" name="Rectangle 11">
-                    <a:extLst>
-                      <a:ext uri="{FF2B5EF4-FFF2-40B4-BE49-F238E27FC236}">
-                        <a16:creationId xmlns:a16="http://schemas.microsoft.com/office/drawing/2014/main" id="{D6968C6D-2F86-A945-A7D1-900F9C99A29E}"/>
-                      </a:ext>
-                    </a:extLst>
-                  </p:cNvPr>
-                  <p:cNvSpPr/>
-                  <p:nvPr/>
-                </p:nvSpPr>
-                <p:spPr>
-                  <a:xfrm>
-                    <a:off x="2233978" y="1508637"/>
-                    <a:ext cx="1997868" cy="509254"/>
-                  </a:xfrm>
-                  <a:prstGeom prst="rect">
-                    <a:avLst/>
-                  </a:prstGeom>
-                </p:spPr>
-                <p:txBody>
-                  <a:bodyPr wrap="square">
-                    <a:spAutoFit/>
-                  </a:bodyPr>
-                  <a:lstStyle/>
-                  <a:p>
-                    <a:pPr/>
-                    <a14:m>
-                      <m:oMathPara xmlns:m="http://schemas.openxmlformats.org/officeDocument/2006/math">
-                        <m:oMathParaPr>
-                          <m:jc m:val="centerGroup"/>
-                        </m:oMathParaPr>
-                        <m:oMath xmlns:m="http://schemas.openxmlformats.org/officeDocument/2006/math">
-                          <m:sSub>
-                            <m:sSubPr>
-                              <m:ctrlPr>
-                                <a:rPr lang="ar-AE" sz="975" i="1" smtClean="0">
-                                  <a:latin typeface="Cambria Math" panose="02040503050406030204" pitchFamily="18" charset="0"/>
-                                </a:rPr>
-                              </m:ctrlPr>
-                            </m:sSubPr>
-                            <m:e>
-                              <m:r>
-                                <a:rPr lang="ar-AE" sz="975">
-                                  <a:latin typeface="Cambria Math" panose="02040503050406030204" pitchFamily="18" charset="0"/>
-                                </a:rPr>
-                                <m:t>𝑉</m:t>
-                              </m:r>
-                            </m:e>
-                            <m:sub>
-                              <m:r>
-                                <a:rPr lang="ar-AE" sz="975">
-                                  <a:latin typeface="Cambria Math" panose="02040503050406030204" pitchFamily="18" charset="0"/>
-                                </a:rPr>
-                                <m:t>𝑑𝑖𝑣</m:t>
-                              </m:r>
-                            </m:sub>
-                          </m:sSub>
-                          <m:r>
-                            <a:rPr lang="en-GB" sz="975" b="0" i="1" smtClean="0">
-                              <a:latin typeface="Cambria Math" panose="02040503050406030204" pitchFamily="18" charset="0"/>
-                              <a:ea typeface="Cambria Math" panose="02040503050406030204" pitchFamily="18" charset="0"/>
-                            </a:rPr>
-                            <m:t>=</m:t>
-                          </m:r>
-                          <m:f>
-                            <m:fPr>
-                              <m:ctrlPr>
-                                <a:rPr lang="ar-AE" sz="975" i="1">
-                                  <a:latin typeface="Cambria Math" panose="02040503050406030204" pitchFamily="18" charset="0"/>
-                                  <a:ea typeface="Cambria Math" panose="02040503050406030204" pitchFamily="18" charset="0"/>
-                                </a:rPr>
-                              </m:ctrlPr>
-                            </m:fPr>
-                            <m:num>
-                              <m:sSub>
-                                <m:sSubPr>
-                                  <m:ctrlPr>
-                                    <a:rPr lang="ar-AE" sz="975" i="1" smtClean="0">
-                                      <a:latin typeface="Cambria Math" panose="02040503050406030204" pitchFamily="18" charset="0"/>
-                                      <a:ea typeface="Cambria Math" panose="02040503050406030204" pitchFamily="18" charset="0"/>
-                                    </a:rPr>
-                                  </m:ctrlPr>
-                                </m:sSubPr>
-                                <m:e>
-                                  <m:r>
-                                    <a:rPr lang="en-GB" sz="975" b="0" i="1" smtClean="0">
-                                      <a:latin typeface="Cambria Math" panose="02040503050406030204" pitchFamily="18" charset="0"/>
-                                      <a:ea typeface="Cambria Math" panose="02040503050406030204" pitchFamily="18" charset="0"/>
-                                    </a:rPr>
-                                    <m:t>𝑋</m:t>
-                                  </m:r>
-                                </m:e>
-                                <m:sub>
-                                  <m:r>
-                                    <a:rPr lang="en-GB" sz="975" b="0" i="1" smtClean="0">
-                                      <a:latin typeface="Cambria Math" panose="02040503050406030204" pitchFamily="18" charset="0"/>
-                                      <a:ea typeface="Cambria Math" panose="02040503050406030204" pitchFamily="18" charset="0"/>
-                                    </a:rPr>
-                                    <m:t>𝑑𝑖𝑣</m:t>
-                                  </m:r>
-                                </m:sub>
-                              </m:sSub>
-                            </m:num>
-                            <m:den>
-                              <m:r>
-                                <a:rPr lang="en-GB" sz="975" i="1">
-                                  <a:latin typeface="Cambria Math" panose="02040503050406030204" pitchFamily="18" charset="0"/>
-                                  <a:ea typeface="Cambria Math" panose="02040503050406030204" pitchFamily="18" charset="0"/>
-                                </a:rPr>
-                                <m:t>𝑥</m:t>
-                              </m:r>
-                            </m:den>
-                          </m:f>
-                          <m:r>
-                            <a:rPr lang="en-GB" sz="975" i="1">
-                              <a:latin typeface="Cambria Math" panose="02040503050406030204" pitchFamily="18" charset="0"/>
-                              <a:ea typeface="Cambria Math" panose="02040503050406030204" pitchFamily="18" charset="0"/>
-                            </a:rPr>
-                            <m:t>=</m:t>
-                          </m:r>
-                          <m:f>
-                            <m:fPr>
-                              <m:ctrlPr>
-                                <a:rPr lang="ar-AE" sz="975" i="1">
-                                  <a:latin typeface="Cambria Math" panose="02040503050406030204" pitchFamily="18" charset="0"/>
-                                </a:rPr>
-                              </m:ctrlPr>
-                            </m:fPr>
-                            <m:num>
-                              <m:sSub>
-                                <m:sSubPr>
-                                  <m:ctrlPr>
-                                    <a:rPr lang="ar-AE" sz="975" i="1" smtClean="0">
-                                      <a:latin typeface="Cambria Math" panose="02040503050406030204" pitchFamily="18" charset="0"/>
-                                    </a:rPr>
-                                  </m:ctrlPr>
-                                </m:sSubPr>
-                                <m:e>
-                                  <m:r>
-                                    <a:rPr lang="en-GB" sz="975" b="0" i="1" smtClean="0">
-                                      <a:latin typeface="Cambria Math" panose="02040503050406030204" pitchFamily="18" charset="0"/>
-                                    </a:rPr>
-                                    <m:t>𝑋</m:t>
-                                  </m:r>
-                                </m:e>
-                                <m:sub>
-                                  <m:r>
-                                    <a:rPr lang="en-GB" sz="975" b="0" i="1" smtClean="0">
-                                      <a:latin typeface="Cambria Math" panose="02040503050406030204" pitchFamily="18" charset="0"/>
-                                    </a:rPr>
-                                    <m:t>𝑑𝑖𝑣</m:t>
-                                  </m:r>
-                                </m:sub>
-                              </m:sSub>
-                            </m:num>
-                            <m:den>
-                              <m:sSub>
-                                <m:sSubPr>
-                                  <m:ctrlPr>
-                                    <a:rPr lang="ar-AE" sz="975" i="1">
-                                      <a:latin typeface="Cambria Math" panose="02040503050406030204" pitchFamily="18" charset="0"/>
-                                    </a:rPr>
-                                  </m:ctrlPr>
-                                </m:sSubPr>
-                                <m:e>
-                                  <m:r>
-                                    <a:rPr lang="ar-AE" sz="975">
-                                      <a:latin typeface="Cambria Math" panose="02040503050406030204" pitchFamily="18" charset="0"/>
-                                    </a:rPr>
-                                    <m:t>𝑓</m:t>
-                                  </m:r>
-                                </m:e>
-                                <m:sub>
-                                  <m:r>
-                                    <a:rPr lang="ar-AE" sz="975">
-                                      <a:latin typeface="Cambria Math" panose="02040503050406030204" pitchFamily="18" charset="0"/>
-                                    </a:rPr>
-                                    <m:t>𝑋</m:t>
-                                  </m:r>
-                                </m:sub>
-                              </m:sSub>
-                              <m:r>
-                                <a:rPr lang="ar-AE" sz="975">
-                                  <a:latin typeface="Cambria Math" panose="02040503050406030204" pitchFamily="18" charset="0"/>
-                                </a:rPr>
-                                <m:t>(1−</m:t>
-                              </m:r>
-                              <m:r>
-                                <a:rPr lang="ar-AE" sz="975">
-                                  <a:latin typeface="Cambria Math" panose="02040503050406030204" pitchFamily="18" charset="0"/>
-                                </a:rPr>
-                                <m:t>𝑎</m:t>
-                              </m:r>
-                              <m:r>
-                                <a:rPr lang="ar-AE" sz="975">
-                                  <a:latin typeface="Cambria Math" panose="02040503050406030204" pitchFamily="18" charset="0"/>
-                                </a:rPr>
-                                <m:t>)</m:t>
-                              </m:r>
-                            </m:den>
-                          </m:f>
-                        </m:oMath>
-                      </m:oMathPara>
-                    </a14:m>
-                    <a:endParaRPr lang="en-US" sz="975" dirty="0"/>
-                  </a:p>
-                </p:txBody>
-              </p:sp>
-            </mc:Choice>
-            <mc:Fallback xmlns="">
-              <p:sp>
-                <p:nvSpPr>
-                  <p:cNvPr id="5" name="Rectangle 4">
-                    <a:extLst>
-                      <a:ext uri="{FF2B5EF4-FFF2-40B4-BE49-F238E27FC236}">
-                        <a16:creationId xmlns:a16="http://schemas.microsoft.com/office/drawing/2014/main" id="{FAF41DE5-820C-514A-964A-465E1F99AF43}"/>
-                      </a:ext>
-                    </a:extLst>
-                  </p:cNvPr>
-                  <p:cNvSpPr>
-                    <a:spLocks noRot="1" noChangeAspect="1" noMove="1" noResize="1" noEditPoints="1" noAdjustHandles="1" noChangeArrowheads="1" noChangeShapeType="1" noTextEdit="1"/>
-                  </p:cNvSpPr>
-                  <p:nvPr/>
-                </p:nvSpPr>
-                <p:spPr>
-                  <a:xfrm>
-                    <a:off x="2233978" y="1508637"/>
-                    <a:ext cx="1997868" cy="509254"/>
-                  </a:xfrm>
-                  <a:prstGeom prst="rect">
-                    <a:avLst/>
-                  </a:prstGeom>
-                  <a:blipFill>
-                    <a:blip r:embed="rId4"/>
-                    <a:stretch>
-                      <a:fillRect/>
-                    </a:stretch>
-                  </a:blipFill>
-                </p:spPr>
-                <p:txBody>
-                  <a:bodyPr/>
-                  <a:lstStyle/>
-                  <a:p>
-                    <a:r>
-                      <a:rPr lang="en-US">
-                        <a:noFill/>
-                      </a:rPr>
-                      <a:t> </a:t>
-                    </a:r>
-                  </a:p>
-                </p:txBody>
-              </p:sp>
-            </mc:Fallback>
-          </mc:AlternateContent>
-          <p:sp>
-            <p:nvSpPr>
-              <p:cNvPr id="13" name="Rounded Rectangle 12">
-                <a:extLst>
-                  <a:ext uri="{FF2B5EF4-FFF2-40B4-BE49-F238E27FC236}">
-                    <a16:creationId xmlns:a16="http://schemas.microsoft.com/office/drawing/2014/main" id="{9A48231A-EE8A-3441-A88C-43A0B143E614}"/>
-                  </a:ext>
-                </a:extLst>
-              </p:cNvPr>
-              <p:cNvSpPr/>
-              <p:nvPr/>
-            </p:nvSpPr>
-            <p:spPr>
-              <a:xfrm>
-                <a:off x="3369621" y="1776341"/>
-                <a:ext cx="166977" cy="198229"/>
-              </a:xfrm>
-              <a:prstGeom prst="roundRect">
-                <a:avLst/>
-              </a:prstGeom>
-              <a:noFill/>
-              <a:ln>
-                <a:solidFill>
-                  <a:srgbClr val="FF0000"/>
-                </a:solidFill>
-              </a:ln>
-            </p:spPr>
-            <p:style>
-              <a:lnRef idx="2">
-                <a:schemeClr val="accent1">
-                  <a:shade val="50000"/>
-                </a:schemeClr>
-              </a:lnRef>
-              <a:fillRef idx="1">
-                <a:schemeClr val="accent1"/>
-              </a:fillRef>
-              <a:effectRef idx="0">
-                <a:schemeClr val="accent1"/>
-              </a:effectRef>
-              <a:fontRef idx="minor">
-                <a:schemeClr val="lt1"/>
-              </a:fontRef>
-            </p:style>
-            <p:txBody>
-              <a:bodyPr rtlCol="0" anchor="ctr"/>
-              <a:lstStyle/>
-              <a:p>
-                <a:pPr algn="ctr"/>
-                <a:endParaRPr lang="en-US" sz="1463"/>
-              </a:p>
-            </p:txBody>
-          </p:sp>
-        </p:grpSp>
-        <p:cxnSp>
-          <p:nvCxnSpPr>
-            <p:cNvPr id="5" name="Straight Connector 4">
-              <a:extLst>
-                <a:ext uri="{FF2B5EF4-FFF2-40B4-BE49-F238E27FC236}">
-                  <a16:creationId xmlns:a16="http://schemas.microsoft.com/office/drawing/2014/main" id="{4D7B527C-2E77-3745-9959-E979D6F57D43}"/>
-                </a:ext>
-              </a:extLst>
-            </p:cNvPr>
-            <p:cNvCxnSpPr>
-              <a:cxnSpLocks/>
-            </p:cNvCxnSpPr>
-            <p:nvPr/>
-          </p:nvCxnSpPr>
-          <p:spPr>
-            <a:xfrm>
-              <a:off x="4723389" y="1026558"/>
-              <a:ext cx="0" cy="163506"/>
-            </a:xfrm>
-            <a:prstGeom prst="line">
-              <a:avLst/>
-            </a:prstGeom>
-            <a:ln w="12700">
-              <a:solidFill>
-                <a:schemeClr val="tx1">
-                  <a:lumMod val="50000"/>
-                  <a:lumOff val="50000"/>
-                </a:schemeClr>
-              </a:solidFill>
-            </a:ln>
-          </p:spPr>
-          <p:style>
-            <a:lnRef idx="1">
-              <a:schemeClr val="accent1"/>
-            </a:lnRef>
-            <a:fillRef idx="0">
-              <a:schemeClr val="accent1"/>
-            </a:fillRef>
-            <a:effectRef idx="0">
-              <a:schemeClr val="accent1"/>
-            </a:effectRef>
-            <a:fontRef idx="minor">
-              <a:schemeClr val="tx1"/>
-            </a:fontRef>
-          </p:style>
-        </p:cxnSp>
-        <mc:AlternateContent xmlns:mc="http://schemas.openxmlformats.org/markup-compatibility/2006">
-          <mc:Choice xmlns:a14="http://schemas.microsoft.com/office/drawing/2010/main" Requires="a14">
-            <p:sp>
-              <p:nvSpPr>
-                <p:cNvPr id="6" name="Rectangle 5">
-                  <a:extLst>
-                    <a:ext uri="{FF2B5EF4-FFF2-40B4-BE49-F238E27FC236}">
-                      <a16:creationId xmlns:a16="http://schemas.microsoft.com/office/drawing/2014/main" id="{078E68AA-B5E7-164A-98AE-06FEF9DC2005}"/>
-                    </a:ext>
-                  </a:extLst>
-                </p:cNvPr>
-                <p:cNvSpPr/>
-                <p:nvPr/>
-              </p:nvSpPr>
-              <p:spPr>
-                <a:xfrm>
-                  <a:off x="3819713" y="1426976"/>
-                  <a:ext cx="1123801" cy="383537"/>
-                </a:xfrm>
-                <a:prstGeom prst="rect">
-                  <a:avLst/>
-                </a:prstGeom>
-              </p:spPr>
-              <p:txBody>
-                <a:bodyPr wrap="square">
-                  <a:spAutoFit/>
-                </a:bodyPr>
-                <a:lstStyle/>
-                <a:p>
-                  <a:pPr/>
-                  <a14:m>
-                    <m:oMathPara xmlns:m="http://schemas.openxmlformats.org/officeDocument/2006/math">
-                      <m:oMathParaPr>
-                        <m:jc m:val="centerGroup"/>
-                      </m:oMathParaPr>
-                      <m:oMath xmlns:m="http://schemas.openxmlformats.org/officeDocument/2006/math">
-                        <m:sSub>
-                          <m:sSubPr>
-                            <m:ctrlPr>
-                              <a:rPr lang="ar-AE" sz="1000" i="1">
-                                <a:latin typeface="Cambria Math" panose="02040503050406030204" pitchFamily="18" charset="0"/>
-                              </a:rPr>
-                            </m:ctrlPr>
-                          </m:sSubPr>
-                          <m:e>
-                            <m:r>
-                              <a:rPr lang="ar-AE" sz="1000">
-                                <a:latin typeface="Cambria Math" panose="02040503050406030204" pitchFamily="18" charset="0"/>
-                              </a:rPr>
-                              <m:t>𝑓</m:t>
-                            </m:r>
-                          </m:e>
-                          <m:sub>
-                            <m:r>
-                              <a:rPr lang="ar-AE" sz="1000">
-                                <a:latin typeface="Cambria Math" panose="02040503050406030204" pitchFamily="18" charset="0"/>
-                              </a:rPr>
-                              <m:t>𝑋</m:t>
-                            </m:r>
-                          </m:sub>
-                        </m:sSub>
-                        <m:r>
-                          <a:rPr lang="en-GB" sz="1000" i="1">
-                            <a:latin typeface="Cambria Math" panose="02040503050406030204" pitchFamily="18" charset="0"/>
-                          </a:rPr>
-                          <m:t>=</m:t>
-                        </m:r>
-                        <m:r>
-                          <a:rPr lang="en-GB" sz="1000" i="1">
-                            <a:latin typeface="Cambria Math" panose="02040503050406030204" pitchFamily="18" charset="0"/>
-                          </a:rPr>
-                          <m:t>𝑓</m:t>
-                        </m:r>
-                        <m:d>
-                          <m:dPr>
-                            <m:ctrlPr>
-                              <a:rPr lang="en-GB" sz="1000" i="1">
-                                <a:latin typeface="Cambria Math" panose="02040503050406030204" pitchFamily="18" charset="0"/>
-                              </a:rPr>
-                            </m:ctrlPr>
-                          </m:dPr>
-                          <m:e>
-                            <m:r>
-                              <a:rPr lang="en-GB" sz="1000" i="1">
-                                <a:latin typeface="Cambria Math" panose="02040503050406030204" pitchFamily="18" charset="0"/>
-                              </a:rPr>
-                              <m:t>𝑒</m:t>
-                            </m:r>
-                          </m:e>
-                        </m:d>
-                        <m:r>
-                          <a:rPr lang="en-GB" sz="1000" i="1">
-                            <a:latin typeface="Cambria Math" panose="02040503050406030204" pitchFamily="18" charset="0"/>
-                          </a:rPr>
-                          <m:t> ?</m:t>
-                        </m:r>
-                      </m:oMath>
-                    </m:oMathPara>
-                  </a14:m>
-                  <a:endParaRPr lang="en-GB" sz="1000" i="1" dirty="0">
-                    <a:latin typeface="Cambria Math" panose="02040503050406030204" pitchFamily="18" charset="0"/>
-                  </a:endParaRPr>
-                </a:p>
-                <a:p>
-                  <a:pPr/>
-                  <a14:m>
-                    <m:oMathPara xmlns:m="http://schemas.openxmlformats.org/officeDocument/2006/math">
-                      <m:oMathParaPr>
-                        <m:jc m:val="centerGroup"/>
-                      </m:oMathParaPr>
-                      <m:oMath xmlns:m="http://schemas.openxmlformats.org/officeDocument/2006/math">
-                        <m:sSub>
-                          <m:sSubPr>
-                            <m:ctrlPr>
-                              <a:rPr lang="ar-AE" sz="1000" i="1">
-                                <a:latin typeface="Cambria Math" panose="02040503050406030204" pitchFamily="18" charset="0"/>
-                              </a:rPr>
-                            </m:ctrlPr>
-                          </m:sSubPr>
-                          <m:e>
-                            <m:r>
-                              <a:rPr lang="ar-AE" sz="1000">
-                                <a:latin typeface="Cambria Math" panose="02040503050406030204" pitchFamily="18" charset="0"/>
-                              </a:rPr>
-                              <m:t>𝑓</m:t>
-                            </m:r>
-                          </m:e>
-                          <m:sub>
-                            <m:r>
-                              <a:rPr lang="ar-AE" sz="1000">
-                                <a:latin typeface="Cambria Math" panose="02040503050406030204" pitchFamily="18" charset="0"/>
-                              </a:rPr>
-                              <m:t>𝑋</m:t>
-                            </m:r>
-                          </m:sub>
-                        </m:sSub>
-                        <m:r>
-                          <a:rPr lang="en-GB" sz="1000" i="1">
-                            <a:latin typeface="Cambria Math" panose="02040503050406030204" pitchFamily="18" charset="0"/>
-                          </a:rPr>
-                          <m:t>=</m:t>
-                        </m:r>
-                        <m:r>
-                          <a:rPr lang="en-GB" sz="1000" i="1">
-                            <a:latin typeface="Cambria Math" panose="02040503050406030204" pitchFamily="18" charset="0"/>
-                          </a:rPr>
-                          <m:t>𝑓</m:t>
-                        </m:r>
-                        <m:d>
-                          <m:dPr>
-                            <m:ctrlPr>
-                              <a:rPr lang="en-GB" sz="1000" i="1">
-                                <a:latin typeface="Cambria Math" panose="02040503050406030204" pitchFamily="18" charset="0"/>
-                              </a:rPr>
-                            </m:ctrlPr>
-                          </m:dPr>
-                          <m:e>
-                            <m:r>
-                              <a:rPr lang="en-GB" sz="1000" i="1">
-                                <a:latin typeface="Cambria Math" panose="02040503050406030204" pitchFamily="18" charset="0"/>
-                              </a:rPr>
-                              <m:t>𝑟</m:t>
-                            </m:r>
-                          </m:e>
-                        </m:d>
-                        <m:r>
-                          <a:rPr lang="en-GB" sz="1000" i="1">
-                            <a:latin typeface="Cambria Math" panose="02040503050406030204" pitchFamily="18" charset="0"/>
-                          </a:rPr>
-                          <m:t> ?</m:t>
-                        </m:r>
-                      </m:oMath>
-                    </m:oMathPara>
-                  </a14:m>
-                  <a:endParaRPr lang="en-GB" sz="1000" i="1" dirty="0">
-                    <a:latin typeface="Cambria Math" panose="02040503050406030204" pitchFamily="18" charset="0"/>
-                  </a:endParaRPr>
-                </a:p>
-                <a:p>
-                  <a:pPr algn="ctr"/>
-                  <a:r>
-                    <a:rPr lang="en-GB" sz="1000" i="1" dirty="0">
-                      <a:latin typeface="Cambria Math" panose="02040503050406030204" pitchFamily="18" charset="0"/>
-                    </a:rPr>
-                    <a:t>…</a:t>
-                  </a:r>
-                </a:p>
-              </p:txBody>
-            </p:sp>
-          </mc:Choice>
-          <mc:Fallback>
-            <p:sp>
-              <p:nvSpPr>
-                <p:cNvPr id="6" name="Rectangle 5">
-                  <a:extLst>
-                    <a:ext uri="{FF2B5EF4-FFF2-40B4-BE49-F238E27FC236}">
-                      <a16:creationId xmlns:a16="http://schemas.microsoft.com/office/drawing/2014/main" id="{078E68AA-B5E7-164A-98AE-06FEF9DC2005}"/>
-                    </a:ext>
-                  </a:extLst>
-                </p:cNvPr>
-                <p:cNvSpPr>
-                  <a:spLocks noRot="1" noChangeAspect="1" noMove="1" noResize="1" noEditPoints="1" noAdjustHandles="1" noChangeArrowheads="1" noChangeShapeType="1" noTextEdit="1"/>
-                </p:cNvSpPr>
-                <p:nvPr/>
-              </p:nvSpPr>
-              <p:spPr>
-                <a:xfrm>
-                  <a:off x="3819713" y="1426976"/>
-                  <a:ext cx="1123801" cy="383537"/>
-                </a:xfrm>
-                <a:prstGeom prst="rect">
-                  <a:avLst/>
-                </a:prstGeom>
-                <a:blipFill>
-                  <a:blip r:embed="rId5"/>
-                  <a:stretch>
-                    <a:fillRect b="-4545"/>
-                  </a:stretch>
-                </a:blipFill>
-              </p:spPr>
-              <p:txBody>
-                <a:bodyPr/>
-                <a:lstStyle/>
-                <a:p>
-                  <a:r>
-                    <a:rPr lang="en-US">
-                      <a:noFill/>
-                    </a:rPr>
-                    <a:t> </a:t>
-                  </a:r>
-                </a:p>
-              </p:txBody>
-            </p:sp>
-          </mc:Fallback>
-        </mc:AlternateContent>
-        <p:cxnSp>
-          <p:nvCxnSpPr>
-            <p:cNvPr id="7" name="Straight Connector 6">
-              <a:extLst>
-                <a:ext uri="{FF2B5EF4-FFF2-40B4-BE49-F238E27FC236}">
-                  <a16:creationId xmlns:a16="http://schemas.microsoft.com/office/drawing/2014/main" id="{CEBCC7F6-052F-3A4D-999D-979C96F01D44}"/>
-                </a:ext>
-              </a:extLst>
-            </p:cNvPr>
-            <p:cNvCxnSpPr>
-              <a:cxnSpLocks/>
-            </p:cNvCxnSpPr>
-            <p:nvPr/>
-          </p:nvCxnSpPr>
-          <p:spPr>
-            <a:xfrm>
-              <a:off x="4723389" y="1183340"/>
-              <a:ext cx="152400" cy="152400"/>
-            </a:xfrm>
-            <a:prstGeom prst="line">
-              <a:avLst/>
-            </a:prstGeom>
-            <a:ln w="12700">
-              <a:solidFill>
-                <a:schemeClr val="tx1">
-                  <a:lumMod val="50000"/>
-                  <a:lumOff val="50000"/>
-                </a:schemeClr>
-              </a:solidFill>
-            </a:ln>
-          </p:spPr>
-          <p:style>
-            <a:lnRef idx="1">
-              <a:schemeClr val="accent1"/>
-            </a:lnRef>
-            <a:fillRef idx="0">
-              <a:schemeClr val="accent1"/>
-            </a:fillRef>
-            <a:effectRef idx="0">
-              <a:schemeClr val="accent1"/>
-            </a:effectRef>
-            <a:fontRef idx="minor">
-              <a:schemeClr val="tx1"/>
-            </a:fontRef>
-          </p:style>
-        </p:cxnSp>
-        <p:cxnSp>
-          <p:nvCxnSpPr>
-            <p:cNvPr id="8" name="Straight Connector 7">
-              <a:extLst>
-                <a:ext uri="{FF2B5EF4-FFF2-40B4-BE49-F238E27FC236}">
-                  <a16:creationId xmlns:a16="http://schemas.microsoft.com/office/drawing/2014/main" id="{2E125432-D0F8-DA4E-8EF1-0FB78226183A}"/>
-                </a:ext>
-              </a:extLst>
-            </p:cNvPr>
-            <p:cNvCxnSpPr>
-              <a:cxnSpLocks/>
-            </p:cNvCxnSpPr>
-            <p:nvPr/>
-          </p:nvCxnSpPr>
-          <p:spPr>
-            <a:xfrm flipV="1">
-              <a:off x="4570990" y="1190064"/>
-              <a:ext cx="152398" cy="137026"/>
-            </a:xfrm>
-            <a:prstGeom prst="line">
-              <a:avLst/>
-            </a:prstGeom>
-            <a:ln w="12700">
-              <a:solidFill>
-                <a:schemeClr val="tx1">
-                  <a:lumMod val="50000"/>
-                  <a:lumOff val="50000"/>
-                </a:schemeClr>
-              </a:solidFill>
-            </a:ln>
-          </p:spPr>
-          <p:style>
-            <a:lnRef idx="1">
-              <a:schemeClr val="accent1"/>
-            </a:lnRef>
-            <a:fillRef idx="0">
-              <a:schemeClr val="accent1"/>
-            </a:fillRef>
-            <a:effectRef idx="0">
-              <a:schemeClr val="accent1"/>
-            </a:effectRef>
-            <a:fontRef idx="minor">
-              <a:schemeClr val="tx1"/>
-            </a:fontRef>
-          </p:style>
-        </p:cxnSp>
-        <mc:AlternateContent xmlns:mc="http://schemas.openxmlformats.org/markup-compatibility/2006">
-          <mc:Choice xmlns:a14="http://schemas.microsoft.com/office/drawing/2010/main" Requires="a14">
-            <p:sp>
-              <p:nvSpPr>
-                <p:cNvPr id="9" name="Rectangle 8">
-                  <a:extLst>
-                    <a:ext uri="{FF2B5EF4-FFF2-40B4-BE49-F238E27FC236}">
-                      <a16:creationId xmlns:a16="http://schemas.microsoft.com/office/drawing/2014/main" id="{E010211B-572D-D943-89CF-BA10E7F4ED7E}"/>
-                    </a:ext>
-                  </a:extLst>
-                </p:cNvPr>
-                <p:cNvSpPr/>
-                <p:nvPr/>
-              </p:nvSpPr>
-              <p:spPr>
-                <a:xfrm>
-                  <a:off x="4677659" y="1419894"/>
-                  <a:ext cx="929973" cy="383537"/>
-                </a:xfrm>
-                <a:prstGeom prst="rect">
-                  <a:avLst/>
-                </a:prstGeom>
-              </p:spPr>
-              <p:txBody>
-                <a:bodyPr wrap="square">
-                  <a:spAutoFit/>
-                </a:bodyPr>
-                <a:lstStyle/>
-                <a:p>
-                  <a:pPr/>
-                  <a14:m>
-                    <m:oMathPara xmlns:m="http://schemas.openxmlformats.org/officeDocument/2006/math">
-                      <m:oMathParaPr>
-                        <m:jc m:val="centerGroup"/>
-                      </m:oMathParaPr>
-                      <m:oMath xmlns:m="http://schemas.openxmlformats.org/officeDocument/2006/math">
-                        <m:sSub>
-                          <m:sSubPr>
-                            <m:ctrlPr>
-                              <a:rPr lang="ar-AE" sz="1000" i="1">
-                                <a:latin typeface="Cambria Math" panose="02040503050406030204" pitchFamily="18" charset="0"/>
-                              </a:rPr>
-                            </m:ctrlPr>
-                          </m:sSubPr>
-                          <m:e>
-                            <m:r>
-                              <a:rPr lang="ar-AE" sz="1000">
-                                <a:latin typeface="Cambria Math" panose="02040503050406030204" pitchFamily="18" charset="0"/>
-                              </a:rPr>
-                              <m:t>𝑓</m:t>
-                            </m:r>
-                          </m:e>
-                          <m:sub>
-                            <m:r>
-                              <a:rPr lang="ar-AE" sz="1000">
-                                <a:latin typeface="Cambria Math" panose="02040503050406030204" pitchFamily="18" charset="0"/>
-                              </a:rPr>
-                              <m:t>𝑋</m:t>
-                            </m:r>
-                          </m:sub>
-                        </m:sSub>
-                        <m:r>
-                          <a:rPr lang="en-GB" sz="1000" i="1">
-                            <a:latin typeface="Cambria Math" panose="02040503050406030204" pitchFamily="18" charset="0"/>
-                          </a:rPr>
-                          <m:t>=</m:t>
-                        </m:r>
-                        <m:r>
-                          <a:rPr lang="en-GB" sz="1000" i="1">
-                            <a:latin typeface="Cambria Math" panose="02040503050406030204" pitchFamily="18" charset="0"/>
-                          </a:rPr>
-                          <m:t>𝑓</m:t>
-                        </m:r>
-                        <m:d>
-                          <m:dPr>
-                            <m:ctrlPr>
-                              <a:rPr lang="en-GB" sz="1000" i="1">
-                                <a:latin typeface="Cambria Math" panose="02040503050406030204" pitchFamily="18" charset="0"/>
-                              </a:rPr>
-                            </m:ctrlPr>
-                          </m:dPr>
-                          <m:e>
-                            <m:r>
-                              <a:rPr lang="en-GB" sz="1000" i="1">
-                                <a:latin typeface="Cambria Math" panose="02040503050406030204" pitchFamily="18" charset="0"/>
-                              </a:rPr>
-                              <m:t>𝑒</m:t>
-                            </m:r>
-                            <m:r>
-                              <a:rPr lang="en-GB" sz="1000" i="1">
-                                <a:latin typeface="Cambria Math" panose="02040503050406030204" pitchFamily="18" charset="0"/>
-                              </a:rPr>
-                              <m:t>,</m:t>
-                            </m:r>
-                            <m:r>
-                              <a:rPr lang="en-GB" sz="1000" i="1">
-                                <a:latin typeface="Cambria Math" panose="02040503050406030204" pitchFamily="18" charset="0"/>
-                              </a:rPr>
-                              <m:t>𝑟</m:t>
-                            </m:r>
-                          </m:e>
-                        </m:d>
-                        <m:r>
-                          <a:rPr lang="en-GB" sz="1000" i="1">
-                            <a:latin typeface="Cambria Math" panose="02040503050406030204" pitchFamily="18" charset="0"/>
-                          </a:rPr>
-                          <m:t> ?</m:t>
-                        </m:r>
-                      </m:oMath>
-                    </m:oMathPara>
-                  </a14:m>
-                  <a:endParaRPr lang="en-GB" sz="1000" i="1" dirty="0">
-                    <a:latin typeface="Cambria Math" panose="02040503050406030204" pitchFamily="18" charset="0"/>
-                  </a:endParaRPr>
-                </a:p>
-                <a:p>
-                  <a:pPr/>
-                  <a14:m>
-                    <m:oMathPara xmlns:m="http://schemas.openxmlformats.org/officeDocument/2006/math">
-                      <m:oMathParaPr>
-                        <m:jc m:val="centerGroup"/>
-                      </m:oMathParaPr>
-                      <m:oMath xmlns:m="http://schemas.openxmlformats.org/officeDocument/2006/math">
-                        <m:sSub>
-                          <m:sSubPr>
-                            <m:ctrlPr>
-                              <a:rPr lang="ar-AE" sz="1000" i="1">
-                                <a:latin typeface="Cambria Math" panose="02040503050406030204" pitchFamily="18" charset="0"/>
-                              </a:rPr>
-                            </m:ctrlPr>
-                          </m:sSubPr>
-                          <m:e>
-                            <m:r>
-                              <a:rPr lang="ar-AE" sz="1000">
-                                <a:latin typeface="Cambria Math" panose="02040503050406030204" pitchFamily="18" charset="0"/>
-                              </a:rPr>
-                              <m:t>𝑓</m:t>
-                            </m:r>
-                          </m:e>
-                          <m:sub>
-                            <m:r>
-                              <a:rPr lang="ar-AE" sz="1000">
-                                <a:latin typeface="Cambria Math" panose="02040503050406030204" pitchFamily="18" charset="0"/>
-                              </a:rPr>
-                              <m:t>𝑋</m:t>
-                            </m:r>
-                          </m:sub>
-                        </m:sSub>
-                        <m:r>
-                          <a:rPr lang="en-GB" sz="1000" i="1">
-                            <a:latin typeface="Cambria Math" panose="02040503050406030204" pitchFamily="18" charset="0"/>
-                          </a:rPr>
-                          <m:t>=</m:t>
-                        </m:r>
-                        <m:r>
-                          <a:rPr lang="en-GB" sz="1000" i="1">
-                            <a:latin typeface="Cambria Math" panose="02040503050406030204" pitchFamily="18" charset="0"/>
-                          </a:rPr>
-                          <m:t>𝑓</m:t>
-                        </m:r>
-                        <m:d>
-                          <m:dPr>
-                            <m:ctrlPr>
-                              <a:rPr lang="en-GB" sz="1000" i="1">
-                                <a:latin typeface="Cambria Math" panose="02040503050406030204" pitchFamily="18" charset="0"/>
-                              </a:rPr>
-                            </m:ctrlPr>
-                          </m:dPr>
-                          <m:e>
-                            <m:r>
-                              <a:rPr lang="en-GB" sz="1000" i="1">
-                                <a:latin typeface="Cambria Math" panose="02040503050406030204" pitchFamily="18" charset="0"/>
-                              </a:rPr>
-                              <m:t>𝑒</m:t>
-                            </m:r>
-                            <m:r>
-                              <a:rPr lang="en-GB" sz="1000" i="1">
-                                <a:latin typeface="Cambria Math" panose="02040503050406030204" pitchFamily="18" charset="0"/>
-                              </a:rPr>
-                              <m:t>,</m:t>
-                            </m:r>
-                            <m:sSub>
-                              <m:sSubPr>
-                                <m:ctrlPr>
-                                  <a:rPr lang="en-GB" sz="1000" i="1">
-                                    <a:latin typeface="Cambria Math" panose="02040503050406030204" pitchFamily="18" charset="0"/>
-                                  </a:rPr>
-                                </m:ctrlPr>
-                              </m:sSubPr>
-                              <m:e>
-                                <m:r>
-                                  <a:rPr lang="en-GB" sz="1000" i="1">
-                                    <a:latin typeface="Cambria Math" panose="02040503050406030204" pitchFamily="18" charset="0"/>
-                                  </a:rPr>
-                                  <m:t>𝑟</m:t>
-                                </m:r>
-                              </m:e>
-                              <m:sub>
-                                <m:r>
-                                  <a:rPr lang="en-GB" sz="1000" i="1">
-                                    <a:latin typeface="Cambria Math" panose="02040503050406030204" pitchFamily="18" charset="0"/>
-                                  </a:rPr>
-                                  <m:t>𝑎</m:t>
-                                </m:r>
-                              </m:sub>
-                            </m:sSub>
-                          </m:e>
-                        </m:d>
-                        <m:r>
-                          <a:rPr lang="en-GB" sz="1000" i="1">
-                            <a:latin typeface="Cambria Math" panose="02040503050406030204" pitchFamily="18" charset="0"/>
-                          </a:rPr>
-                          <m:t> ?</m:t>
-                        </m:r>
-                      </m:oMath>
-                    </m:oMathPara>
-                  </a14:m>
-                  <a:endParaRPr lang="en-GB" sz="1000" i="1" dirty="0">
-                    <a:latin typeface="Cambria Math" panose="02040503050406030204" pitchFamily="18" charset="0"/>
-                  </a:endParaRPr>
-                </a:p>
-                <a:p>
-                  <a:pPr algn="ctr"/>
-                  <a:r>
-                    <a:rPr lang="en-GB" sz="1000" i="1" dirty="0">
-                      <a:latin typeface="Cambria Math" panose="02040503050406030204" pitchFamily="18" charset="0"/>
-                    </a:rPr>
-                    <a:t>…</a:t>
-                  </a:r>
-                </a:p>
-              </p:txBody>
-            </p:sp>
-          </mc:Choice>
-          <mc:Fallback>
-            <p:sp>
-              <p:nvSpPr>
-                <p:cNvPr id="9" name="Rectangle 8">
-                  <a:extLst>
-                    <a:ext uri="{FF2B5EF4-FFF2-40B4-BE49-F238E27FC236}">
-                      <a16:creationId xmlns:a16="http://schemas.microsoft.com/office/drawing/2014/main" id="{E010211B-572D-D943-89CF-BA10E7F4ED7E}"/>
-                    </a:ext>
-                  </a:extLst>
-                </p:cNvPr>
-                <p:cNvSpPr>
-                  <a:spLocks noRot="1" noChangeAspect="1" noMove="1" noResize="1" noEditPoints="1" noAdjustHandles="1" noChangeArrowheads="1" noChangeShapeType="1" noTextEdit="1"/>
-                </p:cNvSpPr>
-                <p:nvPr/>
-              </p:nvSpPr>
-              <p:spPr>
-                <a:xfrm>
-                  <a:off x="4677659" y="1419894"/>
-                  <a:ext cx="929973" cy="383537"/>
-                </a:xfrm>
-                <a:prstGeom prst="rect">
-                  <a:avLst/>
-                </a:prstGeom>
-                <a:blipFill>
-                  <a:blip r:embed="rId6"/>
-                  <a:stretch>
-                    <a:fillRect b="-4444"/>
-                  </a:stretch>
-                </a:blipFill>
-              </p:spPr>
-              <p:txBody>
-                <a:bodyPr/>
-                <a:lstStyle/>
-                <a:p>
-                  <a:r>
-                    <a:rPr lang="en-US">
-                      <a:noFill/>
-                    </a:rPr>
-                    <a:t> </a:t>
-                  </a:r>
-                </a:p>
-              </p:txBody>
-            </p:sp>
-          </mc:Fallback>
-        </mc:AlternateContent>
-        <p:sp>
-          <p:nvSpPr>
-            <p:cNvPr id="10" name="TextBox 9">
-              <a:extLst>
-                <a:ext uri="{FF2B5EF4-FFF2-40B4-BE49-F238E27FC236}">
-                  <a16:creationId xmlns:a16="http://schemas.microsoft.com/office/drawing/2014/main" id="{13346BFA-9804-DA46-B640-D5C0927253EB}"/>
-                </a:ext>
-              </a:extLst>
-            </p:cNvPr>
-            <p:cNvSpPr txBox="1"/>
-            <p:nvPr/>
-          </p:nvSpPr>
-          <p:spPr>
-            <a:xfrm>
-              <a:off x="4089603" y="1261262"/>
-              <a:ext cx="553206" cy="171615"/>
-            </a:xfrm>
-            <a:prstGeom prst="rect">
-              <a:avLst/>
-            </a:prstGeom>
-            <a:noFill/>
-          </p:spPr>
-          <p:txBody>
-            <a:bodyPr wrap="square" rtlCol="0">
-              <a:spAutoFit/>
-            </a:bodyPr>
-            <a:lstStyle/>
-            <a:p>
-              <a:pPr algn="ctr"/>
-              <a:r>
-                <a:rPr lang="en-US" sz="1000" dirty="0"/>
-                <a:t>1 sector</a:t>
-              </a:r>
-            </a:p>
-          </p:txBody>
-        </p:sp>
-        <p:sp>
-          <p:nvSpPr>
-            <p:cNvPr id="11" name="TextBox 10">
-              <a:extLst>
-                <a:ext uri="{FF2B5EF4-FFF2-40B4-BE49-F238E27FC236}">
-                  <a16:creationId xmlns:a16="http://schemas.microsoft.com/office/drawing/2014/main" id="{81296C18-3549-4D41-985E-714F3381AB09}"/>
-                </a:ext>
-              </a:extLst>
-            </p:cNvPr>
-            <p:cNvSpPr txBox="1"/>
-            <p:nvPr/>
-          </p:nvSpPr>
-          <p:spPr>
-            <a:xfrm>
-              <a:off x="4829059" y="1262167"/>
-              <a:ext cx="550477" cy="171615"/>
-            </a:xfrm>
-            <a:prstGeom prst="rect">
-              <a:avLst/>
-            </a:prstGeom>
-            <a:noFill/>
-          </p:spPr>
-          <p:txBody>
-            <a:bodyPr wrap="square" rtlCol="0">
-              <a:spAutoFit/>
-            </a:bodyPr>
-            <a:lstStyle/>
-            <a:p>
-              <a:pPr algn="ctr"/>
-              <a:r>
-                <a:rPr lang="en-US" sz="1000" dirty="0"/>
-                <a:t>2 sectors</a:t>
-              </a:r>
-            </a:p>
-          </p:txBody>
-        </p:sp>
-      </p:grpSp>
-      <p:pic>
-        <p:nvPicPr>
-          <p:cNvPr id="20" name="Picture 19">
-            <a:extLst>
-              <a:ext uri="{FF2B5EF4-FFF2-40B4-BE49-F238E27FC236}">
-                <a16:creationId xmlns:a16="http://schemas.microsoft.com/office/drawing/2014/main" id="{36A56CB9-F8C2-5E47-A031-9B6BEA89C96F}"/>
-              </a:ext>
-            </a:extLst>
-          </p:cNvPr>
-          <p:cNvPicPr>
-            <a:picLocks noChangeAspect="1"/>
-          </p:cNvPicPr>
-          <p:nvPr/>
-        </p:nvPicPr>
-        <p:blipFill>
-          <a:blip r:embed="rId7"/>
-          <a:stretch>
-            <a:fillRect/>
-          </a:stretch>
-        </p:blipFill>
-        <p:spPr>
-          <a:xfrm>
-            <a:off x="3244391" y="462652"/>
-            <a:ext cx="2216449" cy="1994400"/>
-          </a:xfrm>
-          <a:prstGeom prst="rect">
-            <a:avLst/>
-          </a:prstGeom>
-        </p:spPr>
-      </p:pic>
-      <p:pic>
-        <p:nvPicPr>
-          <p:cNvPr id="26" name="Picture 25">
-            <a:extLst>
-              <a:ext uri="{FF2B5EF4-FFF2-40B4-BE49-F238E27FC236}">
-                <a16:creationId xmlns:a16="http://schemas.microsoft.com/office/drawing/2014/main" id="{1214D10C-D3B7-074D-ACAE-40702D9A9CDA}"/>
-              </a:ext>
-            </a:extLst>
-          </p:cNvPr>
-          <p:cNvPicPr>
-            <a:picLocks noChangeAspect="1"/>
-          </p:cNvPicPr>
-          <p:nvPr/>
-        </p:nvPicPr>
-        <p:blipFill>
-          <a:blip r:embed="rId8"/>
-          <a:stretch>
-            <a:fillRect/>
-          </a:stretch>
-        </p:blipFill>
-        <p:spPr>
-          <a:xfrm>
-            <a:off x="5857209" y="2951534"/>
-            <a:ext cx="2063368" cy="2052000"/>
-          </a:xfrm>
-          <a:prstGeom prst="rect">
-            <a:avLst/>
-          </a:prstGeom>
-        </p:spPr>
-      </p:pic>
-      <p:pic>
-        <p:nvPicPr>
-          <p:cNvPr id="28" name="Picture 27">
-            <a:extLst>
-              <a:ext uri="{FF2B5EF4-FFF2-40B4-BE49-F238E27FC236}">
-                <a16:creationId xmlns:a16="http://schemas.microsoft.com/office/drawing/2014/main" id="{064DDE42-E2CF-2F42-A2DA-694DE7C340A6}"/>
-              </a:ext>
-            </a:extLst>
-          </p:cNvPr>
-          <p:cNvPicPr>
-            <a:picLocks noChangeAspect="1"/>
-          </p:cNvPicPr>
-          <p:nvPr/>
-        </p:nvPicPr>
-        <p:blipFill>
-          <a:blip r:embed="rId9"/>
-          <a:stretch>
-            <a:fillRect/>
-          </a:stretch>
-        </p:blipFill>
-        <p:spPr>
-          <a:xfrm>
-            <a:off x="881519" y="2805230"/>
-            <a:ext cx="2071754" cy="2232000"/>
-          </a:xfrm>
-          <a:prstGeom prst="rect">
-            <a:avLst/>
-          </a:prstGeom>
-        </p:spPr>
-      </p:pic>
-      <p:pic>
-        <p:nvPicPr>
-          <p:cNvPr id="30" name="Picture 29">
-            <a:extLst>
-              <a:ext uri="{FF2B5EF4-FFF2-40B4-BE49-F238E27FC236}">
-                <a16:creationId xmlns:a16="http://schemas.microsoft.com/office/drawing/2014/main" id="{BB035F7B-BD00-CA4F-8964-C62DBB1EC5E5}"/>
-              </a:ext>
-            </a:extLst>
-          </p:cNvPr>
-          <p:cNvPicPr>
-            <a:picLocks noChangeAspect="1"/>
-          </p:cNvPicPr>
-          <p:nvPr/>
-        </p:nvPicPr>
-        <p:blipFill>
-          <a:blip r:embed="rId10"/>
-          <a:stretch>
-            <a:fillRect/>
-          </a:stretch>
-        </p:blipFill>
-        <p:spPr>
-          <a:xfrm>
-            <a:off x="3374990" y="2805230"/>
-            <a:ext cx="2071754" cy="2232000"/>
-          </a:xfrm>
-          <a:prstGeom prst="rect">
-            <a:avLst/>
-          </a:prstGeom>
-        </p:spPr>
-      </p:pic>
-      <p:pic>
-        <p:nvPicPr>
-          <p:cNvPr id="17" name="Picture 16">
-            <a:extLst>
-              <a:ext uri="{FF2B5EF4-FFF2-40B4-BE49-F238E27FC236}">
-                <a16:creationId xmlns:a16="http://schemas.microsoft.com/office/drawing/2014/main" id="{6324BA25-BC7C-894F-AA56-D2C0E3D25091}"/>
-              </a:ext>
-            </a:extLst>
-          </p:cNvPr>
-          <p:cNvPicPr>
-            <a:picLocks noChangeAspect="1"/>
-          </p:cNvPicPr>
-          <p:nvPr/>
-        </p:nvPicPr>
-        <p:blipFill>
-          <a:blip r:embed="rId11"/>
-          <a:stretch>
-            <a:fillRect/>
-          </a:stretch>
-        </p:blipFill>
-        <p:spPr>
-          <a:xfrm>
-            <a:off x="5689650" y="462652"/>
-            <a:ext cx="2216449" cy="1994400"/>
-          </a:xfrm>
-          <a:prstGeom prst="rect">
-            <a:avLst/>
-          </a:prstGeom>
-        </p:spPr>
-      </p:pic>
-      <p:sp>
-        <p:nvSpPr>
-          <p:cNvPr id="19" name="TextBox 18">
-            <a:extLst>
-              <a:ext uri="{FF2B5EF4-FFF2-40B4-BE49-F238E27FC236}">
-                <a16:creationId xmlns:a16="http://schemas.microsoft.com/office/drawing/2014/main" id="{20507238-4087-2D47-964A-1B78B92EF112}"/>
-              </a:ext>
-            </a:extLst>
-          </p:cNvPr>
-          <p:cNvSpPr txBox="1"/>
-          <p:nvPr/>
-        </p:nvSpPr>
-        <p:spPr>
-          <a:xfrm>
-            <a:off x="3007303" y="170654"/>
-            <a:ext cx="653849" cy="369332"/>
-          </a:xfrm>
-          <a:prstGeom prst="rect">
-            <a:avLst/>
-          </a:prstGeom>
-          <a:noFill/>
-        </p:spPr>
-        <p:txBody>
-          <a:bodyPr wrap="square" rtlCol="0">
-            <a:spAutoFit/>
-          </a:bodyPr>
-          <a:lstStyle/>
-          <a:p>
-            <a:pPr algn="ctr"/>
-            <a:r>
-              <a:rPr lang="en-US" dirty="0"/>
-              <a:t>B</a:t>
-            </a:r>
-          </a:p>
-        </p:txBody>
-      </p:sp>
-      <p:sp>
-        <p:nvSpPr>
-          <p:cNvPr id="21" name="TextBox 20">
-            <a:extLst>
-              <a:ext uri="{FF2B5EF4-FFF2-40B4-BE49-F238E27FC236}">
-                <a16:creationId xmlns:a16="http://schemas.microsoft.com/office/drawing/2014/main" id="{21F4215F-59F0-B54E-9769-46355C84593F}"/>
-              </a:ext>
-            </a:extLst>
-          </p:cNvPr>
-          <p:cNvSpPr txBox="1"/>
-          <p:nvPr/>
-        </p:nvSpPr>
-        <p:spPr>
-          <a:xfrm>
-            <a:off x="540959" y="174634"/>
-            <a:ext cx="653849" cy="369332"/>
-          </a:xfrm>
-          <a:prstGeom prst="rect">
-            <a:avLst/>
-          </a:prstGeom>
-          <a:noFill/>
-        </p:spPr>
-        <p:txBody>
-          <a:bodyPr wrap="square" rtlCol="0">
-            <a:spAutoFit/>
-          </a:bodyPr>
-          <a:lstStyle/>
-          <a:p>
-            <a:pPr algn="ctr"/>
-            <a:r>
-              <a:rPr lang="en-US" dirty="0"/>
-              <a:t>A</a:t>
-            </a:r>
-          </a:p>
-        </p:txBody>
-      </p:sp>
-      <p:sp>
-        <p:nvSpPr>
-          <p:cNvPr id="22" name="TextBox 21">
-            <a:extLst>
-              <a:ext uri="{FF2B5EF4-FFF2-40B4-BE49-F238E27FC236}">
-                <a16:creationId xmlns:a16="http://schemas.microsoft.com/office/drawing/2014/main" id="{27551EE1-A98C-2041-A253-62722020151F}"/>
-              </a:ext>
-            </a:extLst>
-          </p:cNvPr>
-          <p:cNvSpPr txBox="1"/>
-          <p:nvPr/>
-        </p:nvSpPr>
-        <p:spPr>
-          <a:xfrm>
-            <a:off x="5491091" y="180663"/>
-            <a:ext cx="653849" cy="369332"/>
-          </a:xfrm>
-          <a:prstGeom prst="rect">
-            <a:avLst/>
-          </a:prstGeom>
-          <a:noFill/>
-        </p:spPr>
-        <p:txBody>
-          <a:bodyPr wrap="square" rtlCol="0">
-            <a:spAutoFit/>
-          </a:bodyPr>
-          <a:lstStyle/>
-          <a:p>
-            <a:pPr algn="ctr"/>
-            <a:r>
-              <a:rPr lang="en-US" dirty="0"/>
-              <a:t>C</a:t>
-            </a:r>
-          </a:p>
-        </p:txBody>
-      </p:sp>
-      <p:sp>
-        <p:nvSpPr>
-          <p:cNvPr id="23" name="TextBox 22">
-            <a:extLst>
-              <a:ext uri="{FF2B5EF4-FFF2-40B4-BE49-F238E27FC236}">
-                <a16:creationId xmlns:a16="http://schemas.microsoft.com/office/drawing/2014/main" id="{F297667D-011D-CD4B-A527-B5CF14C57BDE}"/>
-              </a:ext>
-            </a:extLst>
-          </p:cNvPr>
-          <p:cNvSpPr txBox="1"/>
-          <p:nvPr/>
-        </p:nvSpPr>
-        <p:spPr>
-          <a:xfrm>
-            <a:off x="634957" y="2582202"/>
-            <a:ext cx="653849" cy="369332"/>
-          </a:xfrm>
-          <a:prstGeom prst="rect">
-            <a:avLst/>
-          </a:prstGeom>
-          <a:noFill/>
-        </p:spPr>
-        <p:txBody>
-          <a:bodyPr wrap="square" rtlCol="0">
-            <a:spAutoFit/>
-          </a:bodyPr>
-          <a:lstStyle/>
-          <a:p>
-            <a:pPr algn="ctr"/>
-            <a:r>
-              <a:rPr lang="en-US" dirty="0"/>
-              <a:t>D</a:t>
-            </a:r>
-          </a:p>
-        </p:txBody>
-      </p:sp>
-      <p:sp>
-        <p:nvSpPr>
-          <p:cNvPr id="24" name="TextBox 23">
-            <a:extLst>
-              <a:ext uri="{FF2B5EF4-FFF2-40B4-BE49-F238E27FC236}">
-                <a16:creationId xmlns:a16="http://schemas.microsoft.com/office/drawing/2014/main" id="{C420FE4E-2EA8-9840-8AFC-3AE73632EBDF}"/>
-              </a:ext>
-            </a:extLst>
-          </p:cNvPr>
-          <p:cNvSpPr txBox="1"/>
-          <p:nvPr/>
-        </p:nvSpPr>
-        <p:spPr>
-          <a:xfrm>
-            <a:off x="3020659" y="2604363"/>
-            <a:ext cx="653849" cy="369332"/>
-          </a:xfrm>
-          <a:prstGeom prst="rect">
-            <a:avLst/>
-          </a:prstGeom>
-          <a:noFill/>
-        </p:spPr>
-        <p:txBody>
-          <a:bodyPr wrap="square" rtlCol="0">
-            <a:spAutoFit/>
-          </a:bodyPr>
-          <a:lstStyle/>
-          <a:p>
-            <a:pPr algn="ctr"/>
-            <a:r>
-              <a:rPr lang="en-US" dirty="0"/>
-              <a:t>E</a:t>
-            </a:r>
-          </a:p>
-        </p:txBody>
-      </p:sp>
-      <p:sp>
-        <p:nvSpPr>
-          <p:cNvPr id="25" name="TextBox 24">
-            <a:extLst>
-              <a:ext uri="{FF2B5EF4-FFF2-40B4-BE49-F238E27FC236}">
-                <a16:creationId xmlns:a16="http://schemas.microsoft.com/office/drawing/2014/main" id="{5E4D8413-5FED-1646-BA5D-1F9555E1FBCA}"/>
-              </a:ext>
-            </a:extLst>
-          </p:cNvPr>
-          <p:cNvSpPr txBox="1"/>
-          <p:nvPr/>
-        </p:nvSpPr>
-        <p:spPr>
-          <a:xfrm>
-            <a:off x="5491091" y="2620564"/>
-            <a:ext cx="653849" cy="369332"/>
-          </a:xfrm>
-          <a:prstGeom prst="rect">
-            <a:avLst/>
-          </a:prstGeom>
-          <a:noFill/>
-        </p:spPr>
-        <p:txBody>
-          <a:bodyPr wrap="square" rtlCol="0">
-            <a:spAutoFit/>
-          </a:bodyPr>
-          <a:lstStyle/>
-          <a:p>
-            <a:pPr algn="ctr"/>
-            <a:r>
-              <a:rPr lang="en-US" dirty="0"/>
-              <a:t>F</a:t>
-            </a:r>
-          </a:p>
-        </p:txBody>
-      </p:sp>
-      <p:cxnSp>
-        <p:nvCxnSpPr>
-          <p:cNvPr id="27" name="Straight Connector 26">
-            <a:extLst>
-              <a:ext uri="{FF2B5EF4-FFF2-40B4-BE49-F238E27FC236}">
-                <a16:creationId xmlns:a16="http://schemas.microsoft.com/office/drawing/2014/main" id="{B3F9305B-2E5A-BD4F-AC61-F45DADDEE5B4}"/>
-              </a:ext>
-            </a:extLst>
-          </p:cNvPr>
-          <p:cNvCxnSpPr>
-            <a:cxnSpLocks/>
-          </p:cNvCxnSpPr>
-          <p:nvPr/>
-        </p:nvCxnSpPr>
-        <p:spPr>
-          <a:xfrm flipV="1">
-            <a:off x="2273224" y="948153"/>
-            <a:ext cx="218779" cy="27550"/>
-          </a:xfrm>
-          <a:prstGeom prst="line">
-            <a:avLst/>
-          </a:prstGeom>
-          <a:ln w="12700">
-            <a:solidFill>
-              <a:schemeClr val="tx1">
-                <a:lumMod val="50000"/>
-                <a:lumOff val="50000"/>
-              </a:schemeClr>
-            </a:solidFill>
-          </a:ln>
-        </p:spPr>
-        <p:style>
-          <a:lnRef idx="1">
-            <a:schemeClr val="accent1"/>
-          </a:lnRef>
-          <a:fillRef idx="0">
-            <a:schemeClr val="accent1"/>
-          </a:fillRef>
-          <a:effectRef idx="0">
-            <a:schemeClr val="accent1"/>
-          </a:effectRef>
-          <a:fontRef idx="minor">
-            <a:schemeClr val="tx1"/>
-          </a:fontRef>
-        </p:style>
-      </p:cxnSp>
-      <p:sp>
-        <p:nvSpPr>
-          <p:cNvPr id="29" name="TextBox 28">
-            <a:extLst>
-              <a:ext uri="{FF2B5EF4-FFF2-40B4-BE49-F238E27FC236}">
-                <a16:creationId xmlns:a16="http://schemas.microsoft.com/office/drawing/2014/main" id="{56D539A0-2282-9F42-84DD-84E704C697CE}"/>
-              </a:ext>
-            </a:extLst>
-          </p:cNvPr>
-          <p:cNvSpPr txBox="1"/>
-          <p:nvPr/>
-        </p:nvSpPr>
-        <p:spPr>
-          <a:xfrm>
-            <a:off x="2451139" y="819101"/>
-            <a:ext cx="675188" cy="247888"/>
-          </a:xfrm>
-          <a:prstGeom prst="rect">
-            <a:avLst/>
-          </a:prstGeom>
-          <a:noFill/>
-        </p:spPr>
-        <p:txBody>
-          <a:bodyPr wrap="square" rtlCol="0">
-            <a:spAutoFit/>
-          </a:bodyPr>
-          <a:lstStyle/>
-          <a:p>
-            <a:pPr algn="ctr"/>
-            <a:r>
-              <a:rPr lang="en-US" sz="1000" dirty="0"/>
-              <a:t>invariant</a:t>
-            </a:r>
-          </a:p>
-        </p:txBody>
-      </p:sp>
-    </p:spTree>
-    <p:extLst>
-      <p:ext uri="{BB962C8B-B14F-4D97-AF65-F5344CB8AC3E}">
-        <p14:creationId xmlns:p14="http://schemas.microsoft.com/office/powerpoint/2010/main" val="897640836"/>
-      </p:ext>
-    </p:extLst>
-  </p:cSld>
-  <p:clrMapOvr>
-    <a:masterClrMapping/>
-  </p:clrMapOvr>
-</p:sld>
-</file>
-
 <file path=ppt/theme/theme1.xml><?xml version="1.0" encoding="utf-8"?>
 <a:theme xmlns:a="http://schemas.openxmlformats.org/drawingml/2006/main" name="Office Theme">
   <a:themeElements>

</xml_diff>

<commit_message>
work on fig 3
</commit_message>
<xml_diff>
--- a/figure-assembly/figure-3.pptx
+++ b/figure-assembly/figure-3.pptx
@@ -2975,10 +2975,10 @@
       </p:grpSpPr>
       <p:pic>
         <p:nvPicPr>
-          <p:cNvPr id="41" name="Picture 40">
+          <p:cNvPr id="15" name="Picture 14">
             <a:extLst>
               <a:ext uri="{FF2B5EF4-FFF2-40B4-BE49-F238E27FC236}">
-                <a16:creationId xmlns:a16="http://schemas.microsoft.com/office/drawing/2014/main" id="{A655A352-AC0B-CD4C-A87A-EDD9E337C163}"/>
+                <a16:creationId xmlns:a16="http://schemas.microsoft.com/office/drawing/2014/main" id="{3062A902-89E9-E649-949F-B6C70295E302}"/>
               </a:ext>
             </a:extLst>
           </p:cNvPr>
@@ -2995,37 +2995,7 @@
         </p:blipFill>
         <p:spPr>
           <a:xfrm>
-            <a:off x="5645771" y="428081"/>
-            <a:ext cx="2217600" cy="1995436"/>
-          </a:xfrm>
-          <a:prstGeom prst="rect">
-            <a:avLst/>
-          </a:prstGeom>
-        </p:spPr>
-      </p:pic>
-      <p:pic>
-        <p:nvPicPr>
-          <p:cNvPr id="39" name="Picture 38">
-            <a:extLst>
-              <a:ext uri="{FF2B5EF4-FFF2-40B4-BE49-F238E27FC236}">
-                <a16:creationId xmlns:a16="http://schemas.microsoft.com/office/drawing/2014/main" id="{7D561F86-DEFC-C04C-9D00-A0B4EE7B9415}"/>
-              </a:ext>
-            </a:extLst>
-          </p:cNvPr>
-          <p:cNvPicPr>
-            <a:picLocks noChangeAspect="1"/>
-          </p:cNvPicPr>
-          <p:nvPr/>
-        </p:nvPicPr>
-        <p:blipFill>
-          <a:blip r:embed="rId3"/>
-          <a:stretch>
-            <a:fillRect/>
-          </a:stretch>
-        </p:blipFill>
-        <p:spPr>
-          <a:xfrm>
-            <a:off x="3226801" y="428081"/>
+            <a:off x="3213142" y="428081"/>
             <a:ext cx="2217600" cy="1995436"/>
           </a:xfrm>
           <a:prstGeom prst="rect">
@@ -4226,6 +4196,36 @@
           </a:prstGeom>
         </p:spPr>
       </p:pic>
+      <p:pic>
+        <p:nvPicPr>
+          <p:cNvPr id="17" name="Picture 16">
+            <a:extLst>
+              <a:ext uri="{FF2B5EF4-FFF2-40B4-BE49-F238E27FC236}">
+                <a16:creationId xmlns:a16="http://schemas.microsoft.com/office/drawing/2014/main" id="{C44CE829-F184-7547-8301-A65B7CCAB055}"/>
+              </a:ext>
+            </a:extLst>
+          </p:cNvPr>
+          <p:cNvPicPr>
+            <a:picLocks noChangeAspect="1"/>
+          </p:cNvPicPr>
+          <p:nvPr/>
+        </p:nvPicPr>
+        <p:blipFill>
+          <a:blip r:embed="rId8"/>
+          <a:stretch>
+            <a:fillRect/>
+          </a:stretch>
+        </p:blipFill>
+        <p:spPr>
+          <a:xfrm>
+            <a:off x="5645771" y="428081"/>
+            <a:ext cx="2217600" cy="1995436"/>
+          </a:xfrm>
+          <a:prstGeom prst="rect">
+            <a:avLst/>
+          </a:prstGeom>
+        </p:spPr>
+      </p:pic>
       <p:sp>
         <p:nvSpPr>
           <p:cNvPr id="21" name="TextBox 20">
@@ -4313,7 +4313,7 @@
           <p:nvPr/>
         </p:nvPicPr>
         <p:blipFill>
-          <a:blip r:embed="rId8"/>
+          <a:blip r:embed="rId9"/>
           <a:stretch>
             <a:fillRect/>
           </a:stretch>
@@ -4533,7 +4533,7 @@
           <p:nvPr/>
         </p:nvPicPr>
         <p:blipFill>
-          <a:blip r:embed="rId9"/>
+          <a:blip r:embed="rId10"/>
           <a:stretch>
             <a:fillRect/>
           </a:stretch>

</xml_diff>

<commit_message>
small change font size figure 3
</commit_message>
<xml_diff>
--- a/figure-assembly/figure-3.pptx
+++ b/figure-assembly/figure-3.pptx
@@ -245,7 +245,7 @@
           <a:p>
             <a:fld id="{25EC0CD3-564D-9742-98B5-86271438CCE6}" type="datetimeFigureOut">
               <a:rPr lang="en-US" smtClean="0"/>
-              <a:t>2/13/19</a:t>
+              <a:t>2/21/19</a:t>
             </a:fld>
             <a:endParaRPr lang="en-US"/>
           </a:p>
@@ -415,7 +415,7 @@
           <a:p>
             <a:fld id="{25EC0CD3-564D-9742-98B5-86271438CCE6}" type="datetimeFigureOut">
               <a:rPr lang="en-US" smtClean="0"/>
-              <a:t>2/13/19</a:t>
+              <a:t>2/21/19</a:t>
             </a:fld>
             <a:endParaRPr lang="en-US"/>
           </a:p>
@@ -595,7 +595,7 @@
           <a:p>
             <a:fld id="{25EC0CD3-564D-9742-98B5-86271438CCE6}" type="datetimeFigureOut">
               <a:rPr lang="en-US" smtClean="0"/>
-              <a:t>2/13/19</a:t>
+              <a:t>2/21/19</a:t>
             </a:fld>
             <a:endParaRPr lang="en-US"/>
           </a:p>
@@ -765,7 +765,7 @@
           <a:p>
             <a:fld id="{25EC0CD3-564D-9742-98B5-86271438CCE6}" type="datetimeFigureOut">
               <a:rPr lang="en-US" smtClean="0"/>
-              <a:t>2/13/19</a:t>
+              <a:t>2/21/19</a:t>
             </a:fld>
             <a:endParaRPr lang="en-US"/>
           </a:p>
@@ -1009,7 +1009,7 @@
           <a:p>
             <a:fld id="{25EC0CD3-564D-9742-98B5-86271438CCE6}" type="datetimeFigureOut">
               <a:rPr lang="en-US" smtClean="0"/>
-              <a:t>2/13/19</a:t>
+              <a:t>2/21/19</a:t>
             </a:fld>
             <a:endParaRPr lang="en-US"/>
           </a:p>
@@ -1241,7 +1241,7 @@
           <a:p>
             <a:fld id="{25EC0CD3-564D-9742-98B5-86271438CCE6}" type="datetimeFigureOut">
               <a:rPr lang="en-US" smtClean="0"/>
-              <a:t>2/13/19</a:t>
+              <a:t>2/21/19</a:t>
             </a:fld>
             <a:endParaRPr lang="en-US"/>
           </a:p>
@@ -1608,7 +1608,7 @@
           <a:p>
             <a:fld id="{25EC0CD3-564D-9742-98B5-86271438CCE6}" type="datetimeFigureOut">
               <a:rPr lang="en-US" smtClean="0"/>
-              <a:t>2/13/19</a:t>
+              <a:t>2/21/19</a:t>
             </a:fld>
             <a:endParaRPr lang="en-US"/>
           </a:p>
@@ -1726,7 +1726,7 @@
           <a:p>
             <a:fld id="{25EC0CD3-564D-9742-98B5-86271438CCE6}" type="datetimeFigureOut">
               <a:rPr lang="en-US" smtClean="0"/>
-              <a:t>2/13/19</a:t>
+              <a:t>2/21/19</a:t>
             </a:fld>
             <a:endParaRPr lang="en-US"/>
           </a:p>
@@ -1821,7 +1821,7 @@
           <a:p>
             <a:fld id="{25EC0CD3-564D-9742-98B5-86271438CCE6}" type="datetimeFigureOut">
               <a:rPr lang="en-US" smtClean="0"/>
-              <a:t>2/13/19</a:t>
+              <a:t>2/21/19</a:t>
             </a:fld>
             <a:endParaRPr lang="en-US"/>
           </a:p>
@@ -2098,7 +2098,7 @@
           <a:p>
             <a:fld id="{25EC0CD3-564D-9742-98B5-86271438CCE6}" type="datetimeFigureOut">
               <a:rPr lang="en-US" smtClean="0"/>
-              <a:t>2/13/19</a:t>
+              <a:t>2/21/19</a:t>
             </a:fld>
             <a:endParaRPr lang="en-US"/>
           </a:p>
@@ -2355,7 +2355,7 @@
           <a:p>
             <a:fld id="{25EC0CD3-564D-9742-98B5-86271438CCE6}" type="datetimeFigureOut">
               <a:rPr lang="en-US" smtClean="0"/>
-              <a:t>2/13/19</a:t>
+              <a:t>2/21/19</a:t>
             </a:fld>
             <a:endParaRPr lang="en-US"/>
           </a:p>
@@ -2568,7 +2568,7 @@
           <a:p>
             <a:fld id="{25EC0CD3-564D-9742-98B5-86271438CCE6}" type="datetimeFigureOut">
               <a:rPr lang="en-US" smtClean="0"/>
-              <a:t>2/13/19</a:t>
+              <a:t>2/21/19</a:t>
             </a:fld>
             <a:endParaRPr lang="en-US"/>
           </a:p>
@@ -2975,10 +2975,10 @@
       </p:grpSpPr>
       <p:pic>
         <p:nvPicPr>
-          <p:cNvPr id="15" name="Picture 14">
+          <p:cNvPr id="16" name="Picture 15">
             <a:extLst>
               <a:ext uri="{FF2B5EF4-FFF2-40B4-BE49-F238E27FC236}">
-                <a16:creationId xmlns:a16="http://schemas.microsoft.com/office/drawing/2014/main" id="{3062A902-89E9-E649-949F-B6C70295E302}"/>
+                <a16:creationId xmlns:a16="http://schemas.microsoft.com/office/drawing/2014/main" id="{67A08F7C-0CDC-4341-AD48-C3CF70E803A0}"/>
               </a:ext>
             </a:extLst>
           </p:cNvPr>
@@ -2995,7 +2995,7 @@
         </p:blipFill>
         <p:spPr>
           <a:xfrm>
-            <a:off x="3213142" y="428081"/>
+            <a:off x="3247356" y="428081"/>
             <a:ext cx="2217600" cy="1995436"/>
           </a:xfrm>
           <a:prstGeom prst="rect">

</xml_diff>

<commit_message>
adding some data of dai 2016
</commit_message>
<xml_diff>
--- a/figure-assembly/figure-3.pptx
+++ b/figure-assembly/figure-3.pptx
@@ -245,7 +245,7 @@
           <a:p>
             <a:fld id="{25EC0CD3-564D-9742-98B5-86271438CCE6}" type="datetimeFigureOut">
               <a:rPr lang="en-US" smtClean="0"/>
-              <a:t>2/21/19</a:t>
+              <a:t>2019-08-21</a:t>
             </a:fld>
             <a:endParaRPr lang="en-US"/>
           </a:p>
@@ -287,7 +287,7 @@
           <a:p>
             <a:fld id="{A2D12DD3-8FC7-294C-8E74-A90D62DDF8C3}" type="slidenum">
               <a:rPr lang="en-US" smtClean="0"/>
-              <a:t>‹#›</a:t>
+              <a:t>‹N°›</a:t>
             </a:fld>
             <a:endParaRPr lang="en-US"/>
           </a:p>
@@ -415,7 +415,7 @@
           <a:p>
             <a:fld id="{25EC0CD3-564D-9742-98B5-86271438CCE6}" type="datetimeFigureOut">
               <a:rPr lang="en-US" smtClean="0"/>
-              <a:t>2/21/19</a:t>
+              <a:t>2019-08-21</a:t>
             </a:fld>
             <a:endParaRPr lang="en-US"/>
           </a:p>
@@ -457,7 +457,7 @@
           <a:p>
             <a:fld id="{A2D12DD3-8FC7-294C-8E74-A90D62DDF8C3}" type="slidenum">
               <a:rPr lang="en-US" smtClean="0"/>
-              <a:t>‹#›</a:t>
+              <a:t>‹N°›</a:t>
             </a:fld>
             <a:endParaRPr lang="en-US"/>
           </a:p>
@@ -595,7 +595,7 @@
           <a:p>
             <a:fld id="{25EC0CD3-564D-9742-98B5-86271438CCE6}" type="datetimeFigureOut">
               <a:rPr lang="en-US" smtClean="0"/>
-              <a:t>2/21/19</a:t>
+              <a:t>2019-08-21</a:t>
             </a:fld>
             <a:endParaRPr lang="en-US"/>
           </a:p>
@@ -637,7 +637,7 @@
           <a:p>
             <a:fld id="{A2D12DD3-8FC7-294C-8E74-A90D62DDF8C3}" type="slidenum">
               <a:rPr lang="en-US" smtClean="0"/>
-              <a:t>‹#›</a:t>
+              <a:t>‹N°›</a:t>
             </a:fld>
             <a:endParaRPr lang="en-US"/>
           </a:p>
@@ -765,7 +765,7 @@
           <a:p>
             <a:fld id="{25EC0CD3-564D-9742-98B5-86271438CCE6}" type="datetimeFigureOut">
               <a:rPr lang="en-US" smtClean="0"/>
-              <a:t>2/21/19</a:t>
+              <a:t>2019-08-21</a:t>
             </a:fld>
             <a:endParaRPr lang="en-US"/>
           </a:p>
@@ -807,7 +807,7 @@
           <a:p>
             <a:fld id="{A2D12DD3-8FC7-294C-8E74-A90D62DDF8C3}" type="slidenum">
               <a:rPr lang="en-US" smtClean="0"/>
-              <a:t>‹#›</a:t>
+              <a:t>‹N°›</a:t>
             </a:fld>
             <a:endParaRPr lang="en-US"/>
           </a:p>
@@ -1009,7 +1009,7 @@
           <a:p>
             <a:fld id="{25EC0CD3-564D-9742-98B5-86271438CCE6}" type="datetimeFigureOut">
               <a:rPr lang="en-US" smtClean="0"/>
-              <a:t>2/21/19</a:t>
+              <a:t>2019-08-21</a:t>
             </a:fld>
             <a:endParaRPr lang="en-US"/>
           </a:p>
@@ -1051,7 +1051,7 @@
           <a:p>
             <a:fld id="{A2D12DD3-8FC7-294C-8E74-A90D62DDF8C3}" type="slidenum">
               <a:rPr lang="en-US" smtClean="0"/>
-              <a:t>‹#›</a:t>
+              <a:t>‹N°›</a:t>
             </a:fld>
             <a:endParaRPr lang="en-US"/>
           </a:p>
@@ -1241,7 +1241,7 @@
           <a:p>
             <a:fld id="{25EC0CD3-564D-9742-98B5-86271438CCE6}" type="datetimeFigureOut">
               <a:rPr lang="en-US" smtClean="0"/>
-              <a:t>2/21/19</a:t>
+              <a:t>2019-08-21</a:t>
             </a:fld>
             <a:endParaRPr lang="en-US"/>
           </a:p>
@@ -1283,7 +1283,7 @@
           <a:p>
             <a:fld id="{A2D12DD3-8FC7-294C-8E74-A90D62DDF8C3}" type="slidenum">
               <a:rPr lang="en-US" smtClean="0"/>
-              <a:t>‹#›</a:t>
+              <a:t>‹N°›</a:t>
             </a:fld>
             <a:endParaRPr lang="en-US"/>
           </a:p>
@@ -1608,7 +1608,7 @@
           <a:p>
             <a:fld id="{25EC0CD3-564D-9742-98B5-86271438CCE6}" type="datetimeFigureOut">
               <a:rPr lang="en-US" smtClean="0"/>
-              <a:t>2/21/19</a:t>
+              <a:t>2019-08-21</a:t>
             </a:fld>
             <a:endParaRPr lang="en-US"/>
           </a:p>
@@ -1650,7 +1650,7 @@
           <a:p>
             <a:fld id="{A2D12DD3-8FC7-294C-8E74-A90D62DDF8C3}" type="slidenum">
               <a:rPr lang="en-US" smtClean="0"/>
-              <a:t>‹#›</a:t>
+              <a:t>‹N°›</a:t>
             </a:fld>
             <a:endParaRPr lang="en-US"/>
           </a:p>
@@ -1726,7 +1726,7 @@
           <a:p>
             <a:fld id="{25EC0CD3-564D-9742-98B5-86271438CCE6}" type="datetimeFigureOut">
               <a:rPr lang="en-US" smtClean="0"/>
-              <a:t>2/21/19</a:t>
+              <a:t>2019-08-21</a:t>
             </a:fld>
             <a:endParaRPr lang="en-US"/>
           </a:p>
@@ -1768,7 +1768,7 @@
           <a:p>
             <a:fld id="{A2D12DD3-8FC7-294C-8E74-A90D62DDF8C3}" type="slidenum">
               <a:rPr lang="en-US" smtClean="0"/>
-              <a:t>‹#›</a:t>
+              <a:t>‹N°›</a:t>
             </a:fld>
             <a:endParaRPr lang="en-US"/>
           </a:p>
@@ -1821,7 +1821,7 @@
           <a:p>
             <a:fld id="{25EC0CD3-564D-9742-98B5-86271438CCE6}" type="datetimeFigureOut">
               <a:rPr lang="en-US" smtClean="0"/>
-              <a:t>2/21/19</a:t>
+              <a:t>2019-08-21</a:t>
             </a:fld>
             <a:endParaRPr lang="en-US"/>
           </a:p>
@@ -1863,7 +1863,7 @@
           <a:p>
             <a:fld id="{A2D12DD3-8FC7-294C-8E74-A90D62DDF8C3}" type="slidenum">
               <a:rPr lang="en-US" smtClean="0"/>
-              <a:t>‹#›</a:t>
+              <a:t>‹N°›</a:t>
             </a:fld>
             <a:endParaRPr lang="en-US"/>
           </a:p>
@@ -2098,7 +2098,7 @@
           <a:p>
             <a:fld id="{25EC0CD3-564D-9742-98B5-86271438CCE6}" type="datetimeFigureOut">
               <a:rPr lang="en-US" smtClean="0"/>
-              <a:t>2/21/19</a:t>
+              <a:t>2019-08-21</a:t>
             </a:fld>
             <a:endParaRPr lang="en-US"/>
           </a:p>
@@ -2140,7 +2140,7 @@
           <a:p>
             <a:fld id="{A2D12DD3-8FC7-294C-8E74-A90D62DDF8C3}" type="slidenum">
               <a:rPr lang="en-US" smtClean="0"/>
-              <a:t>‹#›</a:t>
+              <a:t>‹N°›</a:t>
             </a:fld>
             <a:endParaRPr lang="en-US"/>
           </a:p>
@@ -2355,7 +2355,7 @@
           <a:p>
             <a:fld id="{25EC0CD3-564D-9742-98B5-86271438CCE6}" type="datetimeFigureOut">
               <a:rPr lang="en-US" smtClean="0"/>
-              <a:t>2/21/19</a:t>
+              <a:t>2019-08-21</a:t>
             </a:fld>
             <a:endParaRPr lang="en-US"/>
           </a:p>
@@ -2397,7 +2397,7 @@
           <a:p>
             <a:fld id="{A2D12DD3-8FC7-294C-8E74-A90D62DDF8C3}" type="slidenum">
               <a:rPr lang="en-US" smtClean="0"/>
-              <a:t>‹#›</a:t>
+              <a:t>‹N°›</a:t>
             </a:fld>
             <a:endParaRPr lang="en-US"/>
           </a:p>
@@ -2568,7 +2568,7 @@
           <a:p>
             <a:fld id="{25EC0CD3-564D-9742-98B5-86271438CCE6}" type="datetimeFigureOut">
               <a:rPr lang="en-US" smtClean="0"/>
-              <a:t>2/21/19</a:t>
+              <a:t>2019-08-21</a:t>
             </a:fld>
             <a:endParaRPr lang="en-US"/>
           </a:p>
@@ -2646,7 +2646,7 @@
           <a:p>
             <a:fld id="{A2D12DD3-8FC7-294C-8E74-A90D62DDF8C3}" type="slidenum">
               <a:rPr lang="en-US" smtClean="0"/>
-              <a:t>‹#›</a:t>
+              <a:t>‹N°›</a:t>
             </a:fld>
             <a:endParaRPr lang="en-US"/>
           </a:p>
@@ -2988,15 +2988,21 @@
           <p:nvPr/>
         </p:nvPicPr>
         <p:blipFill>
-          <a:blip r:embed="rId2"/>
+          <a:blip r:embed="rId2">
+            <a:extLst>
+              <a:ext uri="{28A0092B-C50C-407E-A947-70E740481C1C}">
+                <a14:useLocalDpi xmlns:a14="http://schemas.microsoft.com/office/drawing/2010/main" val="0"/>
+              </a:ext>
+            </a:extLst>
+          </a:blip>
           <a:stretch>
             <a:fillRect/>
           </a:stretch>
         </p:blipFill>
         <p:spPr>
           <a:xfrm>
-            <a:off x="3247356" y="428081"/>
-            <a:ext cx="2217600" cy="1995436"/>
+            <a:off x="3248280" y="428081"/>
+            <a:ext cx="2215752" cy="1995436"/>
           </a:xfrm>
           <a:prstGeom prst="rect">
             <a:avLst/>
@@ -3284,7 +3290,19 @@
                                 <a:rPr lang="ar-AE" sz="975">
                                   <a:latin typeface="Cambria Math" panose="02040503050406030204" pitchFamily="18" charset="0"/>
                                 </a:rPr>
-                                <m:t>(1−</m:t>
+                                <m:t>(</m:t>
+                              </m:r>
+                              <m:r>
+                                <a:rPr lang="ar-AE" sz="975">
+                                  <a:latin typeface="Cambria Math" panose="02040503050406030204" pitchFamily="18" charset="0"/>
+                                </a:rPr>
+                                <m:t>1</m:t>
+                              </m:r>
+                              <m:r>
+                                <a:rPr lang="ar-AE" sz="975">
+                                  <a:latin typeface="Cambria Math" panose="02040503050406030204" pitchFamily="18" charset="0"/>
+                                </a:rPr>
+                                <m:t>−</m:t>
                               </m:r>
                               <m:r>
                                 <a:rPr lang="ar-AE" sz="975">
@@ -4211,15 +4229,21 @@
           <p:nvPr/>
         </p:nvPicPr>
         <p:blipFill>
-          <a:blip r:embed="rId8"/>
+          <a:blip r:embed="rId8">
+            <a:extLst>
+              <a:ext uri="{28A0092B-C50C-407E-A947-70E740481C1C}">
+                <a14:useLocalDpi xmlns:a14="http://schemas.microsoft.com/office/drawing/2010/main" val="0"/>
+              </a:ext>
+            </a:extLst>
+          </a:blip>
           <a:stretch>
             <a:fillRect/>
           </a:stretch>
         </p:blipFill>
         <p:spPr>
           <a:xfrm>
-            <a:off x="5645771" y="428081"/>
-            <a:ext cx="2217600" cy="1995436"/>
+            <a:off x="5646695" y="428081"/>
+            <a:ext cx="2215752" cy="1995436"/>
           </a:xfrm>
           <a:prstGeom prst="rect">
             <a:avLst/>
@@ -4558,6 +4582,13 @@
   <p:clrMapOvr>
     <a:masterClrMapping/>
   </p:clrMapOvr>
+  <p:timing>
+    <p:tnLst>
+      <p:par>
+        <p:cTn id="1" dur="indefinite" restart="never" nodeType="tmRoot"/>
+      </p:par>
+    </p:tnLst>
+  </p:timing>
 </p:sld>
 </file>
 
@@ -5099,7 +5130,19 @@
                                 <a:rPr lang="ar-AE" sz="975">
                                   <a:latin typeface="Cambria Math" panose="02040503050406030204" pitchFamily="18" charset="0"/>
                                 </a:rPr>
-                                <m:t>(1−</m:t>
+                                <m:t>(</m:t>
+                              </m:r>
+                              <m:r>
+                                <a:rPr lang="ar-AE" sz="975">
+                                  <a:latin typeface="Cambria Math" panose="02040503050406030204" pitchFamily="18" charset="0"/>
+                                </a:rPr>
+                                <m:t>1</m:t>
+                              </m:r>
+                              <m:r>
+                                <a:rPr lang="ar-AE" sz="975">
+                                  <a:latin typeface="Cambria Math" panose="02040503050406030204" pitchFamily="18" charset="0"/>
+                                </a:rPr>
+                                <m:t>−</m:t>
                               </m:r>
                               <m:r>
                                 <a:rPr lang="ar-AE" sz="975">
@@ -6015,6 +6058,13 @@
   <p:clrMapOvr>
     <a:masterClrMapping/>
   </p:clrMapOvr>
+  <p:timing>
+    <p:tnLst>
+      <p:par>
+        <p:cTn id="1" dur="indefinite" restart="never" nodeType="tmRoot"/>
+      </p:par>
+    </p:tnLst>
+  </p:timing>
 </p:sld>
 </file>
 
@@ -6316,7 +6366,19 @@
                                 <a:rPr lang="ar-AE" sz="975">
                                   <a:latin typeface="Cambria Math" panose="02040503050406030204" pitchFamily="18" charset="0"/>
                                 </a:rPr>
-                                <m:t>(1−</m:t>
+                                <m:t>(</m:t>
+                              </m:r>
+                              <m:r>
+                                <a:rPr lang="ar-AE" sz="975">
+                                  <a:latin typeface="Cambria Math" panose="02040503050406030204" pitchFamily="18" charset="0"/>
+                                </a:rPr>
+                                <m:t>1</m:t>
+                              </m:r>
+                              <m:r>
+                                <a:rPr lang="ar-AE" sz="975">
+                                  <a:latin typeface="Cambria Math" panose="02040503050406030204" pitchFamily="18" charset="0"/>
+                                </a:rPr>
+                                <m:t>−</m:t>
                               </m:r>
                               <m:r>
                                 <a:rPr lang="ar-AE" sz="975">

</xml_diff>